<commit_message>
Diapositiva con definición de subversion
</commit_message>
<xml_diff>
--- a/Gestion de Configuracion.pptx
+++ b/Gestion de Configuracion.pptx
@@ -4587,12 +4587,131 @@
           <a:bodyPr/>
           <a:lstStyle/>
           <a:p>
-            <a:pPr marL="0" lvl="0" indent="0">
+            <a:pPr marL="109728" indent="0">
               <a:buNone/>
             </a:pPr>
             <a:r>
-              <a:rPr lang="es-AR" u="sng" dirty="0" err="1" smtClean="0"/>
+              <a:rPr lang="es-AR" b="1" dirty="0" smtClean="0">
+                <a:solidFill>
+                  <a:srgbClr val="002060"/>
+                </a:solidFill>
+              </a:rPr>
+              <a:t>¿</a:t>
+            </a:r>
+            <a:r>
+              <a:rPr lang="es-AR" b="1" dirty="0">
+                <a:solidFill>
+                  <a:srgbClr val="002060"/>
+                </a:solidFill>
+              </a:rPr>
+              <a:t>Qué es </a:t>
+            </a:r>
+            <a:r>
+              <a:rPr lang="es-AR" b="1" dirty="0" err="1">
+                <a:solidFill>
+                  <a:srgbClr val="002060"/>
+                </a:solidFill>
+              </a:rPr>
               <a:t>Subversion</a:t>
+            </a:r>
+            <a:r>
+              <a:rPr lang="es-AR" b="1" dirty="0">
+                <a:solidFill>
+                  <a:srgbClr val="002060"/>
+                </a:solidFill>
+              </a:rPr>
+              <a:t>?</a:t>
+            </a:r>
+            <a:endParaRPr lang="es-AR" b="1" dirty="0">
+              <a:solidFill>
+                <a:srgbClr val="002060"/>
+              </a:solidFill>
+            </a:endParaRPr>
+          </a:p>
+          <a:p>
+            <a:pPr marL="109728" indent="0">
+              <a:buNone/>
+            </a:pPr>
+            <a:endParaRPr lang="es-AR" dirty="0" smtClean="0"/>
+          </a:p>
+          <a:p>
+            <a:r>
+              <a:rPr lang="es-AR" dirty="0" smtClean="0"/>
+              <a:t>Sistema </a:t>
+            </a:r>
+            <a:r>
+              <a:rPr lang="es-AR" dirty="0"/>
+              <a:t>de control de versiones.</a:t>
+            </a:r>
+          </a:p>
+          <a:p>
+            <a:r>
+              <a:rPr lang="es-AR" dirty="0" smtClean="0"/>
+              <a:t>Sistema </a:t>
+            </a:r>
+            <a:r>
+              <a:rPr lang="es-AR" dirty="0"/>
+              <a:t>centralizado para compartir información.</a:t>
+            </a:r>
+          </a:p>
+          <a:p>
+            <a:r>
+              <a:rPr lang="es-AR" dirty="0" smtClean="0"/>
+              <a:t>Gestiona </a:t>
+            </a:r>
+            <a:r>
+              <a:rPr lang="es-AR" dirty="0"/>
+              <a:t>archivos y directorios, y sus cambios a</a:t>
+            </a:r>
+          </a:p>
+          <a:p>
+            <a:r>
+              <a:rPr lang="es-AR" dirty="0"/>
+              <a:t>través del tiempo.</a:t>
+            </a:r>
+          </a:p>
+          <a:p>
+            <a:r>
+              <a:rPr lang="es-AR" dirty="0" smtClean="0"/>
+              <a:t>Podemos </a:t>
+            </a:r>
+            <a:r>
+              <a:rPr lang="es-AR" dirty="0"/>
+              <a:t>recrear un proyecto desde cualquier </a:t>
+            </a:r>
+            <a:r>
+              <a:rPr lang="es-AR" dirty="0" smtClean="0"/>
+              <a:t>momento en </a:t>
+            </a:r>
+            <a:r>
+              <a:rPr lang="es-AR" dirty="0"/>
+              <a:t>su </a:t>
+            </a:r>
+            <a:r>
+              <a:rPr lang="es-AR" dirty="0" smtClean="0"/>
+              <a:t>historia.</a:t>
+            </a:r>
+          </a:p>
+          <a:p>
+            <a:r>
+              <a:rPr lang="es-AR" dirty="0" err="1" smtClean="0"/>
+              <a:t>Subversion</a:t>
+            </a:r>
+            <a:r>
+              <a:rPr lang="es-AR" dirty="0" smtClean="0"/>
+              <a:t> </a:t>
+            </a:r>
+            <a:r>
+              <a:rPr lang="es-AR" dirty="0"/>
+              <a:t>es un repositorio en forma de árbol </a:t>
+            </a:r>
+            <a:r>
+              <a:rPr lang="es-AR" dirty="0" smtClean="0"/>
+              <a:t>con una </a:t>
+            </a:r>
+            <a:r>
+              <a:rPr lang="es-AR" dirty="0"/>
+              <a:t>jerarquía de directorios y archivos.</a:t>
             </a:r>
             <a:endParaRPr lang="es-AR" u="sng" dirty="0"/>
           </a:p>
@@ -4650,29 +4769,138 @@
             <p:ph idx="1"/>
           </p:nvPr>
         </p:nvSpPr>
-        <p:spPr/>
+        <p:spPr>
+          <a:xfrm>
+            <a:off x="457200" y="692696"/>
+            <a:ext cx="8229600" cy="5881840"/>
+          </a:xfrm>
+        </p:spPr>
         <p:txBody>
           <a:bodyPr/>
           <a:lstStyle/>
-          <a:p>
-            <a:pPr marL="0" lvl="0" indent="0">
-              <a:buNone/>
-            </a:pPr>
-            <a:r>
-              <a:rPr lang="es-AR" dirty="0" smtClean="0"/>
-              <a:t>- </a:t>
-            </a:r>
-            <a:r>
-              <a:rPr lang="es-ES" dirty="0"/>
-              <a:t>Manejo de variaciones</a:t>
-            </a:r>
-            <a:endParaRPr lang="es-AR" dirty="0"/>
-          </a:p>
           <a:p>
             <a:pPr marL="0" indent="0">
               <a:buNone/>
             </a:pPr>
-            <a:endParaRPr lang="es-AR" dirty="0"/>
+            <a:r>
+              <a:rPr lang="es-AR" b="1" dirty="0">
+                <a:solidFill>
+                  <a:srgbClr val="002060"/>
+                </a:solidFill>
+              </a:rPr>
+              <a:t>Gestionar </a:t>
+            </a:r>
+            <a:r>
+              <a:rPr lang="es-AR" b="1" dirty="0" smtClean="0">
+                <a:solidFill>
+                  <a:srgbClr val="002060"/>
+                </a:solidFill>
+              </a:rPr>
+              <a:t>cambios </a:t>
+            </a:r>
+            <a:r>
+              <a:rPr lang="es-AR" b="1" dirty="0">
+                <a:solidFill>
+                  <a:srgbClr val="002060"/>
+                </a:solidFill>
+              </a:rPr>
+              <a:t>a través del </a:t>
+            </a:r>
+            <a:r>
+              <a:rPr lang="es-AR" b="1" dirty="0" smtClean="0">
+                <a:solidFill>
+                  <a:srgbClr val="002060"/>
+                </a:solidFill>
+              </a:rPr>
+              <a:t>tiempo</a:t>
+            </a:r>
+          </a:p>
+          <a:p>
+            <a:pPr marL="0" indent="0">
+              <a:buNone/>
+            </a:pPr>
+            <a:endParaRPr lang="es-AR" dirty="0" smtClean="0">
+              <a:solidFill>
+                <a:srgbClr val="002060"/>
+              </a:solidFill>
+            </a:endParaRPr>
+          </a:p>
+          <a:p>
+            <a:r>
+              <a:rPr lang="es-AR" dirty="0" err="1"/>
+              <a:t>Subversion</a:t>
+            </a:r>
+            <a:r>
+              <a:rPr lang="es-AR" dirty="0"/>
+              <a:t> recuerda cada cambio que se haya</a:t>
+            </a:r>
+          </a:p>
+          <a:p>
+            <a:r>
+              <a:rPr lang="es-AR" dirty="0"/>
+              <a:t>realizado en el repositorio.</a:t>
+            </a:r>
+          </a:p>
+          <a:p>
+            <a:r>
+              <a:rPr lang="es-AR" dirty="0" smtClean="0"/>
+              <a:t>Recuerda </a:t>
+            </a:r>
+            <a:r>
+              <a:rPr lang="es-AR" dirty="0"/>
+              <a:t>cambios realizado a cada archivo así</a:t>
+            </a:r>
+          </a:p>
+          <a:p>
+            <a:r>
+              <a:rPr lang="es-AR" dirty="0"/>
+              <a:t>como cambios en el árbol de directorios:</a:t>
+            </a:r>
+          </a:p>
+          <a:p>
+            <a:r>
+              <a:rPr lang="es-AR" dirty="0" smtClean="0"/>
+              <a:t>Archivos </a:t>
+            </a:r>
+            <a:r>
+              <a:rPr lang="es-AR" dirty="0"/>
+              <a:t>y directorios nuevos</a:t>
+            </a:r>
+          </a:p>
+          <a:p>
+            <a:r>
+              <a:rPr lang="es-AR" dirty="0" smtClean="0"/>
+              <a:t>Archivos </a:t>
+            </a:r>
+            <a:r>
+              <a:rPr lang="es-AR" dirty="0"/>
+              <a:t>y directorios borrados</a:t>
+            </a:r>
+          </a:p>
+          <a:p>
+            <a:r>
+              <a:rPr lang="es-AR" dirty="0" smtClean="0"/>
+              <a:t>Archivos </a:t>
+            </a:r>
+            <a:r>
+              <a:rPr lang="es-AR" dirty="0"/>
+              <a:t>y directorios modificados o cambiados de lugar.</a:t>
+            </a:r>
+            <a:endParaRPr lang="es-AR" dirty="0">
+              <a:solidFill>
+                <a:srgbClr val="002060"/>
+              </a:solidFill>
+            </a:endParaRPr>
+          </a:p>
+          <a:p>
+            <a:pPr marL="0" indent="0">
+              <a:buNone/>
+            </a:pPr>
+            <a:endParaRPr lang="es-AR" dirty="0">
+              <a:solidFill>
+                <a:srgbClr val="002060"/>
+              </a:solidFill>
+            </a:endParaRPr>
           </a:p>
         </p:txBody>
       </p:sp>
@@ -4721,20 +4949,6 @@
           <a:bodyPr/>
           <a:lstStyle/>
           <a:p>
-            <a:pPr marL="0" lvl="0" indent="0">
-              <a:buNone/>
-            </a:pPr>
-            <a:r>
-              <a:rPr lang="es-AR" dirty="0" smtClean="0"/>
-              <a:t>- </a:t>
-            </a:r>
-            <a:r>
-              <a:rPr lang="es-ES" dirty="0"/>
-              <a:t>Órdenes/comandos y sus objetivos</a:t>
-            </a:r>
-            <a:endParaRPr lang="es-AR" dirty="0"/>
-          </a:p>
-          <a:p>
             <a:pPr marL="0" indent="0">
               <a:buNone/>
             </a:pPr>
@@ -4787,20 +5001,6 @@
           <a:bodyPr/>
           <a:lstStyle/>
           <a:p>
-            <a:pPr marL="0" lvl="0" indent="0">
-              <a:buNone/>
-            </a:pPr>
-            <a:r>
-              <a:rPr lang="es-AR" dirty="0" smtClean="0"/>
-              <a:t>- </a:t>
-            </a:r>
-            <a:r>
-              <a:rPr lang="es-ES" dirty="0"/>
-              <a:t>Administración del Repositorio</a:t>
-            </a:r>
-            <a:endParaRPr lang="es-AR" dirty="0"/>
-          </a:p>
-          <a:p>
             <a:pPr marL="0" indent="0">
               <a:buNone/>
             </a:pPr>
@@ -4853,20 +5053,6 @@
           <a:bodyPr/>
           <a:lstStyle/>
           <a:p>
-            <a:pPr marL="0" lvl="0" indent="0">
-              <a:buNone/>
-            </a:pPr>
-            <a:r>
-              <a:rPr lang="es-AR" dirty="0" smtClean="0"/>
-              <a:t>- </a:t>
-            </a:r>
-            <a:r>
-              <a:rPr lang="es-ES" dirty="0"/>
-              <a:t>Control de acceso </a:t>
-            </a:r>
-            <a:endParaRPr lang="es-AR" dirty="0"/>
-          </a:p>
-          <a:p>
             <a:pPr marL="0" indent="0">
               <a:buNone/>
             </a:pPr>
@@ -4919,20 +5105,6 @@
           <a:bodyPr/>
           <a:lstStyle/>
           <a:p>
-            <a:pPr marL="0" lvl="0" indent="0">
-              <a:buNone/>
-            </a:pPr>
-            <a:r>
-              <a:rPr lang="es-AR" dirty="0" smtClean="0"/>
-              <a:t>- </a:t>
-            </a:r>
-            <a:r>
-              <a:rPr lang="es-ES" dirty="0"/>
-              <a:t>Control de sincronización</a:t>
-            </a:r>
-            <a:endParaRPr lang="es-AR" dirty="0"/>
-          </a:p>
-          <a:p>
             <a:pPr marL="0" indent="0">
               <a:buNone/>
             </a:pPr>
@@ -4984,20 +5156,6 @@
         <p:txBody>
           <a:bodyPr/>
           <a:lstStyle/>
-          <a:p>
-            <a:pPr marL="0" lvl="0" indent="0">
-              <a:buNone/>
-            </a:pPr>
-            <a:r>
-              <a:rPr lang="es-AR" dirty="0" smtClean="0"/>
-              <a:t>- </a:t>
-            </a:r>
-            <a:r>
-              <a:rPr lang="es-ES" dirty="0"/>
-              <a:t>Manejo de gestión de cambios</a:t>
-            </a:r>
-            <a:endParaRPr lang="es-AR" dirty="0"/>
-          </a:p>
           <a:p>
             <a:pPr marL="0" indent="0">
               <a:buNone/>
@@ -5046,7 +5204,7 @@
             <p:ph idx="1"/>
             <p:extLst>
               <p:ext uri="{D42A27DB-BD31-4B8C-83A1-F6EECF244321}">
-                <p14:modId xmlns:p14="http://schemas.microsoft.com/office/powerpoint/2010/main" val="4018117506"/>
+                <p14:modId xmlns:p14="http://schemas.microsoft.com/office/powerpoint/2010/main" val="3077164925"/>
               </p:ext>
             </p:extLst>
           </p:nvPr>
@@ -5197,7 +5355,11 @@
                     <a:bodyPr/>
                     <a:lstStyle/>
                     <a:p>
-                      <a:endParaRPr lang="es-AR" dirty="0"/>
+                      <a:r>
+                        <a:rPr lang="es-AR" sz="1400" dirty="0" smtClean="0"/>
+                        <a:t>Versionado de directorios</a:t>
+                      </a:r>
+                      <a:endParaRPr lang="es-AR" sz="1400" dirty="0"/>
                     </a:p>
                   </a:txBody>
                   <a:tcPr/>

</xml_diff>

<commit_message>
Sigo con el informe, agregué comandos del mercurial y descripcion. Corrección de tipo de letra usada, etc.
</commit_message>
<xml_diff>
--- a/Gestion de Configuracion.pptx
+++ b/Gestion de Configuracion.pptx
@@ -774,7 +774,7 @@
           <a:p>
             <a:fld id="{7A847CFC-816F-41D0-AAC0-9BF4FEBC753E}" type="datetimeFigureOut">
               <a:rPr lang="es-ES" smtClean="0"/>
-              <a:t>02/08/2012</a:t>
+              <a:t>04/08/2012</a:t>
             </a:fld>
             <a:endParaRPr lang="es-ES"/>
           </a:p>
@@ -957,7 +957,7 @@
           <a:p>
             <a:fld id="{7A847CFC-816F-41D0-AAC0-9BF4FEBC753E}" type="datetimeFigureOut">
               <a:rPr lang="es-ES" smtClean="0"/>
-              <a:t>02/08/2012</a:t>
+              <a:t>04/08/2012</a:t>
             </a:fld>
             <a:endParaRPr lang="es-ES"/>
           </a:p>
@@ -1132,7 +1132,7 @@
           <a:p>
             <a:fld id="{7A847CFC-816F-41D0-AAC0-9BF4FEBC753E}" type="datetimeFigureOut">
               <a:rPr lang="es-ES" smtClean="0"/>
-              <a:t>02/08/2012</a:t>
+              <a:t>04/08/2012</a:t>
             </a:fld>
             <a:endParaRPr lang="es-ES"/>
           </a:p>
@@ -1297,7 +1297,7 @@
           <a:p>
             <a:fld id="{7A847CFC-816F-41D0-AAC0-9BF4FEBC753E}" type="datetimeFigureOut">
               <a:rPr lang="es-ES" smtClean="0"/>
-              <a:t>02/08/2012</a:t>
+              <a:t>04/08/2012</a:t>
             </a:fld>
             <a:endParaRPr lang="es-ES"/>
           </a:p>
@@ -1518,7 +1518,7 @@
           <a:p>
             <a:fld id="{7A847CFC-816F-41D0-AAC0-9BF4FEBC753E}" type="datetimeFigureOut">
               <a:rPr lang="es-ES" smtClean="0"/>
-              <a:t>02/08/2012</a:t>
+              <a:t>04/08/2012</a:t>
             </a:fld>
             <a:endParaRPr lang="es-ES"/>
           </a:p>
@@ -1777,7 +1777,7 @@
           <a:p>
             <a:fld id="{7A847CFC-816F-41D0-AAC0-9BF4FEBC753E}" type="datetimeFigureOut">
               <a:rPr lang="es-ES" smtClean="0"/>
-              <a:t>02/08/2012</a:t>
+              <a:t>04/08/2012</a:t>
             </a:fld>
             <a:endParaRPr lang="es-ES"/>
           </a:p>
@@ -2181,7 +2181,7 @@
           <a:p>
             <a:fld id="{7A847CFC-816F-41D0-AAC0-9BF4FEBC753E}" type="datetimeFigureOut">
               <a:rPr lang="es-ES" smtClean="0"/>
-              <a:t>02/08/2012</a:t>
+              <a:t>04/08/2012</a:t>
             </a:fld>
             <a:endParaRPr lang="es-ES"/>
           </a:p>
@@ -2312,7 +2312,7 @@
           <a:p>
             <a:fld id="{7A847CFC-816F-41D0-AAC0-9BF4FEBC753E}" type="datetimeFigureOut">
               <a:rPr lang="es-ES" smtClean="0"/>
-              <a:t>02/08/2012</a:t>
+              <a:t>04/08/2012</a:t>
             </a:fld>
             <a:endParaRPr lang="es-ES"/>
           </a:p>
@@ -2412,7 +2412,7 @@
           <a:p>
             <a:fld id="{7A847CFC-816F-41D0-AAC0-9BF4FEBC753E}" type="datetimeFigureOut">
               <a:rPr lang="es-ES" smtClean="0"/>
-              <a:t>02/08/2012</a:t>
+              <a:t>04/08/2012</a:t>
             </a:fld>
             <a:endParaRPr lang="es-ES"/>
           </a:p>
@@ -2657,7 +2657,7 @@
           <a:p>
             <a:fld id="{7A847CFC-816F-41D0-AAC0-9BF4FEBC753E}" type="datetimeFigureOut">
               <a:rPr lang="es-ES" smtClean="0"/>
-              <a:t>02/08/2012</a:t>
+              <a:t>04/08/2012</a:t>
             </a:fld>
             <a:endParaRPr lang="es-ES"/>
           </a:p>
@@ -2901,7 +2901,7 @@
           <a:p>
             <a:fld id="{7A847CFC-816F-41D0-AAC0-9BF4FEBC753E}" type="datetimeFigureOut">
               <a:rPr lang="es-ES" smtClean="0"/>
-              <a:t>02/08/2012</a:t>
+              <a:t>04/08/2012</a:t>
             </a:fld>
             <a:endParaRPr lang="es-ES"/>
           </a:p>
@@ -3725,7 +3725,7 @@
           <a:p>
             <a:fld id="{7A847CFC-816F-41D0-AAC0-9BF4FEBC753E}" type="datetimeFigureOut">
               <a:rPr lang="es-ES" smtClean="0"/>
-              <a:t>02/08/2012</a:t>
+              <a:t>04/08/2012</a:t>
             </a:fld>
             <a:endParaRPr lang="es-ES"/>
           </a:p>
@@ -4223,7 +4223,7 @@
                     <a:lstStyle/>
                     <a:p>
                       <a:r>
-                        <a:rPr lang="es-AR" dirty="0" err="1" smtClean="0"/>
+                        <a:rPr lang="es-AR" dirty="0" smtClean="0"/>
                         <a:t>Subversion</a:t>
                       </a:r>
                       <a:endParaRPr lang="es-AR" dirty="0"/>
@@ -4604,29 +4604,8 @@
                   <a:srgbClr val="002060"/>
                 </a:solidFill>
               </a:rPr>
-              <a:t>Qué es </a:t>
-            </a:r>
-            <a:r>
-              <a:rPr lang="es-AR" b="1" dirty="0" err="1">
-                <a:solidFill>
-                  <a:srgbClr val="002060"/>
-                </a:solidFill>
-              </a:rPr>
-              <a:t>Subversion</a:t>
-            </a:r>
-            <a:r>
-              <a:rPr lang="es-AR" b="1" dirty="0">
-                <a:solidFill>
-                  <a:srgbClr val="002060"/>
-                </a:solidFill>
-              </a:rPr>
-              <a:t>?</a:t>
-            </a:r>
-            <a:endParaRPr lang="es-AR" b="1" dirty="0">
-              <a:solidFill>
-                <a:srgbClr val="002060"/>
-              </a:solidFill>
-            </a:endParaRPr>
+              <a:t>Qué es Subversion?</a:t>
+            </a:r>
           </a:p>
           <a:p>
             <a:pPr marL="109728" indent="0">
@@ -4665,9 +4644,16 @@
             </a:r>
           </a:p>
           <a:p>
+            <a:pPr marL="109728" indent="0">
+              <a:buNone/>
+            </a:pPr>
+            <a:r>
+              <a:rPr lang="es-AR" dirty="0" smtClean="0"/>
+              <a:t>   través </a:t>
+            </a:r>
             <a:r>
               <a:rPr lang="es-AR" dirty="0"/>
-              <a:t>través del tiempo.</a:t>
+              <a:t>del tiempo.</a:t>
             </a:r>
           </a:p>
           <a:p>
@@ -4694,12 +4680,8 @@
           </a:p>
           <a:p>
             <a:r>
-              <a:rPr lang="es-AR" dirty="0" err="1" smtClean="0"/>
-              <a:t>Subversion</a:t>
-            </a:r>
-            <a:r>
               <a:rPr lang="es-AR" dirty="0" smtClean="0"/>
-              <a:t> </a:t>
+              <a:t>Subversion </a:t>
             </a:r>
             <a:r>
               <a:rPr lang="es-AR" dirty="0"/>
@@ -4827,18 +4809,29 @@
           </a:p>
           <a:p>
             <a:r>
-              <a:rPr lang="es-AR" dirty="0" err="1"/>
-              <a:t>Subversion</a:t>
-            </a:r>
-            <a:r>
               <a:rPr lang="es-AR" dirty="0"/>
-              <a:t> recuerda cada cambio que se haya</a:t>
-            </a:r>
-          </a:p>
-          <a:p>
+              <a:t>Subversion recuerda cada cambio que se haya</a:t>
+            </a:r>
+          </a:p>
+          <a:p>
+            <a:pPr marL="109728" indent="0">
+              <a:buNone/>
+            </a:pPr>
             <a:r>
               <a:rPr lang="es-AR" dirty="0"/>
-              <a:t>realizado en el repositorio.</a:t>
+              <a:t> </a:t>
+            </a:r>
+            <a:r>
+              <a:rPr lang="es-AR" dirty="0" smtClean="0"/>
+              <a:t>  </a:t>
+            </a:r>
+            <a:r>
+              <a:rPr lang="es-AR" dirty="0" smtClean="0"/>
+              <a:t>realizado </a:t>
+            </a:r>
+            <a:r>
+              <a:rPr lang="es-AR" dirty="0"/>
+              <a:t>en el repositorio.</a:t>
             </a:r>
           </a:p>
           <a:p>
@@ -4852,9 +4845,16 @@
             </a:r>
           </a:p>
           <a:p>
+            <a:pPr marL="109728" indent="0">
+              <a:buNone/>
+            </a:pPr>
+            <a:r>
+              <a:rPr lang="es-AR" dirty="0" smtClean="0"/>
+              <a:t>   como </a:t>
+            </a:r>
             <a:r>
               <a:rPr lang="es-AR" dirty="0"/>
-              <a:t>como cambios en el árbol de directorios:</a:t>
+              <a:t>cambios en el árbol de directorios:</a:t>
             </a:r>
           </a:p>
           <a:p>
@@ -4934,28 +4934,6 @@
           <a:chExt cx="0" cy="0"/>
         </a:xfrm>
       </p:grpSpPr>
-      <p:sp>
-        <p:nvSpPr>
-          <p:cNvPr id="3" name="2 Marcador de contenido"/>
-          <p:cNvSpPr>
-            <a:spLocks noGrp="1"/>
-          </p:cNvSpPr>
-          <p:nvPr>
-            <p:ph idx="1"/>
-          </p:nvPr>
-        </p:nvSpPr>
-        <p:spPr/>
-        <p:txBody>
-          <a:bodyPr/>
-          <a:lstStyle/>
-          <a:p>
-            <a:pPr marL="0" indent="0">
-              <a:buNone/>
-            </a:pPr>
-            <a:endParaRPr lang="es-AR" dirty="0"/>
-          </a:p>
-        </p:txBody>
-      </p:sp>
     </p:spTree>
     <p:extLst>
       <p:ext uri="{BB962C8B-B14F-4D97-AF65-F5344CB8AC3E}">
@@ -5241,7 +5219,7 @@
                     <a:lstStyle/>
                     <a:p>
                       <a:r>
-                        <a:rPr lang="es-AR" dirty="0" err="1" smtClean="0"/>
+                        <a:rPr lang="es-AR" dirty="0" smtClean="0"/>
                         <a:t>Subversion</a:t>
                       </a:r>
                       <a:endParaRPr lang="es-AR" dirty="0"/>

</xml_diff>

<commit_message>
Completo diapositivas e informe y agrego detalles de redacción. Agrego Herramientas de Integración Continua.docx con algo de info.
</commit_message>
<xml_diff>
--- a/Gestion de Configuracion.pptx
+++ b/Gestion de Configuracion.pptx
@@ -177,7 +177,7 @@
           <a:lstStyle/>
           <a:p>
             <a:pPr algn="ctr" eaLnBrk="1" latinLnBrk="0" hangingPunct="1"/>
-            <a:endParaRPr kumimoji="0" lang="en-US"/>
+            <a:endParaRPr kumimoji="0" lang="en-US" dirty="0"/>
           </a:p>
         </p:txBody>
       </p:sp>
@@ -225,7 +225,7 @@
           <a:lstStyle/>
           <a:p>
             <a:pPr algn="ctr" eaLnBrk="1" latinLnBrk="0" hangingPunct="1"/>
-            <a:endParaRPr kumimoji="0" lang="en-US"/>
+            <a:endParaRPr kumimoji="0" lang="en-US" dirty="0"/>
           </a:p>
         </p:txBody>
       </p:sp>
@@ -273,7 +273,7 @@
           <a:lstStyle/>
           <a:p>
             <a:pPr algn="ctr" eaLnBrk="1" latinLnBrk="0" hangingPunct="1"/>
-            <a:endParaRPr kumimoji="0" lang="en-US"/>
+            <a:endParaRPr kumimoji="0" lang="en-US" dirty="0"/>
           </a:p>
         </p:txBody>
       </p:sp>
@@ -321,7 +321,7 @@
           <a:lstStyle/>
           <a:p>
             <a:pPr algn="ctr" eaLnBrk="1" latinLnBrk="0" hangingPunct="1"/>
-            <a:endParaRPr kumimoji="0" lang="en-US"/>
+            <a:endParaRPr kumimoji="0" lang="en-US" dirty="0"/>
           </a:p>
         </p:txBody>
       </p:sp>
@@ -369,7 +369,7 @@
           <a:lstStyle/>
           <a:p>
             <a:pPr algn="ctr" eaLnBrk="1" latinLnBrk="0" hangingPunct="1"/>
-            <a:endParaRPr kumimoji="0" lang="en-US"/>
+            <a:endParaRPr kumimoji="0" lang="en-US" dirty="0"/>
           </a:p>
         </p:txBody>
       </p:sp>
@@ -414,7 +414,7 @@
           <a:lstStyle/>
           <a:p>
             <a:pPr algn="ctr" eaLnBrk="1" latinLnBrk="0" hangingPunct="1"/>
-            <a:endParaRPr kumimoji="0" lang="en-US"/>
+            <a:endParaRPr kumimoji="0" lang="en-US" dirty="0"/>
           </a:p>
         </p:txBody>
       </p:sp>
@@ -459,7 +459,7 @@
           <a:lstStyle/>
           <a:p>
             <a:pPr algn="ctr" eaLnBrk="1" latinLnBrk="0" hangingPunct="1"/>
-            <a:endParaRPr kumimoji="0" lang="en-US"/>
+            <a:endParaRPr kumimoji="0" lang="en-US" dirty="0"/>
           </a:p>
         </p:txBody>
       </p:sp>
@@ -507,7 +507,7 @@
           <a:lstStyle/>
           <a:p>
             <a:pPr algn="ctr" eaLnBrk="1" latinLnBrk="0" hangingPunct="1"/>
-            <a:endParaRPr kumimoji="0" lang="en-US"/>
+            <a:endParaRPr kumimoji="0" lang="en-US" dirty="0"/>
           </a:p>
         </p:txBody>
       </p:sp>
@@ -555,7 +555,7 @@
           <a:lstStyle/>
           <a:p>
             <a:pPr algn="ctr" eaLnBrk="1" latinLnBrk="0" hangingPunct="1"/>
-            <a:endParaRPr kumimoji="0" lang="en-US"/>
+            <a:endParaRPr kumimoji="0" lang="en-US" dirty="0"/>
           </a:p>
         </p:txBody>
       </p:sp>
@@ -603,7 +603,7 @@
           <a:lstStyle/>
           <a:p>
             <a:pPr algn="ctr" eaLnBrk="1" latinLnBrk="0" hangingPunct="1"/>
-            <a:endParaRPr kumimoji="0" lang="en-US"/>
+            <a:endParaRPr kumimoji="0" lang="en-US" dirty="0"/>
           </a:p>
         </p:txBody>
       </p:sp>
@@ -651,7 +651,7 @@
           <a:lstStyle/>
           <a:p>
             <a:pPr algn="ctr" eaLnBrk="1" latinLnBrk="0" hangingPunct="1"/>
-            <a:endParaRPr kumimoji="0" lang="en-US"/>
+            <a:endParaRPr kumimoji="0" lang="en-US" dirty="0"/>
           </a:p>
         </p:txBody>
       </p:sp>
@@ -774,9 +774,9 @@
           <a:p>
             <a:fld id="{7A847CFC-816F-41D0-AAC0-9BF4FEBC753E}" type="datetimeFigureOut">
               <a:rPr lang="es-ES" smtClean="0"/>
-              <a:t>05/08/2012</a:t>
+              <a:t>06/08/2012</a:t>
             </a:fld>
-            <a:endParaRPr lang="es-ES"/>
+            <a:endParaRPr lang="es-ES" dirty="0"/>
           </a:p>
         </p:txBody>
       </p:sp>
@@ -800,7 +800,7 @@
           <a:bodyPr/>
           <a:lstStyle/>
           <a:p>
-            <a:endParaRPr lang="es-ES"/>
+            <a:endParaRPr lang="es-ES" dirty="0"/>
           </a:p>
         </p:txBody>
       </p:sp>
@@ -836,7 +836,7 @@
               <a:rPr lang="es-ES" smtClean="0"/>
               <a:t>‹Nº›</a:t>
             </a:fld>
-            <a:endParaRPr lang="es-ES"/>
+            <a:endParaRPr lang="es-ES" dirty="0"/>
           </a:p>
         </p:txBody>
       </p:sp>
@@ -957,9 +957,9 @@
           <a:p>
             <a:fld id="{7A847CFC-816F-41D0-AAC0-9BF4FEBC753E}" type="datetimeFigureOut">
               <a:rPr lang="es-ES" smtClean="0"/>
-              <a:t>05/08/2012</a:t>
+              <a:t>06/08/2012</a:t>
             </a:fld>
-            <a:endParaRPr lang="es-ES"/>
+            <a:endParaRPr lang="es-ES" dirty="0"/>
           </a:p>
         </p:txBody>
       </p:sp>
@@ -978,7 +978,7 @@
           <a:bodyPr/>
           <a:lstStyle/>
           <a:p>
-            <a:endParaRPr lang="es-ES"/>
+            <a:endParaRPr lang="es-ES" dirty="0"/>
           </a:p>
         </p:txBody>
       </p:sp>
@@ -1001,7 +1001,7 @@
               <a:rPr lang="es-ES" smtClean="0"/>
               <a:t>‹Nº›</a:t>
             </a:fld>
-            <a:endParaRPr lang="es-ES"/>
+            <a:endParaRPr lang="es-ES" dirty="0"/>
           </a:p>
         </p:txBody>
       </p:sp>
@@ -1132,9 +1132,9 @@
           <a:p>
             <a:fld id="{7A847CFC-816F-41D0-AAC0-9BF4FEBC753E}" type="datetimeFigureOut">
               <a:rPr lang="es-ES" smtClean="0"/>
-              <a:t>05/08/2012</a:t>
+              <a:t>06/08/2012</a:t>
             </a:fld>
-            <a:endParaRPr lang="es-ES"/>
+            <a:endParaRPr lang="es-ES" dirty="0"/>
           </a:p>
         </p:txBody>
       </p:sp>
@@ -1153,7 +1153,7 @@
           <a:bodyPr/>
           <a:lstStyle/>
           <a:p>
-            <a:endParaRPr lang="es-ES"/>
+            <a:endParaRPr lang="es-ES" dirty="0"/>
           </a:p>
         </p:txBody>
       </p:sp>
@@ -1176,7 +1176,7 @@
               <a:rPr lang="es-ES" smtClean="0"/>
               <a:t>‹Nº›</a:t>
             </a:fld>
-            <a:endParaRPr lang="es-ES"/>
+            <a:endParaRPr lang="es-ES" dirty="0"/>
           </a:p>
         </p:txBody>
       </p:sp>
@@ -1297,9 +1297,9 @@
           <a:p>
             <a:fld id="{7A847CFC-816F-41D0-AAC0-9BF4FEBC753E}" type="datetimeFigureOut">
               <a:rPr lang="es-ES" smtClean="0"/>
-              <a:t>05/08/2012</a:t>
+              <a:t>06/08/2012</a:t>
             </a:fld>
-            <a:endParaRPr lang="es-ES"/>
+            <a:endParaRPr lang="es-ES" dirty="0"/>
           </a:p>
         </p:txBody>
       </p:sp>
@@ -1318,7 +1318,7 @@
           <a:bodyPr/>
           <a:lstStyle/>
           <a:p>
-            <a:endParaRPr lang="es-ES"/>
+            <a:endParaRPr lang="es-ES" dirty="0"/>
           </a:p>
         </p:txBody>
       </p:sp>
@@ -1341,7 +1341,7 @@
               <a:rPr lang="es-ES" smtClean="0"/>
               <a:t>‹Nº›</a:t>
             </a:fld>
-            <a:endParaRPr lang="es-ES"/>
+            <a:endParaRPr lang="es-ES" dirty="0"/>
           </a:p>
         </p:txBody>
       </p:sp>
@@ -1518,9 +1518,9 @@
           <a:p>
             <a:fld id="{7A847CFC-816F-41D0-AAC0-9BF4FEBC753E}" type="datetimeFigureOut">
               <a:rPr lang="es-ES" smtClean="0"/>
-              <a:t>05/08/2012</a:t>
+              <a:t>06/08/2012</a:t>
             </a:fld>
-            <a:endParaRPr lang="es-ES"/>
+            <a:endParaRPr lang="es-ES" dirty="0"/>
           </a:p>
         </p:txBody>
       </p:sp>
@@ -1539,7 +1539,7 @@
           <a:bodyPr/>
           <a:lstStyle/>
           <a:p>
-            <a:endParaRPr lang="es-ES"/>
+            <a:endParaRPr lang="es-ES" dirty="0"/>
           </a:p>
         </p:txBody>
       </p:sp>
@@ -1562,7 +1562,7 @@
               <a:rPr lang="es-ES" smtClean="0"/>
               <a:t>‹Nº›</a:t>
             </a:fld>
-            <a:endParaRPr lang="es-ES"/>
+            <a:endParaRPr lang="es-ES" dirty="0"/>
           </a:p>
         </p:txBody>
       </p:sp>
@@ -1777,9 +1777,9 @@
           <a:p>
             <a:fld id="{7A847CFC-816F-41D0-AAC0-9BF4FEBC753E}" type="datetimeFigureOut">
               <a:rPr lang="es-ES" smtClean="0"/>
-              <a:t>05/08/2012</a:t>
+              <a:t>06/08/2012</a:t>
             </a:fld>
-            <a:endParaRPr lang="es-ES"/>
+            <a:endParaRPr lang="es-ES" dirty="0"/>
           </a:p>
         </p:txBody>
       </p:sp>
@@ -1798,7 +1798,7 @@
           <a:bodyPr/>
           <a:lstStyle/>
           <a:p>
-            <a:endParaRPr lang="es-ES"/>
+            <a:endParaRPr lang="es-ES" dirty="0"/>
           </a:p>
         </p:txBody>
       </p:sp>
@@ -1821,7 +1821,7 @@
               <a:rPr lang="es-ES" smtClean="0"/>
               <a:t>‹Nº›</a:t>
             </a:fld>
-            <a:endParaRPr lang="es-ES"/>
+            <a:endParaRPr lang="es-ES" dirty="0"/>
           </a:p>
         </p:txBody>
       </p:sp>
@@ -2181,9 +2181,9 @@
           <a:p>
             <a:fld id="{7A847CFC-816F-41D0-AAC0-9BF4FEBC753E}" type="datetimeFigureOut">
               <a:rPr lang="es-ES" smtClean="0"/>
-              <a:t>05/08/2012</a:t>
+              <a:t>06/08/2012</a:t>
             </a:fld>
-            <a:endParaRPr lang="es-ES"/>
+            <a:endParaRPr lang="es-ES" dirty="0"/>
           </a:p>
         </p:txBody>
       </p:sp>
@@ -2206,7 +2206,7 @@
               <a:rPr lang="es-ES" smtClean="0"/>
               <a:t>‹Nº›</a:t>
             </a:fld>
-            <a:endParaRPr lang="es-ES"/>
+            <a:endParaRPr lang="es-ES" dirty="0"/>
           </a:p>
         </p:txBody>
       </p:sp>
@@ -2225,7 +2225,7 @@
           <a:bodyPr rtlCol="0"/>
           <a:lstStyle/>
           <a:p>
-            <a:endParaRPr lang="es-ES"/>
+            <a:endParaRPr lang="es-ES" dirty="0"/>
           </a:p>
         </p:txBody>
       </p:sp>
@@ -2312,9 +2312,9 @@
           <a:p>
             <a:fld id="{7A847CFC-816F-41D0-AAC0-9BF4FEBC753E}" type="datetimeFigureOut">
               <a:rPr lang="es-ES" smtClean="0"/>
-              <a:t>05/08/2012</a:t>
+              <a:t>06/08/2012</a:t>
             </a:fld>
-            <a:endParaRPr lang="es-ES"/>
+            <a:endParaRPr lang="es-ES" dirty="0"/>
           </a:p>
         </p:txBody>
       </p:sp>
@@ -2338,7 +2338,7 @@
           <a:bodyPr/>
           <a:lstStyle/>
           <a:p>
-            <a:endParaRPr lang="es-ES"/>
+            <a:endParaRPr lang="es-ES" dirty="0"/>
           </a:p>
         </p:txBody>
       </p:sp>
@@ -2366,7 +2366,7 @@
               <a:rPr lang="es-ES" smtClean="0"/>
               <a:t>‹Nº›</a:t>
             </a:fld>
-            <a:endParaRPr lang="es-ES"/>
+            <a:endParaRPr lang="es-ES" dirty="0"/>
           </a:p>
         </p:txBody>
       </p:sp>
@@ -2412,9 +2412,9 @@
           <a:p>
             <a:fld id="{7A847CFC-816F-41D0-AAC0-9BF4FEBC753E}" type="datetimeFigureOut">
               <a:rPr lang="es-ES" smtClean="0"/>
-              <a:t>05/08/2012</a:t>
+              <a:t>06/08/2012</a:t>
             </a:fld>
-            <a:endParaRPr lang="es-ES"/>
+            <a:endParaRPr lang="es-ES" dirty="0"/>
           </a:p>
         </p:txBody>
       </p:sp>
@@ -2433,7 +2433,7 @@
           <a:bodyPr/>
           <a:lstStyle/>
           <a:p>
-            <a:endParaRPr lang="es-ES"/>
+            <a:endParaRPr lang="es-ES" dirty="0"/>
           </a:p>
         </p:txBody>
       </p:sp>
@@ -2456,7 +2456,7 @@
               <a:rPr lang="es-ES" smtClean="0"/>
               <a:t>‹Nº›</a:t>
             </a:fld>
-            <a:endParaRPr lang="es-ES"/>
+            <a:endParaRPr lang="es-ES" dirty="0"/>
           </a:p>
         </p:txBody>
       </p:sp>
@@ -2657,9 +2657,9 @@
           <a:p>
             <a:fld id="{7A847CFC-816F-41D0-AAC0-9BF4FEBC753E}" type="datetimeFigureOut">
               <a:rPr lang="es-ES" smtClean="0"/>
-              <a:t>05/08/2012</a:t>
+              <a:t>06/08/2012</a:t>
             </a:fld>
-            <a:endParaRPr lang="es-ES"/>
+            <a:endParaRPr lang="es-ES" dirty="0"/>
           </a:p>
         </p:txBody>
       </p:sp>
@@ -2678,7 +2678,7 @@
           <a:bodyPr/>
           <a:lstStyle/>
           <a:p>
-            <a:endParaRPr lang="es-ES"/>
+            <a:endParaRPr lang="es-ES" dirty="0"/>
           </a:p>
         </p:txBody>
       </p:sp>
@@ -2701,7 +2701,7 @@
               <a:rPr lang="es-ES" smtClean="0"/>
               <a:t>‹Nº›</a:t>
             </a:fld>
-            <a:endParaRPr lang="es-ES"/>
+            <a:endParaRPr lang="es-ES" dirty="0"/>
           </a:p>
         </p:txBody>
       </p:sp>
@@ -2817,7 +2817,7 @@
           </a:lstStyle>
           <a:p>
             <a:r>
-              <a:rPr kumimoji="0" lang="es-ES" smtClean="0"/>
+              <a:rPr kumimoji="0" lang="es-ES" dirty="0" smtClean="0"/>
               <a:t>Haga clic en el icono para agregar una imagen</a:t>
             </a:r>
             <a:endParaRPr kumimoji="0" lang="en-US" dirty="0"/>
@@ -2901,9 +2901,9 @@
           <a:p>
             <a:fld id="{7A847CFC-816F-41D0-AAC0-9BF4FEBC753E}" type="datetimeFigureOut">
               <a:rPr lang="es-ES" smtClean="0"/>
-              <a:t>05/08/2012</a:t>
+              <a:t>06/08/2012</a:t>
             </a:fld>
-            <a:endParaRPr lang="es-ES"/>
+            <a:endParaRPr lang="es-ES" dirty="0"/>
           </a:p>
         </p:txBody>
       </p:sp>
@@ -2922,7 +2922,7 @@
           <a:bodyPr/>
           <a:lstStyle/>
           <a:p>
-            <a:endParaRPr lang="es-ES"/>
+            <a:endParaRPr lang="es-ES" dirty="0"/>
           </a:p>
         </p:txBody>
       </p:sp>
@@ -2945,7 +2945,7 @@
               <a:rPr lang="es-ES" smtClean="0"/>
               <a:t>‹Nº›</a:t>
             </a:fld>
-            <a:endParaRPr lang="es-ES"/>
+            <a:endParaRPr lang="es-ES" dirty="0"/>
           </a:p>
         </p:txBody>
       </p:sp>
@@ -3023,7 +3023,7 @@
           <a:lstStyle/>
           <a:p>
             <a:pPr algn="ctr" eaLnBrk="1" latinLnBrk="0" hangingPunct="1"/>
-            <a:endParaRPr kumimoji="0" lang="en-US"/>
+            <a:endParaRPr kumimoji="0" lang="en-US" dirty="0"/>
           </a:p>
         </p:txBody>
       </p:sp>
@@ -3071,7 +3071,7 @@
           <a:lstStyle/>
           <a:p>
             <a:pPr algn="ctr" eaLnBrk="1" latinLnBrk="0" hangingPunct="1"/>
-            <a:endParaRPr kumimoji="0" lang="en-US"/>
+            <a:endParaRPr kumimoji="0" lang="en-US" dirty="0"/>
           </a:p>
         </p:txBody>
       </p:sp>
@@ -3119,7 +3119,7 @@
           <a:lstStyle/>
           <a:p>
             <a:pPr algn="ctr" eaLnBrk="1" latinLnBrk="0" hangingPunct="1"/>
-            <a:endParaRPr kumimoji="0" lang="en-US"/>
+            <a:endParaRPr kumimoji="0" lang="en-US" dirty="0"/>
           </a:p>
         </p:txBody>
       </p:sp>
@@ -3167,7 +3167,7 @@
           <a:lstStyle/>
           <a:p>
             <a:pPr algn="ctr" eaLnBrk="1" latinLnBrk="0" hangingPunct="1"/>
-            <a:endParaRPr kumimoji="0" lang="en-US"/>
+            <a:endParaRPr kumimoji="0" lang="en-US" dirty="0"/>
           </a:p>
         </p:txBody>
       </p:sp>
@@ -3215,7 +3215,7 @@
           <a:lstStyle/>
           <a:p>
             <a:pPr algn="ctr" eaLnBrk="1" latinLnBrk="0" hangingPunct="1"/>
-            <a:endParaRPr kumimoji="0" lang="en-US"/>
+            <a:endParaRPr kumimoji="0" lang="en-US" dirty="0"/>
           </a:p>
         </p:txBody>
       </p:sp>
@@ -3260,7 +3260,7 @@
           <a:lstStyle/>
           <a:p>
             <a:pPr algn="ctr" eaLnBrk="1" latinLnBrk="0" hangingPunct="1"/>
-            <a:endParaRPr kumimoji="0" lang="en-US"/>
+            <a:endParaRPr kumimoji="0" lang="en-US" dirty="0"/>
           </a:p>
         </p:txBody>
       </p:sp>
@@ -3305,7 +3305,7 @@
           <a:lstStyle/>
           <a:p>
             <a:pPr algn="ctr" eaLnBrk="1" latinLnBrk="0" hangingPunct="1"/>
-            <a:endParaRPr kumimoji="0" lang="en-US"/>
+            <a:endParaRPr kumimoji="0" lang="en-US" dirty="0"/>
           </a:p>
         </p:txBody>
       </p:sp>
@@ -3449,7 +3449,7 @@
           <a:lstStyle/>
           <a:p>
             <a:pPr algn="ctr" eaLnBrk="1" latinLnBrk="0" hangingPunct="1"/>
-            <a:endParaRPr kumimoji="0" lang="en-US"/>
+            <a:endParaRPr kumimoji="0" lang="en-US" dirty="0"/>
           </a:p>
         </p:txBody>
       </p:sp>
@@ -3497,7 +3497,7 @@
           <a:lstStyle/>
           <a:p>
             <a:pPr algn="ctr" eaLnBrk="1" latinLnBrk="0" hangingPunct="1"/>
-            <a:endParaRPr kumimoji="0" lang="en-US"/>
+            <a:endParaRPr kumimoji="0" lang="en-US" dirty="0"/>
           </a:p>
         </p:txBody>
       </p:sp>
@@ -3545,7 +3545,7 @@
           <a:lstStyle/>
           <a:p>
             <a:pPr algn="ctr" eaLnBrk="1" latinLnBrk="0" hangingPunct="1"/>
-            <a:endParaRPr kumimoji="0" lang="en-US"/>
+            <a:endParaRPr kumimoji="0" lang="en-US" dirty="0"/>
           </a:p>
         </p:txBody>
       </p:sp>
@@ -3725,9 +3725,9 @@
           <a:p>
             <a:fld id="{7A847CFC-816F-41D0-AAC0-9BF4FEBC753E}" type="datetimeFigureOut">
               <a:rPr lang="es-ES" smtClean="0"/>
-              <a:t>05/08/2012</a:t>
+              <a:t>06/08/2012</a:t>
             </a:fld>
-            <a:endParaRPr lang="es-ES"/>
+            <a:endParaRPr lang="es-ES" dirty="0"/>
           </a:p>
         </p:txBody>
       </p:sp>
@@ -3762,7 +3762,7 @@
             </a:lvl1pPr>
           </a:lstStyle>
           <a:p>
-            <a:endParaRPr lang="es-ES"/>
+            <a:endParaRPr lang="es-ES" dirty="0"/>
           </a:p>
         </p:txBody>
       </p:sp>
@@ -3801,7 +3801,7 @@
               <a:rPr lang="es-ES" smtClean="0"/>
               <a:t>‹Nº›</a:t>
             </a:fld>
-            <a:endParaRPr lang="es-ES"/>
+            <a:endParaRPr lang="es-ES" dirty="0"/>
           </a:p>
         </p:txBody>
       </p:sp>
@@ -4186,7 +4186,7 @@
             <p:ph idx="1"/>
             <p:extLst>
               <p:ext uri="{D42A27DB-BD31-4B8C-83A1-F6EECF244321}">
-                <p14:modId xmlns:p14="http://schemas.microsoft.com/office/powerpoint/2010/main" val="2409485110"/>
+                <p14:modId xmlns:p14="http://schemas.microsoft.com/office/powerpoint/2010/main" val="3170349351"/>
               </p:ext>
             </p:extLst>
           </p:nvPr>
@@ -4231,7 +4231,6 @@
                         <a:rPr lang="es-AR" dirty="0" smtClean="0"/>
                         <a:t>Desventajas</a:t>
                       </a:r>
-                      <a:endParaRPr lang="es-AR" dirty="0" smtClean="0"/>
                     </a:p>
                   </a:txBody>
                   <a:tcPr/>
@@ -4297,7 +4296,11 @@
                       </a:r>
                       <a:r>
                         <a:rPr lang="es-AR" sz="1400" baseline="0" dirty="0" smtClean="0"/>
-                        <a:t> sobre un error informado en un mail .</a:t>
+                        <a:t> sobre un error informado en un </a:t>
+                      </a:r>
+                      <a:r>
+                        <a:rPr lang="es-AR" sz="1400" baseline="0" dirty="0" smtClean="0"/>
+                        <a:t>mail.</a:t>
                       </a:r>
                       <a:endParaRPr lang="es-AR" sz="1400" dirty="0"/>
                     </a:p>
@@ -4314,7 +4317,15 @@
                       <a:pPr algn="l"/>
                       <a:r>
                         <a:rPr lang="es-AR" sz="1400" dirty="0" smtClean="0"/>
-                        <a:t>Ser parte  del proceso de desarrollo. </a:t>
+                        <a:t>Ser </a:t>
+                      </a:r>
+                      <a:r>
+                        <a:rPr lang="es-AR" sz="1400" dirty="0" smtClean="0"/>
+                        <a:t>parte </a:t>
+                      </a:r>
+                      <a:r>
+                        <a:rPr lang="es-AR" sz="1400" dirty="0" smtClean="0"/>
+                        <a:t>del proceso de desarrollo. </a:t>
                       </a:r>
                       <a:endParaRPr lang="es-AR" sz="1400" dirty="0"/>
                     </a:p>
@@ -4329,11 +4340,7 @@
                       <a:pPr algn="l"/>
                       <a:r>
                         <a:rPr lang="es-AR" sz="1400" dirty="0" smtClean="0"/>
-                        <a:t>Un error puede </a:t>
-                      </a:r>
-                      <a:r>
-                        <a:rPr lang="es-AR" sz="1400" dirty="0" smtClean="0"/>
-                        <a:t>bloquear las integraciones de las dependencias de la parte que da error.</a:t>
+                        <a:t>Un error puede bloquear las integraciones de las dependencias de la parte que da error.</a:t>
                       </a:r>
                       <a:endParaRPr lang="es-AR" sz="1400" dirty="0"/>
                     </a:p>
@@ -4349,12 +4356,8 @@
                     <a:p>
                       <a:pPr algn="l"/>
                       <a:r>
-                        <a:rPr lang="es-AR" sz="1400" dirty="0" err="1" smtClean="0"/>
-                        <a:t>Feedback</a:t>
-                      </a:r>
-                      <a:r>
                         <a:rPr lang="es-AR" sz="1400" dirty="0" smtClean="0"/>
-                        <a:t> del proyecto</a:t>
+                        <a:t>Feedback del proyecto</a:t>
                       </a:r>
                       <a:endParaRPr lang="es-AR" sz="1400" dirty="0"/>
                     </a:p>
@@ -4443,7 +4446,7 @@
                     <a:lstStyle/>
                     <a:p>
                       <a:pPr algn="ctr"/>
-                      <a:endParaRPr lang="es-AR"/>
+                      <a:endParaRPr lang="es-AR" dirty="0"/>
                     </a:p>
                   </a:txBody>
                   <a:tcPr/>
@@ -4458,7 +4461,11 @@
                       <a:pPr algn="l"/>
                       <a:r>
                         <a:rPr lang="es-AR" sz="1400" dirty="0" smtClean="0"/>
-                        <a:t>Resultados accesibles por parte de todos</a:t>
+                        <a:t>Resultados accesibles por parte de </a:t>
+                      </a:r>
+                      <a:r>
+                        <a:rPr lang="es-AR" sz="1400" dirty="0" smtClean="0"/>
+                        <a:t>todos.</a:t>
                       </a:r>
                       <a:endParaRPr lang="es-AR" sz="1400" dirty="0"/>
                     </a:p>
@@ -4812,7 +4819,15 @@
             </a:r>
             <a:r>
               <a:rPr lang="es-AR" dirty="0"/>
-              <a:t>cambios realizado a cada archivo así</a:t>
+              <a:t>cambios </a:t>
+            </a:r>
+            <a:r>
+              <a:rPr lang="es-AR" dirty="0" smtClean="0"/>
+              <a:t>realizados </a:t>
+            </a:r>
+            <a:r>
+              <a:rPr lang="es-AR" dirty="0"/>
+              <a:t>a cada archivo así</a:t>
             </a:r>
           </a:p>
           <a:p>
@@ -4835,8 +4850,13 @@
             </a:r>
             <a:r>
               <a:rPr lang="es-AR" dirty="0"/>
-              <a:t>y directorios nuevos</a:t>
-            </a:r>
+              <a:t>y directorios </a:t>
+            </a:r>
+            <a:r>
+              <a:rPr lang="es-AR" dirty="0" smtClean="0"/>
+              <a:t>nuevos.</a:t>
+            </a:r>
+            <a:endParaRPr lang="es-AR" dirty="0"/>
           </a:p>
           <a:p>
             <a:r>
@@ -4845,8 +4865,13 @@
             </a:r>
             <a:r>
               <a:rPr lang="es-AR" dirty="0"/>
-              <a:t>y directorios borrados</a:t>
-            </a:r>
+              <a:t>y directorios </a:t>
+            </a:r>
+            <a:r>
+              <a:rPr lang="es-AR" dirty="0" smtClean="0"/>
+              <a:t>borrados.</a:t>
+            </a:r>
+            <a:endParaRPr lang="es-AR" dirty="0"/>
           </a:p>
           <a:p>
             <a:r>
@@ -5083,14 +5108,14 @@
             <p:ph idx="1"/>
             <p:extLst>
               <p:ext uri="{D42A27DB-BD31-4B8C-83A1-F6EECF244321}">
-                <p14:modId xmlns:p14="http://schemas.microsoft.com/office/powerpoint/2010/main" val="3077164925"/>
+                <p14:modId xmlns:p14="http://schemas.microsoft.com/office/powerpoint/2010/main" val="2132312880"/>
               </p:ext>
             </p:extLst>
           </p:nvPr>
         </p:nvGraphicFramePr>
         <p:xfrm>
           <a:off x="457200" y="692696"/>
-          <a:ext cx="8229600" cy="5883765"/>
+          <a:ext cx="8229600" cy="5600415"/>
         </p:xfrm>
         <a:graphic>
           <a:graphicData uri="http://schemas.openxmlformats.org/drawingml/2006/table">
@@ -5187,14 +5212,24 @@
                     <a:lstStyle/>
                     <a:p>
                       <a:r>
-                        <a:rPr lang="es-AR" sz="1400" dirty="0" smtClean="0"/>
-                        <a:t>Servidor</a:t>
+                        <a:rPr kumimoji="0" lang="es-AR" sz="1400" kern="1200" dirty="0" smtClean="0">
+                          <a:solidFill>
+                            <a:schemeClr val="dk1"/>
+                          </a:solidFill>
+                          <a:latin typeface="+mn-lt"/>
+                          <a:ea typeface="+mn-ea"/>
+                          <a:cs typeface="+mn-cs"/>
+                        </a:rPr>
+                        <a:t>Servidor de manejo centralizado.</a:t>
                       </a:r>
-                      <a:r>
-                        <a:rPr lang="es-AR" sz="1400" baseline="0" dirty="0" smtClean="0"/>
-                        <a:t> de manejo centralizado.</a:t>
-                      </a:r>
-                      <a:endParaRPr lang="es-AR" sz="1400" dirty="0"/>
+                      <a:endParaRPr kumimoji="0" lang="es-AR" sz="1400" kern="1200" dirty="0">
+                        <a:solidFill>
+                          <a:schemeClr val="dk1"/>
+                        </a:solidFill>
+                        <a:latin typeface="+mn-lt"/>
+                        <a:ea typeface="+mn-ea"/>
+                        <a:cs typeface="+mn-cs"/>
+                      </a:endParaRPr>
                     </a:p>
                   </a:txBody>
                   <a:tcPr/>
@@ -5205,10 +5240,24 @@
                     <a:lstStyle/>
                     <a:p>
                       <a:r>
-                        <a:rPr lang="es-AR" sz="1400" dirty="0" smtClean="0"/>
+                        <a:rPr kumimoji="0" lang="es-AR" sz="1400" kern="1200" dirty="0" smtClean="0">
+                          <a:solidFill>
+                            <a:schemeClr val="dk1"/>
+                          </a:solidFill>
+                          <a:latin typeface="+mn-lt"/>
+                          <a:ea typeface="+mn-ea"/>
+                          <a:cs typeface="+mn-cs"/>
+                        </a:rPr>
                         <a:t>Servidor de manejo distribuido.</a:t>
                       </a:r>
-                      <a:endParaRPr lang="es-AR" sz="1400" dirty="0"/>
+                      <a:endParaRPr kumimoji="0" lang="es-AR" sz="1400" kern="1200" dirty="0">
+                        <a:solidFill>
+                          <a:schemeClr val="dk1"/>
+                        </a:solidFill>
+                        <a:latin typeface="+mn-lt"/>
+                        <a:ea typeface="+mn-ea"/>
+                        <a:cs typeface="+mn-cs"/>
+                      </a:endParaRPr>
                     </a:p>
                   </a:txBody>
                   <a:tcPr/>
@@ -5235,10 +5284,35 @@
                     <a:lstStyle/>
                     <a:p>
                       <a:r>
-                        <a:rPr lang="es-AR" sz="1400" dirty="0" smtClean="0"/>
-                        <a:t>Versionado de directorios</a:t>
+                        <a:rPr kumimoji="0" lang="es-AR" sz="1400" kern="1200" dirty="0" smtClean="0">
+                          <a:solidFill>
+                            <a:schemeClr val="dk1"/>
+                          </a:solidFill>
+                          <a:latin typeface="+mn-lt"/>
+                          <a:ea typeface="+mn-ea"/>
+                          <a:cs typeface="+mn-cs"/>
+                        </a:rPr>
+                        <a:t>Versionado de </a:t>
                       </a:r>
-                      <a:endParaRPr lang="es-AR" sz="1400" dirty="0"/>
+                      <a:r>
+                        <a:rPr kumimoji="0" lang="es-AR" sz="1400" kern="1200" dirty="0" smtClean="0">
+                          <a:solidFill>
+                            <a:schemeClr val="dk1"/>
+                          </a:solidFill>
+                          <a:latin typeface="+mn-lt"/>
+                          <a:ea typeface="+mn-ea"/>
+                          <a:cs typeface="+mn-cs"/>
+                        </a:rPr>
+                        <a:t>directorios y archivos.</a:t>
+                      </a:r>
+                      <a:endParaRPr kumimoji="0" lang="es-AR" sz="1400" kern="1200" dirty="0">
+                        <a:solidFill>
+                          <a:schemeClr val="dk1"/>
+                        </a:solidFill>
+                        <a:latin typeface="+mn-lt"/>
+                        <a:ea typeface="+mn-ea"/>
+                        <a:cs typeface="+mn-cs"/>
+                      </a:endParaRPr>
                     </a:p>
                   </a:txBody>
                   <a:tcPr/>
@@ -5248,7 +5322,25 @@
                     <a:bodyPr/>
                     <a:lstStyle/>
                     <a:p>
-                      <a:endParaRPr lang="es-AR" dirty="0"/>
+                      <a:r>
+                        <a:rPr kumimoji="0" lang="es-AR" sz="1400" kern="1200" dirty="0" smtClean="0">
+                          <a:solidFill>
+                            <a:schemeClr val="dk1"/>
+                          </a:solidFill>
+                          <a:latin typeface="+mn-lt"/>
+                          <a:ea typeface="+mn-ea"/>
+                          <a:cs typeface="+mn-cs"/>
+                        </a:rPr>
+                        <a:t>Versionado de archivos.</a:t>
+                      </a:r>
+                      <a:endParaRPr kumimoji="0" lang="es-AR" sz="1400" kern="1200" dirty="0">
+                        <a:solidFill>
+                          <a:schemeClr val="dk1"/>
+                        </a:solidFill>
+                        <a:latin typeface="+mn-lt"/>
+                        <a:ea typeface="+mn-ea"/>
+                        <a:cs typeface="+mn-cs"/>
+                      </a:endParaRPr>
                     </a:p>
                   </a:txBody>
                   <a:tcPr/>
@@ -5307,7 +5399,14 @@
                     <a:bodyPr/>
                     <a:lstStyle/>
                     <a:p>
-                      <a:endParaRPr lang="es-AR"/>
+                      <a:endParaRPr kumimoji="0" lang="es-AR" sz="1400" kern="1200" dirty="0">
+                        <a:solidFill>
+                          <a:schemeClr val="dk1"/>
+                        </a:solidFill>
+                        <a:latin typeface="+mn-lt"/>
+                        <a:ea typeface="+mn-ea"/>
+                        <a:cs typeface="+mn-cs"/>
+                      </a:endParaRPr>
                     </a:p>
                   </a:txBody>
                   <a:tcPr/>
@@ -5317,7 +5416,14 @@
                     <a:bodyPr/>
                     <a:lstStyle/>
                     <a:p>
-                      <a:endParaRPr lang="es-AR"/>
+                      <a:endParaRPr kumimoji="0" lang="es-AR" sz="1400" kern="1200" dirty="0">
+                        <a:solidFill>
+                          <a:schemeClr val="dk1"/>
+                        </a:solidFill>
+                        <a:latin typeface="+mn-lt"/>
+                        <a:ea typeface="+mn-ea"/>
+                        <a:cs typeface="+mn-cs"/>
+                      </a:endParaRPr>
                     </a:p>
                   </a:txBody>
                   <a:tcPr/>
@@ -5376,7 +5482,116 @@
                     <a:bodyPr/>
                     <a:lstStyle/>
                     <a:p>
-                      <a:endParaRPr lang="es-AR"/>
+                      <a:r>
+                        <a:rPr kumimoji="0" lang="es-AR" sz="1400" kern="1200" dirty="0" smtClean="0">
+                          <a:solidFill>
+                            <a:schemeClr val="dk1"/>
+                          </a:solidFill>
+                          <a:latin typeface="+mn-lt"/>
+                          <a:ea typeface="+mn-ea"/>
+                          <a:cs typeface="+mn-cs"/>
+                        </a:rPr>
+                        <a:t>svn help</a:t>
+                      </a:r>
+                    </a:p>
+                    <a:p>
+                      <a:r>
+                        <a:rPr kumimoji="0" lang="es-AR" sz="1400" kern="1200" dirty="0" smtClean="0">
+                          <a:solidFill>
+                            <a:schemeClr val="dk1"/>
+                          </a:solidFill>
+                          <a:latin typeface="+mn-lt"/>
+                          <a:ea typeface="+mn-ea"/>
+                          <a:cs typeface="+mn-cs"/>
+                        </a:rPr>
+                        <a:t>svn checkout</a:t>
+                      </a:r>
+                    </a:p>
+                    <a:p>
+                      <a:r>
+                        <a:rPr kumimoji="0" lang="es-AR" sz="1400" kern="1200" dirty="0" smtClean="0">
+                          <a:solidFill>
+                            <a:schemeClr val="dk1"/>
+                          </a:solidFill>
+                          <a:latin typeface="+mn-lt"/>
+                          <a:ea typeface="+mn-ea"/>
+                          <a:cs typeface="+mn-cs"/>
+                        </a:rPr>
+                        <a:t>svn update</a:t>
+                      </a:r>
+                    </a:p>
+                    <a:p>
+                      <a:r>
+                        <a:rPr kumimoji="0" lang="es-AR" sz="1400" kern="1200" dirty="0" smtClean="0">
+                          <a:solidFill>
+                            <a:schemeClr val="dk1"/>
+                          </a:solidFill>
+                          <a:latin typeface="+mn-lt"/>
+                          <a:ea typeface="+mn-ea"/>
+                          <a:cs typeface="+mn-cs"/>
+                        </a:rPr>
+                        <a:t>svn add</a:t>
+                      </a:r>
+                    </a:p>
+                    <a:p>
+                      <a:r>
+                        <a:rPr kumimoji="0" lang="es-AR" sz="1400" kern="1200" dirty="0" smtClean="0">
+                          <a:solidFill>
+                            <a:schemeClr val="dk1"/>
+                          </a:solidFill>
+                          <a:latin typeface="+mn-lt"/>
+                          <a:ea typeface="+mn-ea"/>
+                          <a:cs typeface="+mn-cs"/>
+                        </a:rPr>
+                        <a:t>svn delete</a:t>
+                      </a:r>
+                    </a:p>
+                    <a:p>
+                      <a:r>
+                        <a:rPr kumimoji="0" lang="es-AR" sz="1400" kern="1200" dirty="0" smtClean="0">
+                          <a:solidFill>
+                            <a:schemeClr val="dk1"/>
+                          </a:solidFill>
+                          <a:latin typeface="+mn-lt"/>
+                          <a:ea typeface="+mn-ea"/>
+                          <a:cs typeface="+mn-cs"/>
+                        </a:rPr>
+                        <a:t>svn merge</a:t>
+                      </a:r>
+                    </a:p>
+                    <a:p>
+                      <a:r>
+                        <a:rPr kumimoji="0" lang="es-AR" sz="1400" kern="1200" dirty="0" smtClean="0">
+                          <a:solidFill>
+                            <a:schemeClr val="dk1"/>
+                          </a:solidFill>
+                          <a:latin typeface="+mn-lt"/>
+                          <a:ea typeface="+mn-ea"/>
+                          <a:cs typeface="+mn-cs"/>
+                        </a:rPr>
+                        <a:t>svn diff</a:t>
+                      </a:r>
+                    </a:p>
+                    <a:p>
+                      <a:r>
+                        <a:rPr kumimoji="0" lang="es-AR" sz="1400" kern="1200" dirty="0" smtClean="0">
+                          <a:solidFill>
+                            <a:schemeClr val="dk1"/>
+                          </a:solidFill>
+                          <a:latin typeface="+mn-lt"/>
+                          <a:ea typeface="+mn-ea"/>
+                          <a:cs typeface="+mn-cs"/>
+                        </a:rPr>
+                        <a:t>svn commit </a:t>
+                      </a:r>
+                      <a:endParaRPr kumimoji="0" lang="es-AR" sz="1400" kern="1200" dirty="0">
+                        <a:solidFill>
+                          <a:schemeClr val="dk1"/>
+                        </a:solidFill>
+                        <a:latin typeface="+mn-lt"/>
+                        <a:ea typeface="+mn-ea"/>
+                        <a:cs typeface="+mn-cs"/>
+                      </a:endParaRPr>
                     </a:p>
                   </a:txBody>
                   <a:tcPr/>
@@ -5386,7 +5601,142 @@
                     <a:bodyPr/>
                     <a:lstStyle/>
                     <a:p>
-                      <a:endParaRPr lang="es-AR"/>
+                      <a:r>
+                        <a:rPr kumimoji="0" lang="es-AR" sz="1400" kern="1200" dirty="0" smtClean="0">
+                          <a:solidFill>
+                            <a:schemeClr val="dk1"/>
+                          </a:solidFill>
+                          <a:latin typeface="+mn-lt"/>
+                          <a:ea typeface="+mn-ea"/>
+                          <a:cs typeface="+mn-cs"/>
+                        </a:rPr>
+                        <a:t>hg help</a:t>
+                      </a:r>
+                    </a:p>
+                    <a:p>
+                      <a:r>
+                        <a:rPr kumimoji="0" lang="es-AR" sz="1400" kern="1200" dirty="0" smtClean="0">
+                          <a:solidFill>
+                            <a:schemeClr val="dk1"/>
+                          </a:solidFill>
+                          <a:latin typeface="+mn-lt"/>
+                          <a:ea typeface="+mn-ea"/>
+                          <a:cs typeface="+mn-cs"/>
+                        </a:rPr>
+                        <a:t>hg clone </a:t>
+                      </a:r>
+                    </a:p>
+                    <a:p>
+                      <a:r>
+                        <a:rPr kumimoji="0" lang="es-AR" sz="1400" kern="1200" dirty="0" smtClean="0">
+                          <a:solidFill>
+                            <a:schemeClr val="dk1"/>
+                          </a:solidFill>
+                          <a:latin typeface="+mn-lt"/>
+                          <a:ea typeface="+mn-ea"/>
+                          <a:cs typeface="+mn-cs"/>
+                        </a:rPr>
+                        <a:t>hg update </a:t>
+                      </a:r>
+                    </a:p>
+                    <a:p>
+                      <a:r>
+                        <a:rPr kumimoji="0" lang="es-AR" sz="1400" kern="1200" dirty="0" smtClean="0">
+                          <a:solidFill>
+                            <a:schemeClr val="dk1"/>
+                          </a:solidFill>
+                          <a:latin typeface="+mn-lt"/>
+                          <a:ea typeface="+mn-ea"/>
+                          <a:cs typeface="+mn-cs"/>
+                        </a:rPr>
+                        <a:t>hg add</a:t>
+                      </a:r>
+                    </a:p>
+                    <a:p>
+                      <a:r>
+                        <a:rPr kumimoji="0" lang="es-AR" sz="1400" kern="1200" dirty="0" smtClean="0">
+                          <a:solidFill>
+                            <a:schemeClr val="dk1"/>
+                          </a:solidFill>
+                          <a:latin typeface="+mn-lt"/>
+                          <a:ea typeface="+mn-ea"/>
+                          <a:cs typeface="+mn-cs"/>
+                        </a:rPr>
+                        <a:t>hg remove</a:t>
+                      </a:r>
+                    </a:p>
+                    <a:p>
+                      <a:r>
+                        <a:rPr kumimoji="0" lang="es-AR" sz="1400" kern="1200" dirty="0" smtClean="0">
+                          <a:solidFill>
+                            <a:schemeClr val="dk1"/>
+                          </a:solidFill>
+                          <a:latin typeface="+mn-lt"/>
+                          <a:ea typeface="+mn-ea"/>
+                          <a:cs typeface="+mn-cs"/>
+                        </a:rPr>
+                        <a:t>hg merge</a:t>
+                      </a:r>
+                    </a:p>
+                    <a:p>
+                      <a:r>
+                        <a:rPr kumimoji="0" lang="es-AR" sz="1400" kern="1200" dirty="0" smtClean="0">
+                          <a:solidFill>
+                            <a:schemeClr val="dk1"/>
+                          </a:solidFill>
+                          <a:latin typeface="+mn-lt"/>
+                          <a:ea typeface="+mn-ea"/>
+                          <a:cs typeface="+mn-cs"/>
+                        </a:rPr>
+                        <a:t>hg diff </a:t>
+                      </a:r>
+                    </a:p>
+                    <a:p>
+                      <a:r>
+                        <a:rPr kumimoji="0" lang="es-AR" sz="1400" kern="1200" dirty="0" smtClean="0">
+                          <a:solidFill>
+                            <a:schemeClr val="dk1"/>
+                          </a:solidFill>
+                          <a:latin typeface="+mn-lt"/>
+                          <a:ea typeface="+mn-ea"/>
+                          <a:cs typeface="+mn-cs"/>
+                        </a:rPr>
+                        <a:t>hg commit</a:t>
+                      </a:r>
+                    </a:p>
+                    <a:p>
+                      <a:r>
+                        <a:rPr kumimoji="0" lang="es-AR" sz="1400" kern="1200" dirty="0" smtClean="0">
+                          <a:solidFill>
+                            <a:schemeClr val="dk1"/>
+                          </a:solidFill>
+                          <a:latin typeface="+mn-lt"/>
+                          <a:ea typeface="+mn-ea"/>
+                          <a:cs typeface="+mn-cs"/>
+                        </a:rPr>
+                        <a:t>hg push </a:t>
+                      </a:r>
+                    </a:p>
+                    <a:p>
+                      <a:r>
+                        <a:rPr kumimoji="0" lang="es-AR" sz="1400" kern="1200" dirty="0" smtClean="0">
+                          <a:solidFill>
+                            <a:schemeClr val="dk1"/>
+                          </a:solidFill>
+                          <a:latin typeface="+mn-lt"/>
+                          <a:ea typeface="+mn-ea"/>
+                          <a:cs typeface="+mn-cs"/>
+                        </a:rPr>
+                        <a:t>hg pull </a:t>
+                      </a:r>
+                      <a:endParaRPr kumimoji="0" lang="es-AR" sz="1400" kern="1200" dirty="0">
+                        <a:solidFill>
+                          <a:schemeClr val="dk1"/>
+                        </a:solidFill>
+                        <a:latin typeface="+mn-lt"/>
+                        <a:ea typeface="+mn-ea"/>
+                        <a:cs typeface="+mn-cs"/>
+                      </a:endParaRPr>
                     </a:p>
                   </a:txBody>
                   <a:tcPr/>
@@ -5445,7 +5795,14 @@
                     <a:bodyPr/>
                     <a:lstStyle/>
                     <a:p>
-                      <a:endParaRPr lang="es-AR"/>
+                      <a:endParaRPr kumimoji="0" lang="es-AR" sz="1400" kern="1200" dirty="0">
+                        <a:solidFill>
+                          <a:schemeClr val="dk1"/>
+                        </a:solidFill>
+                        <a:latin typeface="+mn-lt"/>
+                        <a:ea typeface="+mn-ea"/>
+                        <a:cs typeface="+mn-cs"/>
+                      </a:endParaRPr>
                     </a:p>
                   </a:txBody>
                   <a:tcPr/>
@@ -5455,163 +5812,14 @@
                     <a:bodyPr/>
                     <a:lstStyle/>
                     <a:p>
-                      <a:endParaRPr lang="es-AR"/>
-                    </a:p>
-                  </a:txBody>
-                  <a:tcPr/>
-                </a:tc>
-              </a:tr>
-              <a:tr h="675075">
-                <a:tc>
-                  <a:txBody>
-                    <a:bodyPr/>
-                    <a:lstStyle/>
-                    <a:p>
-                      <a:pPr marL="0" marR="0" lvl="0" indent="0" algn="l" defTabSz="914400" rtl="0" eaLnBrk="1" fontAlgn="auto" latinLnBrk="0" hangingPunct="1">
-                        <a:lnSpc>
-                          <a:spcPct val="100000"/>
-                        </a:lnSpc>
-                        <a:spcBef>
-                          <a:spcPts val="0"/>
-                        </a:spcBef>
-                        <a:spcAft>
-                          <a:spcPts val="0"/>
-                        </a:spcAft>
-                        <a:buClrTx/>
-                        <a:buSzTx/>
-                        <a:buFontTx/>
-                        <a:buNone/>
-                        <a:tabLst/>
-                        <a:defRPr/>
-                      </a:pPr>
-                      <a:r>
-                        <a:rPr kumimoji="0" lang="es-ES" sz="1400" kern="1200" dirty="0" smtClean="0">
-                          <a:solidFill>
-                            <a:schemeClr val="dk1"/>
-                          </a:solidFill>
-                          <a:effectLst/>
-                          <a:latin typeface="+mn-lt"/>
-                          <a:ea typeface="+mn-ea"/>
-                          <a:cs typeface="+mn-cs"/>
-                        </a:rPr>
-                        <a:t>Control de acceso </a:t>
-                      </a:r>
-                      <a:endParaRPr kumimoji="0" lang="es-AR" sz="1400" kern="1200" dirty="0" smtClean="0">
+                      <a:endParaRPr kumimoji="0" lang="es-AR" sz="1400" kern="1200" dirty="0">
                         <a:solidFill>
                           <a:schemeClr val="dk1"/>
                         </a:solidFill>
-                        <a:effectLst/>
                         <a:latin typeface="+mn-lt"/>
                         <a:ea typeface="+mn-ea"/>
                         <a:cs typeface="+mn-cs"/>
                       </a:endParaRPr>
-                    </a:p>
-                  </a:txBody>
-                  <a:tcPr/>
-                </a:tc>
-                <a:tc>
-                  <a:txBody>
-                    <a:bodyPr/>
-                    <a:lstStyle/>
-                    <a:p>
-                      <a:endParaRPr lang="es-AR" dirty="0"/>
-                    </a:p>
-                  </a:txBody>
-                  <a:tcPr/>
-                </a:tc>
-                <a:tc>
-                  <a:txBody>
-                    <a:bodyPr/>
-                    <a:lstStyle/>
-                    <a:p>
-                      <a:r>
-                        <a:rPr lang="es-AR" sz="1400" dirty="0" smtClean="0"/>
-                        <a:t>Con una cuenta SSH compartida.</a:t>
-                      </a:r>
-                    </a:p>
-                    <a:p>
-                      <a:r>
-                        <a:rPr lang="es-AR" sz="1400" dirty="0" smtClean="0"/>
-                        <a:t>Con un servidor apache con soporte para el protocolo HTTPS y scripts .</a:t>
-                      </a:r>
-                      <a:r>
-                        <a:rPr lang="es-AR" sz="1400" dirty="0" err="1" smtClean="0"/>
-                        <a:t>cgi</a:t>
-                      </a:r>
-                      <a:r>
-                        <a:rPr lang="es-AR" sz="1400" dirty="0" smtClean="0"/>
-                        <a:t> Con un grupo de usuarios del sistema de archivos.</a:t>
-                      </a:r>
-                      <a:endParaRPr lang="es-AR" sz="1400" dirty="0"/>
-                    </a:p>
-                  </a:txBody>
-                  <a:tcPr/>
-                </a:tc>
-              </a:tr>
-              <a:tr h="675075">
-                <a:tc>
-                  <a:txBody>
-                    <a:bodyPr/>
-                    <a:lstStyle/>
-                    <a:p>
-                      <a:pPr marL="0" marR="0" lvl="0" indent="0" algn="l" defTabSz="914400" rtl="0" eaLnBrk="1" fontAlgn="auto" latinLnBrk="0" hangingPunct="1">
-                        <a:lnSpc>
-                          <a:spcPct val="100000"/>
-                        </a:lnSpc>
-                        <a:spcBef>
-                          <a:spcPts val="0"/>
-                        </a:spcBef>
-                        <a:spcAft>
-                          <a:spcPts val="0"/>
-                        </a:spcAft>
-                        <a:buClrTx/>
-                        <a:buSzTx/>
-                        <a:buFontTx/>
-                        <a:buNone/>
-                        <a:tabLst/>
-                        <a:defRPr/>
-                      </a:pPr>
-                      <a:r>
-                        <a:rPr kumimoji="0" lang="es-ES" sz="1400" kern="1200" dirty="0" smtClean="0">
-                          <a:solidFill>
-                            <a:schemeClr val="dk1"/>
-                          </a:solidFill>
-                          <a:effectLst/>
-                          <a:latin typeface="+mn-lt"/>
-                          <a:ea typeface="+mn-ea"/>
-                          <a:cs typeface="+mn-cs"/>
-                        </a:rPr>
-                        <a:t>Control de sincronización</a:t>
-                      </a:r>
-                      <a:endParaRPr kumimoji="0" lang="es-AR" sz="1400" kern="1200" dirty="0" smtClean="0">
-                        <a:solidFill>
-                          <a:schemeClr val="dk1"/>
-                        </a:solidFill>
-                        <a:effectLst/>
-                        <a:latin typeface="+mn-lt"/>
-                        <a:ea typeface="+mn-ea"/>
-                        <a:cs typeface="+mn-cs"/>
-                      </a:endParaRPr>
-                    </a:p>
-                  </a:txBody>
-                  <a:tcPr/>
-                </a:tc>
-                <a:tc>
-                  <a:txBody>
-                    <a:bodyPr/>
-                    <a:lstStyle/>
-                    <a:p>
-                      <a:endParaRPr lang="es-AR"/>
-                    </a:p>
-                  </a:txBody>
-                  <a:tcPr/>
-                </a:tc>
-                <a:tc>
-                  <a:txBody>
-                    <a:bodyPr/>
-                    <a:lstStyle/>
-                    <a:p>
-                      <a:endParaRPr lang="es-AR" dirty="0"/>
                     </a:p>
                   </a:txBody>
                   <a:tcPr/>
@@ -5661,14 +5869,14 @@
             <p:ph idx="1"/>
             <p:extLst>
               <p:ext uri="{D42A27DB-BD31-4B8C-83A1-F6EECF244321}">
-                <p14:modId xmlns:p14="http://schemas.microsoft.com/office/powerpoint/2010/main" val="3759756942"/>
+                <p14:modId xmlns:p14="http://schemas.microsoft.com/office/powerpoint/2010/main" val="1773926251"/>
               </p:ext>
             </p:extLst>
           </p:nvPr>
         </p:nvGraphicFramePr>
         <p:xfrm>
           <a:off x="457200" y="692696"/>
-          <a:ext cx="8229600" cy="5400600"/>
+          <a:ext cx="8229600" cy="4285260"/>
         </p:xfrm>
         <a:graphic>
           <a:graphicData uri="http://schemas.openxmlformats.org/drawingml/2006/table">
@@ -5726,11 +5934,44 @@
                     <a:bodyPr/>
                     <a:lstStyle/>
                     <a:p>
+                      <a:pPr marL="0" marR="0" lvl="0" indent="0" algn="l" defTabSz="914400" rtl="0" eaLnBrk="1" fontAlgn="auto" latinLnBrk="0" hangingPunct="1">
+                        <a:lnSpc>
+                          <a:spcPct val="100000"/>
+                        </a:lnSpc>
+                        <a:spcBef>
+                          <a:spcPts val="0"/>
+                        </a:spcBef>
+                        <a:spcAft>
+                          <a:spcPts val="0"/>
+                        </a:spcAft>
+                        <a:buClrTx/>
+                        <a:buSzTx/>
+                        <a:buFontTx/>
+                        <a:buNone/>
+                        <a:tabLst/>
+                        <a:defRPr/>
+                      </a:pPr>
                       <a:r>
-                        <a:rPr lang="es-AR" sz="1400" dirty="0" smtClean="0"/>
-                        <a:t>Cliente</a:t>
+                        <a:rPr kumimoji="0" lang="es-ES" sz="1400" kern="1200" dirty="0" smtClean="0">
+                          <a:solidFill>
+                            <a:schemeClr val="dk1"/>
+                          </a:solidFill>
+                          <a:effectLst/>
+                          <a:latin typeface="+mn-lt"/>
+                          <a:ea typeface="+mn-ea"/>
+                          <a:cs typeface="+mn-cs"/>
+                        </a:rPr>
+                        <a:t>Control de acceso </a:t>
                       </a:r>
-                      <a:endParaRPr lang="es-AR" sz="1400" dirty="0"/>
+                      <a:endParaRPr kumimoji="0" lang="es-AR" sz="1400" kern="1200" dirty="0" smtClean="0">
+                        <a:solidFill>
+                          <a:schemeClr val="dk1"/>
+                        </a:solidFill>
+                        <a:effectLst/>
+                        <a:latin typeface="+mn-lt"/>
+                        <a:ea typeface="+mn-ea"/>
+                        <a:cs typeface="+mn-cs"/>
+                      </a:endParaRPr>
                     </a:p>
                   </a:txBody>
                   <a:tcPr/>
@@ -5741,18 +5982,24 @@
                     <a:lstStyle/>
                     <a:p>
                       <a:r>
-                        <a:rPr lang="es-AR" sz="1400" dirty="0" err="1" smtClean="0"/>
-                        <a:t>Tortoise</a:t>
+                        <a:rPr kumimoji="0" lang="es-AR" sz="1400" kern="1200" noProof="0" dirty="0" smtClean="0">
+                          <a:solidFill>
+                            <a:schemeClr val="dk1"/>
+                          </a:solidFill>
+                          <a:latin typeface="+mn-lt"/>
+                          <a:ea typeface="+mn-ea"/>
+                          <a:cs typeface="+mn-cs"/>
+                        </a:rPr>
+                        <a:t>Con un servidor apache con soporte para el protocolo HTTPS.</a:t>
                       </a:r>
-                      <a:r>
-                        <a:rPr lang="es-AR" sz="1400" baseline="0" dirty="0" smtClean="0"/>
-                        <a:t> </a:t>
-                      </a:r>
-                      <a:r>
-                        <a:rPr lang="es-AR" sz="1400" baseline="0" dirty="0" err="1" smtClean="0"/>
-                        <a:t>svn</a:t>
-                      </a:r>
-                      <a:endParaRPr lang="es-AR" sz="1400" dirty="0"/>
+                      <a:endParaRPr kumimoji="0" lang="es-AR" sz="1400" kern="1200" dirty="0">
+                        <a:solidFill>
+                          <a:schemeClr val="dk1"/>
+                        </a:solidFill>
+                        <a:latin typeface="+mn-lt"/>
+                        <a:ea typeface="+mn-ea"/>
+                        <a:cs typeface="+mn-cs"/>
+                      </a:endParaRPr>
                     </a:p>
                   </a:txBody>
                   <a:tcPr/>
@@ -5763,14 +6010,192 @@
                     <a:lstStyle/>
                     <a:p>
                       <a:r>
-                        <a:rPr lang="es-AR" sz="1400" dirty="0" err="1" smtClean="0"/>
-                        <a:t>Tortoise</a:t>
+                        <a:rPr kumimoji="0" lang="es-AR" sz="1400" kern="1200" dirty="0" smtClean="0">
+                          <a:solidFill>
+                            <a:schemeClr val="dk1"/>
+                          </a:solidFill>
+                          <a:latin typeface="+mn-lt"/>
+                          <a:ea typeface="+mn-ea"/>
+                          <a:cs typeface="+mn-cs"/>
+                        </a:rPr>
+                        <a:t>Con una cuenta SSH compartida.</a:t>
                       </a:r>
+                    </a:p>
+                    <a:p>
+                      <a:r>
+                        <a:rPr kumimoji="0" lang="es-AR" sz="1400" kern="1200" dirty="0" smtClean="0">
+                          <a:solidFill>
+                            <a:schemeClr val="dk1"/>
+                          </a:solidFill>
+                          <a:latin typeface="+mn-lt"/>
+                          <a:ea typeface="+mn-ea"/>
+                          <a:cs typeface="+mn-cs"/>
+                        </a:rPr>
+                        <a:t>Con un servidor apache con soporte para el protocolo HTTPS y scripts .cgi Con un grupo de usuarios del sistema de archivos.</a:t>
+                      </a:r>
+                      <a:endParaRPr kumimoji="0" lang="es-AR" sz="1400" kern="1200" dirty="0">
+                        <a:solidFill>
+                          <a:schemeClr val="dk1"/>
+                        </a:solidFill>
+                        <a:latin typeface="+mn-lt"/>
+                        <a:ea typeface="+mn-ea"/>
+                        <a:cs typeface="+mn-cs"/>
+                      </a:endParaRPr>
+                    </a:p>
+                  </a:txBody>
+                  <a:tcPr/>
+                </a:tc>
+              </a:tr>
+              <a:tr h="675075">
+                <a:tc>
+                  <a:txBody>
+                    <a:bodyPr/>
+                    <a:lstStyle/>
+                    <a:p>
+                      <a:pPr marL="0" marR="0" lvl="0" indent="0" algn="l" defTabSz="914400" rtl="0" eaLnBrk="1" fontAlgn="auto" latinLnBrk="0" hangingPunct="1">
+                        <a:lnSpc>
+                          <a:spcPct val="100000"/>
+                        </a:lnSpc>
+                        <a:spcBef>
+                          <a:spcPts val="0"/>
+                        </a:spcBef>
+                        <a:spcAft>
+                          <a:spcPts val="0"/>
+                        </a:spcAft>
+                        <a:buClrTx/>
+                        <a:buSzTx/>
+                        <a:buFontTx/>
+                        <a:buNone/>
+                        <a:tabLst/>
+                        <a:defRPr/>
+                      </a:pPr>
+                      <a:r>
+                        <a:rPr kumimoji="0" lang="es-ES" sz="1400" kern="1200" dirty="0" smtClean="0">
+                          <a:solidFill>
+                            <a:schemeClr val="dk1"/>
+                          </a:solidFill>
+                          <a:effectLst/>
+                          <a:latin typeface="+mn-lt"/>
+                          <a:ea typeface="+mn-ea"/>
+                          <a:cs typeface="+mn-cs"/>
+                        </a:rPr>
+                        <a:t>Control de sincronización</a:t>
+                      </a:r>
+                      <a:endParaRPr kumimoji="0" lang="es-AR" sz="1400" kern="1200" dirty="0" smtClean="0">
+                        <a:solidFill>
+                          <a:schemeClr val="dk1"/>
+                        </a:solidFill>
+                        <a:effectLst/>
+                        <a:latin typeface="+mn-lt"/>
+                        <a:ea typeface="+mn-ea"/>
+                        <a:cs typeface="+mn-cs"/>
+                      </a:endParaRPr>
+                    </a:p>
+                  </a:txBody>
+                  <a:tcPr/>
+                </a:tc>
+                <a:tc>
+                  <a:txBody>
+                    <a:bodyPr/>
+                    <a:lstStyle/>
+                    <a:p>
+                      <a:endParaRPr kumimoji="0" lang="es-AR" sz="1400" kern="1200" dirty="0">
+                        <a:solidFill>
+                          <a:schemeClr val="dk1"/>
+                        </a:solidFill>
+                        <a:latin typeface="+mn-lt"/>
+                        <a:ea typeface="+mn-ea"/>
+                        <a:cs typeface="+mn-cs"/>
+                      </a:endParaRPr>
+                    </a:p>
+                  </a:txBody>
+                  <a:tcPr/>
+                </a:tc>
+                <a:tc>
+                  <a:txBody>
+                    <a:bodyPr/>
+                    <a:lstStyle/>
+                    <a:p>
+                      <a:endParaRPr kumimoji="0" lang="es-AR" sz="1400" kern="1200" dirty="0">
+                        <a:solidFill>
+                          <a:schemeClr val="dk1"/>
+                        </a:solidFill>
+                        <a:latin typeface="+mn-lt"/>
+                        <a:ea typeface="+mn-ea"/>
+                        <a:cs typeface="+mn-cs"/>
+                      </a:endParaRPr>
+                    </a:p>
+                  </a:txBody>
+                  <a:tcPr/>
+                </a:tc>
+              </a:tr>
+              <a:tr h="675075">
+                <a:tc>
+                  <a:txBody>
+                    <a:bodyPr/>
+                    <a:lstStyle/>
+                    <a:p>
                       <a:r>
                         <a:rPr lang="es-AR" sz="1400" dirty="0" smtClean="0"/>
-                        <a:t> Hg.</a:t>
+                        <a:t>Cliente</a:t>
                       </a:r>
                       <a:endParaRPr lang="es-AR" sz="1400" dirty="0"/>
+                    </a:p>
+                  </a:txBody>
+                  <a:tcPr/>
+                </a:tc>
+                <a:tc>
+                  <a:txBody>
+                    <a:bodyPr/>
+                    <a:lstStyle/>
+                    <a:p>
+                      <a:r>
+                        <a:rPr kumimoji="0" lang="es-AR" sz="1400" kern="1200" dirty="0" smtClean="0">
+                          <a:solidFill>
+                            <a:schemeClr val="dk1"/>
+                          </a:solidFill>
+                          <a:latin typeface="+mn-lt"/>
+                          <a:ea typeface="+mn-ea"/>
+                          <a:cs typeface="+mn-cs"/>
+                        </a:rPr>
+                        <a:t>TortoiseSvn.</a:t>
+                      </a:r>
+                      <a:endParaRPr kumimoji="0" lang="es-AR" sz="1400" kern="1200" dirty="0">
+                        <a:solidFill>
+                          <a:schemeClr val="dk1"/>
+                        </a:solidFill>
+                        <a:latin typeface="+mn-lt"/>
+                        <a:ea typeface="+mn-ea"/>
+                        <a:cs typeface="+mn-cs"/>
+                      </a:endParaRPr>
+                    </a:p>
+                  </a:txBody>
+                  <a:tcPr/>
+                </a:tc>
+                <a:tc>
+                  <a:txBody>
+                    <a:bodyPr/>
+                    <a:lstStyle/>
+                    <a:p>
+                      <a:r>
+                        <a:rPr kumimoji="0" lang="es-AR" sz="1400" kern="1200" dirty="0" smtClean="0">
+                          <a:solidFill>
+                            <a:schemeClr val="dk1"/>
+                          </a:solidFill>
+                          <a:latin typeface="+mn-lt"/>
+                          <a:ea typeface="+mn-ea"/>
+                          <a:cs typeface="+mn-cs"/>
+                        </a:rPr>
+                        <a:t>TortoiseHg.</a:t>
+                      </a:r>
+                      <a:endParaRPr kumimoji="0" lang="es-AR" sz="1400" kern="1200" dirty="0">
+                        <a:solidFill>
+                          <a:schemeClr val="dk1"/>
+                        </a:solidFill>
+                        <a:latin typeface="+mn-lt"/>
+                        <a:ea typeface="+mn-ea"/>
+                        <a:cs typeface="+mn-cs"/>
+                      </a:endParaRPr>
                     </a:p>
                   </a:txBody>
                   <a:tcPr/>
@@ -5821,9 +6246,6 @@
                         <a:cs typeface="+mn-cs"/>
                       </a:endParaRPr>
                     </a:p>
-                    <a:p>
-                      <a:endParaRPr lang="es-AR" sz="1400" dirty="0"/>
-                    </a:p>
                   </a:txBody>
                   <a:tcPr/>
                 </a:tc>
@@ -5832,7 +6254,14 @@
                     <a:bodyPr/>
                     <a:lstStyle/>
                     <a:p>
-                      <a:endParaRPr lang="es-AR"/>
+                      <a:endParaRPr kumimoji="0" lang="es-AR" sz="1400" kern="1200" dirty="0">
+                        <a:solidFill>
+                          <a:schemeClr val="dk1"/>
+                        </a:solidFill>
+                        <a:latin typeface="+mn-lt"/>
+                        <a:ea typeface="+mn-ea"/>
+                        <a:cs typeface="+mn-cs"/>
+                      </a:endParaRPr>
                     </a:p>
                   </a:txBody>
                   <a:tcPr/>
@@ -5842,167 +6271,14 @@
                     <a:bodyPr/>
                     <a:lstStyle/>
                     <a:p>
-                      <a:endParaRPr lang="es-AR"/>
-                    </a:p>
-                  </a:txBody>
-                  <a:tcPr/>
-                </a:tc>
-              </a:tr>
-              <a:tr h="675075">
-                <a:tc>
-                  <a:txBody>
-                    <a:bodyPr/>
-                    <a:lstStyle/>
-                    <a:p>
-                      <a:endParaRPr lang="es-AR" sz="1400" dirty="0"/>
-                    </a:p>
-                  </a:txBody>
-                  <a:tcPr/>
-                </a:tc>
-                <a:tc>
-                  <a:txBody>
-                    <a:bodyPr/>
-                    <a:lstStyle/>
-                    <a:p>
-                      <a:endParaRPr lang="es-AR"/>
-                    </a:p>
-                  </a:txBody>
-                  <a:tcPr/>
-                </a:tc>
-                <a:tc>
-                  <a:txBody>
-                    <a:bodyPr/>
-                    <a:lstStyle/>
-                    <a:p>
-                      <a:endParaRPr lang="es-AR"/>
-                    </a:p>
-                  </a:txBody>
-                  <a:tcPr/>
-                </a:tc>
-              </a:tr>
-              <a:tr h="675075">
-                <a:tc>
-                  <a:txBody>
-                    <a:bodyPr/>
-                    <a:lstStyle/>
-                    <a:p>
-                      <a:endParaRPr lang="es-AR" sz="1400" dirty="0"/>
-                    </a:p>
-                  </a:txBody>
-                  <a:tcPr/>
-                </a:tc>
-                <a:tc>
-                  <a:txBody>
-                    <a:bodyPr/>
-                    <a:lstStyle/>
-                    <a:p>
-                      <a:endParaRPr lang="es-AR"/>
-                    </a:p>
-                  </a:txBody>
-                  <a:tcPr/>
-                </a:tc>
-                <a:tc>
-                  <a:txBody>
-                    <a:bodyPr/>
-                    <a:lstStyle/>
-                    <a:p>
-                      <a:endParaRPr lang="es-AR"/>
-                    </a:p>
-                  </a:txBody>
-                  <a:tcPr/>
-                </a:tc>
-              </a:tr>
-              <a:tr h="675075">
-                <a:tc>
-                  <a:txBody>
-                    <a:bodyPr/>
-                    <a:lstStyle/>
-                    <a:p>
-                      <a:endParaRPr lang="es-AR" sz="1400" dirty="0"/>
-                    </a:p>
-                  </a:txBody>
-                  <a:tcPr/>
-                </a:tc>
-                <a:tc>
-                  <a:txBody>
-                    <a:bodyPr/>
-                    <a:lstStyle/>
-                    <a:p>
-                      <a:endParaRPr lang="es-AR"/>
-                    </a:p>
-                  </a:txBody>
-                  <a:tcPr/>
-                </a:tc>
-                <a:tc>
-                  <a:txBody>
-                    <a:bodyPr/>
-                    <a:lstStyle/>
-                    <a:p>
-                      <a:endParaRPr lang="es-AR"/>
-                    </a:p>
-                  </a:txBody>
-                  <a:tcPr/>
-                </a:tc>
-              </a:tr>
-              <a:tr h="675075">
-                <a:tc>
-                  <a:txBody>
-                    <a:bodyPr/>
-                    <a:lstStyle/>
-                    <a:p>
-                      <a:endParaRPr lang="es-AR" sz="1400" dirty="0"/>
-                    </a:p>
-                  </a:txBody>
-                  <a:tcPr/>
-                </a:tc>
-                <a:tc>
-                  <a:txBody>
-                    <a:bodyPr/>
-                    <a:lstStyle/>
-                    <a:p>
-                      <a:endParaRPr lang="es-AR"/>
-                    </a:p>
-                  </a:txBody>
-                  <a:tcPr/>
-                </a:tc>
-                <a:tc>
-                  <a:txBody>
-                    <a:bodyPr/>
-                    <a:lstStyle/>
-                    <a:p>
-                      <a:endParaRPr lang="es-AR"/>
-                    </a:p>
-                  </a:txBody>
-                  <a:tcPr/>
-                </a:tc>
-              </a:tr>
-              <a:tr h="675075">
-                <a:tc>
-                  <a:txBody>
-                    <a:bodyPr/>
-                    <a:lstStyle/>
-                    <a:p>
-                      <a:endParaRPr lang="es-AR" sz="1400" dirty="0"/>
-                    </a:p>
-                  </a:txBody>
-                  <a:tcPr/>
-                </a:tc>
-                <a:tc>
-                  <a:txBody>
-                    <a:bodyPr/>
-                    <a:lstStyle/>
-                    <a:p>
-                      <a:endParaRPr lang="es-AR"/>
-                    </a:p>
-                  </a:txBody>
-                  <a:tcPr/>
-                </a:tc>
-                <a:tc>
-                  <a:txBody>
-                    <a:bodyPr/>
-                    <a:lstStyle/>
-                    <a:p>
-                      <a:endParaRPr lang="es-AR" dirty="0"/>
+                      <a:endParaRPr kumimoji="0" lang="es-AR" sz="1400" kern="1200" dirty="0">
+                        <a:solidFill>
+                          <a:schemeClr val="dk1"/>
+                        </a:solidFill>
+                        <a:latin typeface="+mn-lt"/>
+                        <a:ea typeface="+mn-ea"/>
+                        <a:cs typeface="+mn-cs"/>
+                      </a:endParaRPr>
                     </a:p>
                   </a:txBody>
                   <a:tcPr/>
@@ -6086,21 +6362,8 @@
                   <a:schemeClr val="tx2"/>
                 </a:solidFill>
               </a:rPr>
-              <a:t>Apache </a:t>
-            </a:r>
-            <a:r>
-              <a:rPr lang="es-AR" sz="3600" dirty="0" err="1" smtClean="0">
-                <a:solidFill>
-                  <a:schemeClr val="tx2"/>
-                </a:solidFill>
-              </a:rPr>
-              <a:t>Gump</a:t>
-            </a:r>
-            <a:endParaRPr lang="es-AR" sz="3600" dirty="0" smtClean="0">
-              <a:solidFill>
-                <a:schemeClr val="tx2"/>
-              </a:solidFill>
-            </a:endParaRPr>
+              <a:t>Apache Gump</a:t>
+            </a:r>
           </a:p>
           <a:p>
             <a:pPr marL="0" indent="0" algn="ctr">
@@ -6126,15 +6389,11 @@
             </a:r>
             <a:r>
               <a:rPr lang="es-AR" dirty="0"/>
-              <a:t>integraciones por día. Donde cada integración forma parte de un </a:t>
-            </a:r>
-            <a:r>
-              <a:rPr lang="es-AR" dirty="0" err="1"/>
-              <a:t>Build</a:t>
-            </a:r>
-            <a:r>
-              <a:rPr lang="es-AR" dirty="0"/>
-              <a:t> (Integración, Construcción, Pruebas, Despliegue, entre otras cosas). ”</a:t>
+              <a:t>integraciones por día. Donde cada integración forma parte de un Build (Integración, Construcción, Pruebas, Despliegue, entre otras cosas</a:t>
+            </a:r>
+            <a:r>
+              <a:rPr lang="es-AR" dirty="0" smtClean="0"/>
+              <a:t>).”</a:t>
             </a:r>
             <a:endParaRPr lang="es-AR" dirty="0">
               <a:solidFill>
@@ -6216,21 +6475,8 @@
                   <a:schemeClr val="tx2"/>
                 </a:solidFill>
               </a:rPr>
-              <a:t>Apache </a:t>
-            </a:r>
-            <a:r>
-              <a:rPr lang="es-AR" dirty="0" err="1">
-                <a:solidFill>
-                  <a:schemeClr val="tx2"/>
-                </a:solidFill>
-              </a:rPr>
-              <a:t>Gump</a:t>
-            </a:r>
-            <a:endParaRPr lang="es-AR" dirty="0">
-              <a:solidFill>
-                <a:schemeClr val="tx2"/>
-              </a:solidFill>
-            </a:endParaRPr>
+              <a:t>Apache Gump</a:t>
+            </a:r>
           </a:p>
         </p:txBody>
       </p:sp>

</xml_diff>

<commit_message>
Agrego imágenes a diapositivas.
</commit_message>
<xml_diff>
--- a/Gestion de Configuracion.pptx
+++ b/Gestion de Configuracion.pptx
@@ -8,14 +8,17 @@
     <p:sldId id="256" r:id="rId2"/>
     <p:sldId id="257" r:id="rId3"/>
     <p:sldId id="258" r:id="rId4"/>
-    <p:sldId id="259" r:id="rId5"/>
-    <p:sldId id="260" r:id="rId6"/>
-    <p:sldId id="261" r:id="rId7"/>
-    <p:sldId id="262" r:id="rId8"/>
-    <p:sldId id="263" r:id="rId9"/>
-    <p:sldId id="264" r:id="rId10"/>
-    <p:sldId id="265" r:id="rId11"/>
-    <p:sldId id="266" r:id="rId12"/>
+    <p:sldId id="268" r:id="rId5"/>
+    <p:sldId id="259" r:id="rId6"/>
+    <p:sldId id="260" r:id="rId7"/>
+    <p:sldId id="267" r:id="rId8"/>
+    <p:sldId id="261" r:id="rId9"/>
+    <p:sldId id="262" r:id="rId10"/>
+    <p:sldId id="263" r:id="rId11"/>
+    <p:sldId id="264" r:id="rId12"/>
+    <p:sldId id="265" r:id="rId13"/>
+    <p:sldId id="269" r:id="rId14"/>
+    <p:sldId id="266" r:id="rId15"/>
   </p:sldIdLst>
   <p:sldSz cx="9144000" cy="6858000" type="screen4x3"/>
   <p:notesSz cx="6858000" cy="9144000"/>
@@ -775,7 +778,7 @@
           <a:p>
             <a:fld id="{7A847CFC-816F-41D0-AAC0-9BF4FEBC753E}" type="datetimeFigureOut">
               <a:rPr lang="es-ES" smtClean="0"/>
-              <a:t>12/08/2012</a:t>
+              <a:t>13/08/2012</a:t>
             </a:fld>
             <a:endParaRPr lang="es-ES" dirty="0"/>
           </a:p>
@@ -958,7 +961,7 @@
           <a:p>
             <a:fld id="{7A847CFC-816F-41D0-AAC0-9BF4FEBC753E}" type="datetimeFigureOut">
               <a:rPr lang="es-ES" smtClean="0"/>
-              <a:t>12/08/2012</a:t>
+              <a:t>13/08/2012</a:t>
             </a:fld>
             <a:endParaRPr lang="es-ES" dirty="0"/>
           </a:p>
@@ -1133,7 +1136,7 @@
           <a:p>
             <a:fld id="{7A847CFC-816F-41D0-AAC0-9BF4FEBC753E}" type="datetimeFigureOut">
               <a:rPr lang="es-ES" smtClean="0"/>
-              <a:t>12/08/2012</a:t>
+              <a:t>13/08/2012</a:t>
             </a:fld>
             <a:endParaRPr lang="es-ES" dirty="0"/>
           </a:p>
@@ -1298,7 +1301,7 @@
           <a:p>
             <a:fld id="{7A847CFC-816F-41D0-AAC0-9BF4FEBC753E}" type="datetimeFigureOut">
               <a:rPr lang="es-ES" smtClean="0"/>
-              <a:t>12/08/2012</a:t>
+              <a:t>13/08/2012</a:t>
             </a:fld>
             <a:endParaRPr lang="es-ES" dirty="0"/>
           </a:p>
@@ -1519,7 +1522,7 @@
           <a:p>
             <a:fld id="{7A847CFC-816F-41D0-AAC0-9BF4FEBC753E}" type="datetimeFigureOut">
               <a:rPr lang="es-ES" smtClean="0"/>
-              <a:t>12/08/2012</a:t>
+              <a:t>13/08/2012</a:t>
             </a:fld>
             <a:endParaRPr lang="es-ES" dirty="0"/>
           </a:p>
@@ -1778,7 +1781,7 @@
           <a:p>
             <a:fld id="{7A847CFC-816F-41D0-AAC0-9BF4FEBC753E}" type="datetimeFigureOut">
               <a:rPr lang="es-ES" smtClean="0"/>
-              <a:t>12/08/2012</a:t>
+              <a:t>13/08/2012</a:t>
             </a:fld>
             <a:endParaRPr lang="es-ES" dirty="0"/>
           </a:p>
@@ -2182,7 +2185,7 @@
           <a:p>
             <a:fld id="{7A847CFC-816F-41D0-AAC0-9BF4FEBC753E}" type="datetimeFigureOut">
               <a:rPr lang="es-ES" smtClean="0"/>
-              <a:t>12/08/2012</a:t>
+              <a:t>13/08/2012</a:t>
             </a:fld>
             <a:endParaRPr lang="es-ES" dirty="0"/>
           </a:p>
@@ -2313,7 +2316,7 @@
           <a:p>
             <a:fld id="{7A847CFC-816F-41D0-AAC0-9BF4FEBC753E}" type="datetimeFigureOut">
               <a:rPr lang="es-ES" smtClean="0"/>
-              <a:t>12/08/2012</a:t>
+              <a:t>13/08/2012</a:t>
             </a:fld>
             <a:endParaRPr lang="es-ES" dirty="0"/>
           </a:p>
@@ -2413,7 +2416,7 @@
           <a:p>
             <a:fld id="{7A847CFC-816F-41D0-AAC0-9BF4FEBC753E}" type="datetimeFigureOut">
               <a:rPr lang="es-ES" smtClean="0"/>
-              <a:t>12/08/2012</a:t>
+              <a:t>13/08/2012</a:t>
             </a:fld>
             <a:endParaRPr lang="es-ES" dirty="0"/>
           </a:p>
@@ -2658,7 +2661,7 @@
           <a:p>
             <a:fld id="{7A847CFC-816F-41D0-AAC0-9BF4FEBC753E}" type="datetimeFigureOut">
               <a:rPr lang="es-ES" smtClean="0"/>
-              <a:t>12/08/2012</a:t>
+              <a:t>13/08/2012</a:t>
             </a:fld>
             <a:endParaRPr lang="es-ES" dirty="0"/>
           </a:p>
@@ -2902,7 +2905,7 @@
           <a:p>
             <a:fld id="{7A847CFC-816F-41D0-AAC0-9BF4FEBC753E}" type="datetimeFigureOut">
               <a:rPr lang="es-ES" smtClean="0"/>
-              <a:t>12/08/2012</a:t>
+              <a:t>13/08/2012</a:t>
             </a:fld>
             <a:endParaRPr lang="es-ES" dirty="0"/>
           </a:p>
@@ -3726,7 +3729,7 @@
           <a:p>
             <a:fld id="{7A847CFC-816F-41D0-AAC0-9BF4FEBC753E}" type="datetimeFigureOut">
               <a:rPr lang="es-ES" smtClean="0"/>
-              <a:t>12/08/2012</a:t>
+              <a:t>13/08/2012</a:t>
             </a:fld>
             <a:endParaRPr lang="es-ES" dirty="0"/>
           </a:p>
@@ -4189,6 +4192,435 @@
         </p:nvSpPr>
         <p:spPr>
           <a:xfrm>
+            <a:off x="457200" y="476672"/>
+            <a:ext cx="8229600" cy="6097864"/>
+          </a:xfrm>
+        </p:spPr>
+        <p:txBody>
+          <a:bodyPr/>
+          <a:lstStyle/>
+          <a:p>
+            <a:pPr marL="0" indent="0">
+              <a:buNone/>
+            </a:pPr>
+            <a:r>
+              <a:rPr lang="es-AR" dirty="0" smtClean="0"/>
+              <a:t>Comparación Subversion – Jenkins</a:t>
+            </a:r>
+          </a:p>
+          <a:p>
+            <a:pPr marL="0" indent="0">
+              <a:buNone/>
+            </a:pPr>
+            <a:endParaRPr lang="es-AR" dirty="0"/>
+          </a:p>
+          <a:p>
+            <a:pPr marL="0" indent="0">
+              <a:buNone/>
+            </a:pPr>
+            <a:endParaRPr lang="es-AR" dirty="0" smtClean="0"/>
+          </a:p>
+        </p:txBody>
+      </p:sp>
+      <p:graphicFrame>
+        <p:nvGraphicFramePr>
+          <p:cNvPr id="2" name="1 Tabla"/>
+          <p:cNvGraphicFramePr>
+            <a:graphicFrameLocks noGrp="1"/>
+          </p:cNvGraphicFramePr>
+          <p:nvPr>
+            <p:extLst>
+              <p:ext uri="{D42A27DB-BD31-4B8C-83A1-F6EECF244321}">
+                <p14:modId xmlns:p14="http://schemas.microsoft.com/office/powerpoint/2010/main" val="1294287730"/>
+              </p:ext>
+            </p:extLst>
+          </p:nvPr>
+        </p:nvGraphicFramePr>
+        <p:xfrm>
+          <a:off x="971600" y="1397000"/>
+          <a:ext cx="7128792" cy="3352800"/>
+        </p:xfrm>
+        <a:graphic>
+          <a:graphicData uri="http://schemas.openxmlformats.org/drawingml/2006/table">
+            <a:tbl>
+              <a:tblPr firstRow="1" bandRow="1">
+                <a:tableStyleId>{5C22544A-7EE6-4342-B048-85BDC9FD1C3A}</a:tableStyleId>
+              </a:tblPr>
+              <a:tblGrid>
+                <a:gridCol w="3564396"/>
+                <a:gridCol w="3564396"/>
+              </a:tblGrid>
+              <a:tr h="447824">
+                <a:tc>
+                  <a:txBody>
+                    <a:bodyPr/>
+                    <a:lstStyle/>
+                    <a:p>
+                      <a:r>
+                        <a:rPr lang="es-AR" dirty="0" smtClean="0"/>
+                        <a:t>Subversion </a:t>
+                      </a:r>
+                      <a:endParaRPr lang="es-AR" dirty="0"/>
+                    </a:p>
+                  </a:txBody>
+                  <a:tcPr/>
+                </a:tc>
+                <a:tc>
+                  <a:txBody>
+                    <a:bodyPr/>
+                    <a:lstStyle/>
+                    <a:p>
+                      <a:pPr marL="0" marR="0" indent="0" algn="l" defTabSz="914400" rtl="0" eaLnBrk="1" fontAlgn="auto" latinLnBrk="0" hangingPunct="1">
+                        <a:lnSpc>
+                          <a:spcPct val="100000"/>
+                        </a:lnSpc>
+                        <a:spcBef>
+                          <a:spcPts val="0"/>
+                        </a:spcBef>
+                        <a:spcAft>
+                          <a:spcPts val="0"/>
+                        </a:spcAft>
+                        <a:buClrTx/>
+                        <a:buSzTx/>
+                        <a:buFontTx/>
+                        <a:buNone/>
+                        <a:tabLst/>
+                        <a:defRPr/>
+                      </a:pPr>
+                      <a:r>
+                        <a:rPr lang="es-AR" dirty="0" smtClean="0"/>
+                        <a:t>Jenkins</a:t>
+                      </a:r>
+                    </a:p>
+                    <a:p>
+                      <a:endParaRPr lang="es-AR" dirty="0"/>
+                    </a:p>
+                  </a:txBody>
+                  <a:tcPr/>
+                </a:tc>
+              </a:tr>
+              <a:tr h="370840">
+                <a:tc>
+                  <a:txBody>
+                    <a:bodyPr/>
+                    <a:lstStyle/>
+                    <a:p>
+                      <a:r>
+                        <a:rPr lang="es-AR" sz="1600" dirty="0" smtClean="0"/>
+                        <a:t>Lleva control de versiones</a:t>
+                      </a:r>
+                      <a:endParaRPr lang="es-AR" sz="1600" dirty="0"/>
+                    </a:p>
+                  </a:txBody>
+                  <a:tcPr/>
+                </a:tc>
+                <a:tc>
+                  <a:txBody>
+                    <a:bodyPr/>
+                    <a:lstStyle/>
+                    <a:p>
+                      <a:r>
+                        <a:rPr lang="es-AR" sz="1600" dirty="0" smtClean="0"/>
+                        <a:t>Toma la última versión</a:t>
+                      </a:r>
+                      <a:r>
+                        <a:rPr lang="es-AR" sz="1600" baseline="0" dirty="0" smtClean="0"/>
+                        <a:t> del repositorio </a:t>
+                      </a:r>
+                      <a:r>
+                        <a:rPr lang="es-AR" sz="1600" baseline="0" dirty="0" err="1" smtClean="0"/>
+                        <a:t>subversion</a:t>
+                      </a:r>
+                      <a:r>
+                        <a:rPr lang="es-AR" sz="1600" baseline="0" dirty="0" smtClean="0"/>
+                        <a:t> para integrar el proyecto.</a:t>
+                      </a:r>
+                      <a:endParaRPr lang="es-AR" sz="1600" dirty="0"/>
+                    </a:p>
+                  </a:txBody>
+                  <a:tcPr/>
+                </a:tc>
+              </a:tr>
+              <a:tr h="370840">
+                <a:tc>
+                  <a:txBody>
+                    <a:bodyPr/>
+                    <a:lstStyle/>
+                    <a:p>
+                      <a:r>
+                        <a:rPr lang="es-AR" sz="1600" dirty="0" smtClean="0"/>
+                        <a:t>Ejecución según la</a:t>
+                      </a:r>
+                      <a:r>
+                        <a:rPr lang="es-AR" sz="1600" baseline="0" dirty="0" smtClean="0"/>
+                        <a:t> necesidad del usuario.</a:t>
+                      </a:r>
+                      <a:endParaRPr lang="es-AR" sz="1600" dirty="0"/>
+                    </a:p>
+                  </a:txBody>
+                  <a:tcPr/>
+                </a:tc>
+                <a:tc>
+                  <a:txBody>
+                    <a:bodyPr/>
+                    <a:lstStyle/>
+                    <a:p>
+                      <a:r>
+                        <a:rPr lang="es-AR" sz="1600" dirty="0" smtClean="0"/>
+                        <a:t>Ejecución planificada.</a:t>
+                      </a:r>
+                      <a:endParaRPr lang="es-AR" sz="1600" dirty="0"/>
+                    </a:p>
+                  </a:txBody>
+                  <a:tcPr/>
+                </a:tc>
+              </a:tr>
+              <a:tr h="370840">
+                <a:tc>
+                  <a:txBody>
+                    <a:bodyPr/>
+                    <a:lstStyle/>
+                    <a:p>
+                      <a:r>
+                        <a:rPr lang="es-AR" sz="1600" dirty="0" smtClean="0"/>
+                        <a:t>Si hay errores en el código, no</a:t>
+                      </a:r>
+                      <a:r>
+                        <a:rPr lang="es-AR" sz="1600" baseline="0" dirty="0" smtClean="0"/>
+                        <a:t> son manejados.</a:t>
+                      </a:r>
+                      <a:endParaRPr lang="es-AR" sz="1600" dirty="0"/>
+                    </a:p>
+                  </a:txBody>
+                  <a:tcPr/>
+                </a:tc>
+                <a:tc>
+                  <a:txBody>
+                    <a:bodyPr/>
+                    <a:lstStyle/>
+                    <a:p>
+                      <a:pPr marL="0" marR="0" indent="0" algn="l" defTabSz="914400" rtl="0" eaLnBrk="1" fontAlgn="auto" latinLnBrk="0" hangingPunct="1">
+                        <a:lnSpc>
+                          <a:spcPct val="100000"/>
+                        </a:lnSpc>
+                        <a:spcBef>
+                          <a:spcPts val="0"/>
+                        </a:spcBef>
+                        <a:spcAft>
+                          <a:spcPts val="0"/>
+                        </a:spcAft>
+                        <a:buClrTx/>
+                        <a:buSzTx/>
+                        <a:buFontTx/>
+                        <a:buNone/>
+                        <a:tabLst/>
+                        <a:defRPr/>
+                      </a:pPr>
+                      <a:r>
+                        <a:rPr lang="es-AR" sz="1600" dirty="0" smtClean="0"/>
+                        <a:t>Si hay errores en el código, la</a:t>
+                      </a:r>
+                      <a:r>
+                        <a:rPr lang="es-AR" sz="1600" baseline="0" dirty="0" smtClean="0"/>
+                        <a:t> construcción y sus dependencias son bloqueadas hasta solucionar los errores.</a:t>
+                      </a:r>
+                      <a:endParaRPr lang="es-AR" sz="1600" dirty="0" smtClean="0"/>
+                    </a:p>
+                    <a:p>
+                      <a:endParaRPr lang="es-AR" sz="1600" dirty="0"/>
+                    </a:p>
+                  </a:txBody>
+                  <a:tcPr/>
+                </a:tc>
+              </a:tr>
+            </a:tbl>
+          </a:graphicData>
+        </a:graphic>
+      </p:graphicFrame>
+    </p:spTree>
+    <p:extLst>
+      <p:ext uri="{BB962C8B-B14F-4D97-AF65-F5344CB8AC3E}">
+        <p14:creationId xmlns:p14="http://schemas.microsoft.com/office/powerpoint/2010/main" val="1167150941"/>
+      </p:ext>
+    </p:extLst>
+  </p:cSld>
+  <p:clrMapOvr>
+    <a:masterClrMapping/>
+  </p:clrMapOvr>
+</p:sld>
+</file>
+
+<file path=ppt/slides/slide11.xml><?xml version="1.0" encoding="utf-8"?>
+<p:sld xmlns:a="http://schemas.openxmlformats.org/drawingml/2006/main" xmlns:r="http://schemas.openxmlformats.org/officeDocument/2006/relationships" xmlns:p="http://schemas.openxmlformats.org/presentationml/2006/main">
+  <p:cSld>
+    <p:spTree>
+      <p:nvGrpSpPr>
+        <p:cNvPr id="1" name=""/>
+        <p:cNvGrpSpPr/>
+        <p:nvPr/>
+      </p:nvGrpSpPr>
+      <p:grpSpPr>
+        <a:xfrm>
+          <a:off x="0" y="0"/>
+          <a:ext cx="0" cy="0"/>
+          <a:chOff x="0" y="0"/>
+          <a:chExt cx="0" cy="0"/>
+        </a:xfrm>
+      </p:grpSpPr>
+      <p:sp>
+        <p:nvSpPr>
+          <p:cNvPr id="3" name="2 Marcador de contenido"/>
+          <p:cNvSpPr>
+            <a:spLocks noGrp="1"/>
+          </p:cNvSpPr>
+          <p:nvPr>
+            <p:ph idx="1"/>
+          </p:nvPr>
+        </p:nvSpPr>
+        <p:spPr>
+          <a:xfrm>
+            <a:off x="457200" y="620688"/>
+            <a:ext cx="8229600" cy="5953848"/>
+          </a:xfrm>
+        </p:spPr>
+        <p:txBody>
+          <a:bodyPr>
+            <a:normAutofit lnSpcReduction="10000"/>
+          </a:bodyPr>
+          <a:lstStyle/>
+          <a:p>
+            <a:pPr marL="0" indent="0" algn="ctr">
+              <a:buNone/>
+            </a:pPr>
+            <a:r>
+              <a:rPr lang="es-AR" sz="3600" dirty="0" smtClean="0">
+                <a:solidFill>
+                  <a:schemeClr val="tx2"/>
+                </a:solidFill>
+              </a:rPr>
+              <a:t>Integración Continua</a:t>
+            </a:r>
+          </a:p>
+          <a:p>
+            <a:pPr marL="0" indent="0" algn="ctr">
+              <a:buNone/>
+            </a:pPr>
+            <a:r>
+              <a:rPr lang="es-AR" sz="3600" dirty="0">
+                <a:solidFill>
+                  <a:schemeClr val="tx2"/>
+                </a:solidFill>
+              </a:rPr>
+              <a:t>Jenkins </a:t>
+            </a:r>
+            <a:endParaRPr lang="es-AR" dirty="0" smtClean="0"/>
+          </a:p>
+          <a:p>
+            <a:r>
+              <a:rPr lang="es-AR" dirty="0" smtClean="0"/>
+              <a:t>“</a:t>
+            </a:r>
+            <a:r>
+              <a:rPr lang="es-AR" i="1" dirty="0"/>
+              <a:t>Jenkins</a:t>
+            </a:r>
+            <a:r>
+              <a:rPr lang="es-AR" dirty="0"/>
+              <a:t> es un servidor de integración continua Open </a:t>
+            </a:r>
+            <a:r>
+              <a:rPr lang="es-AR" dirty="0" err="1"/>
+              <a:t>Source</a:t>
+            </a:r>
+            <a:r>
+              <a:rPr lang="es-AR" dirty="0"/>
+              <a:t>. </a:t>
+            </a:r>
+            <a:r>
+              <a:rPr lang="es-AR" dirty="0" smtClean="0"/>
+              <a:t>Es una </a:t>
+            </a:r>
+            <a:r>
+              <a:rPr lang="es-AR" dirty="0"/>
+              <a:t>plataforma sobre la cual se pueden automatizar ciertos procesos. </a:t>
+            </a:r>
+          </a:p>
+          <a:p>
+            <a:r>
+              <a:rPr lang="es-AR" dirty="0"/>
+              <a:t>Su uso más difundido es en la generación de </a:t>
+            </a:r>
+            <a:r>
+              <a:rPr lang="es-AR" dirty="0" err="1"/>
+              <a:t>builds</a:t>
+            </a:r>
+            <a:r>
+              <a:rPr lang="es-AR" dirty="0"/>
+              <a:t> de aplicaciones a intervalos de tiempo para ejecutar una serie de pruebas sobre los mismos de forma automática. </a:t>
+            </a:r>
+            <a:r>
+              <a:rPr lang="es-AR" dirty="0" smtClean="0"/>
+              <a:t>Permite </a:t>
+            </a:r>
+            <a:r>
+              <a:rPr lang="es-AR" dirty="0"/>
+              <a:t>que el código nuevo se vaya integrando y probando de a poco. Esto permite detectar temprano fallos en las aplicaciones de manera que sea más fácil y menos costoso solucionar problemas.</a:t>
+            </a:r>
+          </a:p>
+          <a:p>
+            <a:pPr marL="0" indent="0" algn="ctr">
+              <a:buNone/>
+            </a:pPr>
+            <a:endParaRPr lang="es-AR" dirty="0">
+              <a:solidFill>
+                <a:schemeClr val="tx2"/>
+              </a:solidFill>
+            </a:endParaRPr>
+          </a:p>
+        </p:txBody>
+      </p:sp>
+    </p:spTree>
+    <p:extLst>
+      <p:ext uri="{BB962C8B-B14F-4D97-AF65-F5344CB8AC3E}">
+        <p14:creationId xmlns:p14="http://schemas.microsoft.com/office/powerpoint/2010/main" val="2467385990"/>
+      </p:ext>
+    </p:extLst>
+  </p:cSld>
+  <p:clrMapOvr>
+    <a:masterClrMapping/>
+  </p:clrMapOvr>
+</p:sld>
+</file>
+
+<file path=ppt/slides/slide12.xml><?xml version="1.0" encoding="utf-8"?>
+<p:sld xmlns:a="http://schemas.openxmlformats.org/drawingml/2006/main" xmlns:r="http://schemas.openxmlformats.org/officeDocument/2006/relationships" xmlns:p="http://schemas.openxmlformats.org/presentationml/2006/main">
+  <p:cSld>
+    <p:spTree>
+      <p:nvGrpSpPr>
+        <p:cNvPr id="1" name=""/>
+        <p:cNvGrpSpPr/>
+        <p:nvPr/>
+      </p:nvGrpSpPr>
+      <p:grpSpPr>
+        <a:xfrm>
+          <a:off x="0" y="0"/>
+          <a:ext cx="0" cy="0"/>
+          <a:chOff x="0" y="0"/>
+          <a:chExt cx="0" cy="0"/>
+        </a:xfrm>
+      </p:grpSpPr>
+      <p:sp>
+        <p:nvSpPr>
+          <p:cNvPr id="3" name="2 Marcador de contenido"/>
+          <p:cNvSpPr>
+            <a:spLocks noGrp="1"/>
+          </p:cNvSpPr>
+          <p:nvPr>
+            <p:ph idx="1"/>
+          </p:nvPr>
+        </p:nvSpPr>
+        <p:spPr>
+          <a:xfrm>
             <a:off x="457200" y="548680"/>
             <a:ext cx="8229600" cy="6025856"/>
           </a:xfrm>
@@ -4283,7 +4715,66 @@
 </p:sld>
 </file>
 
-<file path=ppt/slides/slide11.xml><?xml version="1.0" encoding="utf-8"?>
+<file path=ppt/slides/slide13.xml><?xml version="1.0" encoding="utf-8"?>
+<p:sld xmlns:a="http://schemas.openxmlformats.org/drawingml/2006/main" xmlns:r="http://schemas.openxmlformats.org/officeDocument/2006/relationships" xmlns:p="http://schemas.openxmlformats.org/presentationml/2006/main">
+  <p:cSld>
+    <p:spTree>
+      <p:nvGrpSpPr>
+        <p:cNvPr id="1" name=""/>
+        <p:cNvGrpSpPr/>
+        <p:nvPr/>
+      </p:nvGrpSpPr>
+      <p:grpSpPr>
+        <a:xfrm>
+          <a:off x="0" y="0"/>
+          <a:ext cx="0" cy="0"/>
+          <a:chOff x="0" y="0"/>
+          <a:chExt cx="0" cy="0"/>
+        </a:xfrm>
+      </p:grpSpPr>
+      <p:pic>
+        <p:nvPicPr>
+          <p:cNvPr id="6" name="3 Marcador de contenido"/>
+          <p:cNvPicPr>
+            <a:picLocks noGrp="1" noChangeAspect="1"/>
+          </p:cNvPicPr>
+          <p:nvPr>
+            <p:ph idx="1"/>
+          </p:nvPr>
+        </p:nvPicPr>
+        <p:blipFill>
+          <a:blip r:embed="rId2">
+            <a:extLst>
+              <a:ext uri="{28A0092B-C50C-407E-A947-70E740481C1C}">
+                <a14:useLocalDpi xmlns:a14="http://schemas.microsoft.com/office/drawing/2010/main" val="0"/>
+              </a:ext>
+            </a:extLst>
+          </a:blip>
+          <a:stretch>
+            <a:fillRect/>
+          </a:stretch>
+        </p:blipFill>
+        <p:spPr>
+          <a:xfrm>
+            <a:off x="457200" y="1700808"/>
+            <a:ext cx="8229600" cy="3226933"/>
+          </a:xfrm>
+        </p:spPr>
+      </p:pic>
+    </p:spTree>
+    <p:extLst>
+      <p:ext uri="{BB962C8B-B14F-4D97-AF65-F5344CB8AC3E}">
+        <p14:creationId xmlns:p14="http://schemas.microsoft.com/office/powerpoint/2010/main" val="463663347"/>
+      </p:ext>
+    </p:extLst>
+  </p:cSld>
+  <p:clrMapOvr>
+    <a:masterClrMapping/>
+  </p:clrMapOvr>
+</p:sld>
+</file>
+
+<file path=ppt/slides/slide14.xml><?xml version="1.0" encoding="utf-8"?>
 <p:sld xmlns:a="http://schemas.openxmlformats.org/drawingml/2006/main" xmlns:r="http://schemas.openxmlformats.org/officeDocument/2006/relationships" xmlns:p="http://schemas.openxmlformats.org/presentationml/2006/main">
   <p:cSld>
     <p:spTree>
@@ -4310,7 +4801,7 @@
             <p:ph idx="1"/>
             <p:extLst>
               <p:ext uri="{D42A27DB-BD31-4B8C-83A1-F6EECF244321}">
-                <p14:modId xmlns:p14="http://schemas.microsoft.com/office/powerpoint/2010/main" val="4276834999"/>
+                <p14:modId xmlns:p14="http://schemas.microsoft.com/office/powerpoint/2010/main" val="540327105"/>
               </p:ext>
             </p:extLst>
           </p:nvPr>
@@ -4420,22 +4911,14 @@
                       </a:r>
                       <a:r>
                         <a:rPr lang="es-AR" sz="1400" baseline="0" dirty="0" smtClean="0"/>
-                        <a:t> sobre un error informado en un </a:t>
+                        <a:t> sobre un error informado en un mail, </a:t>
                       </a:r>
                       <a:r>
                         <a:rPr lang="es-AR" sz="1400" baseline="0" dirty="0" smtClean="0"/>
-                        <a:t>mail, </a:t>
-                      </a:r>
-                      <a:r>
-                        <a:rPr lang="es-AR" sz="1400" baseline="0" dirty="0" err="1" smtClean="0"/>
-                        <a:t>rss</a:t>
+                        <a:t>RSS o </a:t>
                       </a:r>
                       <a:r>
                         <a:rPr lang="es-AR" sz="1400" baseline="0" dirty="0" smtClean="0"/>
-                        <a:t> o </a:t>
-                      </a:r>
-                      <a:r>
-                        <a:rPr lang="es-AR" sz="1400" baseline="0" smtClean="0"/>
                         <a:t>mensajería instantánea.</a:t>
                       </a:r>
                       <a:endParaRPr lang="es-AR" sz="1400" dirty="0"/>
@@ -5095,96 +5578,39 @@
           <a:chExt cx="0" cy="0"/>
         </a:xfrm>
       </p:grpSpPr>
-      <p:sp>
-        <p:nvSpPr>
-          <p:cNvPr id="2" name="2 Marcador de contenido"/>
-          <p:cNvSpPr>
-            <a:spLocks noGrp="1"/>
-          </p:cNvSpPr>
+      <p:pic>
+        <p:nvPicPr>
+          <p:cNvPr id="4" name="3 Marcador de contenido"/>
+          <p:cNvPicPr>
+            <a:picLocks noGrp="1" noChangeAspect="1"/>
+          </p:cNvPicPr>
           <p:nvPr>
             <p:ph idx="1"/>
           </p:nvPr>
-        </p:nvSpPr>
+        </p:nvPicPr>
+        <p:blipFill>
+          <a:blip r:embed="rId2">
+            <a:extLst>
+              <a:ext uri="{28A0092B-C50C-407E-A947-70E740481C1C}">
+                <a14:useLocalDpi xmlns:a14="http://schemas.microsoft.com/office/drawing/2010/main" val="0"/>
+              </a:ext>
+            </a:extLst>
+          </a:blip>
+          <a:stretch>
+            <a:fillRect/>
+          </a:stretch>
+        </p:blipFill>
         <p:spPr>
           <a:xfrm>
-            <a:off x="457200" y="620688"/>
-            <a:ext cx="8229600" cy="5953848"/>
+            <a:off x="2024062" y="950119"/>
+            <a:ext cx="5095875" cy="5581650"/>
           </a:xfrm>
         </p:spPr>
-        <p:txBody>
-          <a:bodyPr/>
-          <a:lstStyle/>
-          <a:p>
-            <a:pPr marL="109728" indent="0">
-              <a:buNone/>
-            </a:pPr>
-            <a:r>
-              <a:rPr lang="es-AR" b="1" dirty="0" smtClean="0">
-                <a:solidFill>
-                  <a:srgbClr val="002060"/>
-                </a:solidFill>
-              </a:rPr>
-              <a:t>¿</a:t>
-            </a:r>
-            <a:r>
-              <a:rPr lang="es-AR" b="1" dirty="0">
-                <a:solidFill>
-                  <a:srgbClr val="002060"/>
-                </a:solidFill>
-              </a:rPr>
-              <a:t>Qué es </a:t>
-            </a:r>
-            <a:r>
-              <a:rPr lang="es-AR" b="1" dirty="0" smtClean="0">
-                <a:solidFill>
-                  <a:srgbClr val="002060"/>
-                </a:solidFill>
-              </a:rPr>
-              <a:t>Mercurial?</a:t>
-            </a:r>
-            <a:endParaRPr lang="es-AR" b="1" dirty="0">
-              <a:solidFill>
-                <a:srgbClr val="002060"/>
-              </a:solidFill>
-            </a:endParaRPr>
-          </a:p>
-          <a:p>
-            <a:pPr marL="109728" indent="0">
-              <a:buNone/>
-            </a:pPr>
-            <a:endParaRPr lang="es-AR" dirty="0" smtClean="0"/>
-          </a:p>
-          <a:p>
-            <a:pPr marL="0" indent="0">
-              <a:buNone/>
-            </a:pPr>
-            <a:r>
-              <a:rPr lang="es-AR" dirty="0" smtClean="0"/>
-              <a:t>Es un </a:t>
-            </a:r>
-            <a:r>
-              <a:rPr lang="es-AR" dirty="0"/>
-              <a:t>servidor de control de versiones distribuido, esto significa que cada desarrollador dispone de una copia completa del repositorio, permitiéndole el manejo de las distintas versiones sin conexión. </a:t>
-            </a:r>
-          </a:p>
-          <a:p>
-            <a:pPr marL="0" indent="0">
-              <a:buNone/>
-            </a:pPr>
-            <a:endParaRPr lang="es-AR" dirty="0" smtClean="0"/>
-          </a:p>
-          <a:p>
-            <a:pPr marL="0" indent="0">
-              <a:buNone/>
-            </a:pPr>
-            <a:endParaRPr lang="es-AR" dirty="0"/>
-          </a:p>
-        </p:txBody>
-      </p:sp>
+      </p:pic>
     </p:spTree>
     <p:extLst>
       <p:ext uri="{BB962C8B-B14F-4D97-AF65-F5344CB8AC3E}">
-        <p14:creationId xmlns:p14="http://schemas.microsoft.com/office/powerpoint/2010/main" val="3424872223"/>
+        <p14:creationId xmlns:p14="http://schemas.microsoft.com/office/powerpoint/2010/main" val="2327088962"/>
       </p:ext>
     </p:extLst>
   </p:cSld>
@@ -5213,7 +5639,7 @@
       </p:grpSpPr>
       <p:sp>
         <p:nvSpPr>
-          <p:cNvPr id="3" name="2 Marcador de contenido"/>
+          <p:cNvPr id="2" name="2 Marcador de contenido"/>
           <p:cNvSpPr>
             <a:spLocks noGrp="1"/>
           </p:cNvSpPr>
@@ -5231,78 +5657,66 @@
           <a:bodyPr/>
           <a:lstStyle/>
           <a:p>
-            <a:pPr marL="0" indent="0">
+            <a:pPr marL="109728" indent="0">
               <a:buNone/>
             </a:pPr>
+            <a:r>
+              <a:rPr lang="es-AR" b="1" dirty="0" smtClean="0">
+                <a:solidFill>
+                  <a:srgbClr val="002060"/>
+                </a:solidFill>
+              </a:rPr>
+              <a:t>¿</a:t>
+            </a:r>
             <a:r>
               <a:rPr lang="es-AR" b="1" dirty="0">
                 <a:solidFill>
                   <a:srgbClr val="002060"/>
                 </a:solidFill>
               </a:rPr>
-              <a:t>Gestionar cambios a través del tiempo</a:t>
-            </a:r>
-          </a:p>
-          <a:p>
-            <a:pPr marL="0" indent="0">
-              <a:buNone/>
-            </a:pPr>
-            <a:endParaRPr lang="es-AR" dirty="0">
+              <a:t>Qué es </a:t>
+            </a:r>
+            <a:r>
+              <a:rPr lang="es-AR" b="1" dirty="0" smtClean="0">
+                <a:solidFill>
+                  <a:srgbClr val="002060"/>
+                </a:solidFill>
+              </a:rPr>
+              <a:t>Mercurial?</a:t>
+            </a:r>
+            <a:endParaRPr lang="es-AR" b="1" dirty="0">
               <a:solidFill>
                 <a:srgbClr val="002060"/>
               </a:solidFill>
             </a:endParaRPr>
           </a:p>
           <a:p>
-            <a:r>
-              <a:rPr lang="es-AR" dirty="0" smtClean="0"/>
-              <a:t>Mercurial recuerda </a:t>
-            </a:r>
-            <a:r>
-              <a:rPr lang="es-AR" dirty="0"/>
-              <a:t>cada cambio que se haya</a:t>
-            </a:r>
-          </a:p>
-          <a:p>
             <a:pPr marL="109728" indent="0">
               <a:buNone/>
             </a:pPr>
+            <a:endParaRPr lang="es-AR" dirty="0" smtClean="0"/>
+          </a:p>
+          <a:p>
+            <a:pPr marL="0" indent="0">
+              <a:buNone/>
+            </a:pPr>
+            <a:r>
+              <a:rPr lang="es-AR" dirty="0" smtClean="0"/>
+              <a:t>Es un </a:t>
+            </a:r>
             <a:r>
               <a:rPr lang="es-AR" dirty="0"/>
-              <a:t>   realizado en el repositorio.</a:t>
-            </a:r>
-          </a:p>
-          <a:p>
-            <a:r>
-              <a:rPr lang="es-AR" dirty="0"/>
-              <a:t>Recuerda cambios realizados a cada </a:t>
-            </a:r>
-            <a:r>
-              <a:rPr lang="es-AR" dirty="0" smtClean="0"/>
-              <a:t>archivo.</a:t>
-            </a:r>
-          </a:p>
-          <a:p>
-            <a:r>
-              <a:rPr lang="es-AR" smtClean="0"/>
-              <a:t>El </a:t>
-            </a:r>
-            <a:r>
-              <a:rPr lang="es-AR" dirty="0"/>
-              <a:t>seguimiento de los cambios se realiza en el repositorio y en un </a:t>
-            </a:r>
-            <a:r>
-              <a:rPr lang="es-AR"/>
-              <a:t>solo </a:t>
-            </a:r>
-            <a:r>
-              <a:rPr lang="es-AR" smtClean="0"/>
-              <a:t>archivo.</a:t>
-            </a:r>
-            <a:endParaRPr lang="es-AR" dirty="0"/>
-          </a:p>
-          <a:p>
-            <a:pPr marL="109728" indent="0">
+              <a:t>servidor de control de versiones distribuido, esto significa que cada desarrollador dispone de una copia completa del repositorio, permitiéndole el manejo de las distintas versiones sin conexión. </a:t>
+            </a:r>
+          </a:p>
+          <a:p>
+            <a:pPr marL="0" indent="0">
+              <a:buNone/>
+            </a:pPr>
+            <a:endParaRPr lang="es-AR" dirty="0" smtClean="0"/>
+          </a:p>
+          <a:p>
+            <a:pPr marL="0" indent="0">
               <a:buNone/>
             </a:pPr>
             <a:endParaRPr lang="es-AR" dirty="0"/>
@@ -5312,7 +5726,7 @@
     </p:spTree>
     <p:extLst>
       <p:ext uri="{BB962C8B-B14F-4D97-AF65-F5344CB8AC3E}">
-        <p14:creationId xmlns:p14="http://schemas.microsoft.com/office/powerpoint/2010/main" val="1175817311"/>
+        <p14:creationId xmlns:p14="http://schemas.microsoft.com/office/powerpoint/2010/main" val="3424872223"/>
       </p:ext>
     </p:extLst>
   </p:cSld>
@@ -5339,752 +5753,104 @@
           <a:chExt cx="0" cy="0"/>
         </a:xfrm>
       </p:grpSpPr>
-      <p:graphicFrame>
-        <p:nvGraphicFramePr>
-          <p:cNvPr id="5" name="4 Marcador de contenido"/>
-          <p:cNvGraphicFramePr>
-            <a:graphicFrameLocks noGrp="1"/>
-          </p:cNvGraphicFramePr>
+      <p:sp>
+        <p:nvSpPr>
+          <p:cNvPr id="3" name="2 Marcador de contenido"/>
+          <p:cNvSpPr>
+            <a:spLocks noGrp="1"/>
+          </p:cNvSpPr>
           <p:nvPr>
             <p:ph idx="1"/>
-            <p:extLst>
-              <p:ext uri="{D42A27DB-BD31-4B8C-83A1-F6EECF244321}">
-                <p14:modId xmlns:p14="http://schemas.microsoft.com/office/powerpoint/2010/main" val="278470830"/>
-              </p:ext>
-            </p:extLst>
-          </p:nvPr>
-        </p:nvGraphicFramePr>
-        <p:xfrm>
-          <a:off x="457200" y="692696"/>
-          <a:ext cx="8229600" cy="5600415"/>
-        </p:xfrm>
-        <a:graphic>
-          <a:graphicData uri="http://schemas.openxmlformats.org/drawingml/2006/table">
-            <a:tbl>
-              <a:tblPr firstRow="1" bandRow="1">
-                <a:tableStyleId>{5C22544A-7EE6-4342-B048-85BDC9FD1C3A}</a:tableStyleId>
-              </a:tblPr>
-              <a:tblGrid>
-                <a:gridCol w="2743200"/>
-                <a:gridCol w="2235696"/>
-                <a:gridCol w="3250704"/>
-              </a:tblGrid>
-              <a:tr h="675075">
-                <a:tc>
-                  <a:txBody>
-                    <a:bodyPr/>
-                    <a:lstStyle/>
-                    <a:p>
-                      <a:endParaRPr lang="es-AR" dirty="0"/>
-                    </a:p>
-                  </a:txBody>
-                  <a:tcPr/>
-                </a:tc>
-                <a:tc>
-                  <a:txBody>
-                    <a:bodyPr/>
-                    <a:lstStyle/>
-                    <a:p>
-                      <a:r>
-                        <a:rPr lang="es-AR" dirty="0" smtClean="0"/>
-                        <a:t>Subversion</a:t>
-                      </a:r>
-                      <a:endParaRPr lang="es-AR" dirty="0"/>
-                    </a:p>
-                  </a:txBody>
-                  <a:tcPr/>
-                </a:tc>
-                <a:tc>
-                  <a:txBody>
-                    <a:bodyPr/>
-                    <a:lstStyle/>
-                    <a:p>
-                      <a:r>
-                        <a:rPr lang="es-AR" dirty="0" smtClean="0"/>
-                        <a:t>Mercurial</a:t>
-                      </a:r>
-                    </a:p>
-                  </a:txBody>
-                  <a:tcPr/>
-                </a:tc>
-              </a:tr>
-              <a:tr h="675075">
-                <a:tc>
-                  <a:txBody>
-                    <a:bodyPr/>
-                    <a:lstStyle/>
-                    <a:p>
-                      <a:pPr marL="0" marR="0" indent="0" algn="l" defTabSz="914400" rtl="0" eaLnBrk="1" fontAlgn="auto" latinLnBrk="0" hangingPunct="1">
-                        <a:lnSpc>
-                          <a:spcPct val="100000"/>
-                        </a:lnSpc>
-                        <a:spcBef>
-                          <a:spcPts val="0"/>
-                        </a:spcBef>
-                        <a:spcAft>
-                          <a:spcPts val="0"/>
-                        </a:spcAft>
-                        <a:buClrTx/>
-                        <a:buSzTx/>
-                        <a:buFontTx/>
-                        <a:buNone/>
-                        <a:tabLst/>
-                        <a:defRPr/>
-                      </a:pPr>
-                      <a:r>
-                        <a:rPr lang="es-AR" sz="1400" dirty="0" smtClean="0"/>
-                        <a:t>Servidor</a:t>
-                      </a:r>
-                      <a:r>
-                        <a:rPr lang="es-AR" sz="1400" baseline="0" dirty="0" smtClean="0"/>
-                        <a:t> de Control</a:t>
-                      </a:r>
-                      <a:endParaRPr lang="es-AR" sz="1400" dirty="0" smtClean="0"/>
-                    </a:p>
-                    <a:p>
-                      <a:endParaRPr lang="es-AR" dirty="0"/>
-                    </a:p>
-                  </a:txBody>
-                  <a:tcPr/>
-                </a:tc>
-                <a:tc>
-                  <a:txBody>
-                    <a:bodyPr/>
-                    <a:lstStyle/>
-                    <a:p>
-                      <a:r>
-                        <a:rPr kumimoji="0" lang="es-AR" sz="1400" kern="1200" dirty="0" smtClean="0">
-                          <a:solidFill>
-                            <a:schemeClr val="dk1"/>
-                          </a:solidFill>
-                          <a:latin typeface="+mn-lt"/>
-                          <a:ea typeface="+mn-ea"/>
-                          <a:cs typeface="+mn-cs"/>
-                        </a:rPr>
-                        <a:t>Servidor de manejo centralizado.</a:t>
-                      </a:r>
-                      <a:endParaRPr kumimoji="0" lang="es-AR" sz="1400" kern="1200" dirty="0">
-                        <a:solidFill>
-                          <a:schemeClr val="dk1"/>
-                        </a:solidFill>
-                        <a:latin typeface="+mn-lt"/>
-                        <a:ea typeface="+mn-ea"/>
-                        <a:cs typeface="+mn-cs"/>
-                      </a:endParaRPr>
-                    </a:p>
-                  </a:txBody>
-                  <a:tcPr/>
-                </a:tc>
-                <a:tc>
-                  <a:txBody>
-                    <a:bodyPr/>
-                    <a:lstStyle/>
-                    <a:p>
-                      <a:r>
-                        <a:rPr kumimoji="0" lang="es-AR" sz="1400" kern="1200" dirty="0" smtClean="0">
-                          <a:solidFill>
-                            <a:schemeClr val="dk1"/>
-                          </a:solidFill>
-                          <a:latin typeface="+mn-lt"/>
-                          <a:ea typeface="+mn-ea"/>
-                          <a:cs typeface="+mn-cs"/>
-                        </a:rPr>
-                        <a:t>Servidor de manejo distribuido.</a:t>
-                      </a:r>
-                      <a:endParaRPr kumimoji="0" lang="es-AR" sz="1400" kern="1200" dirty="0">
-                        <a:solidFill>
-                          <a:schemeClr val="dk1"/>
-                        </a:solidFill>
-                        <a:latin typeface="+mn-lt"/>
-                        <a:ea typeface="+mn-ea"/>
-                        <a:cs typeface="+mn-cs"/>
-                      </a:endParaRPr>
-                    </a:p>
-                  </a:txBody>
-                  <a:tcPr/>
-                </a:tc>
-              </a:tr>
-              <a:tr h="675075">
-                <a:tc>
-                  <a:txBody>
-                    <a:bodyPr/>
-                    <a:lstStyle/>
-                    <a:p>
-                      <a:r>
-                        <a:rPr lang="es-AR" sz="1400" dirty="0" smtClean="0"/>
-                        <a:t>Manejo de Versiones</a:t>
-                      </a:r>
-                      <a:endParaRPr lang="es-AR" sz="1400" dirty="0"/>
-                    </a:p>
-                  </a:txBody>
-                  <a:tcPr/>
-                </a:tc>
-                <a:tc>
-                  <a:txBody>
-                    <a:bodyPr/>
-                    <a:lstStyle/>
-                    <a:p>
-                      <a:r>
-                        <a:rPr kumimoji="0" lang="es-AR" sz="1400" kern="1200" dirty="0" smtClean="0">
-                          <a:solidFill>
-                            <a:schemeClr val="dk1"/>
-                          </a:solidFill>
-                          <a:latin typeface="+mn-lt"/>
-                          <a:ea typeface="+mn-ea"/>
-                          <a:cs typeface="+mn-cs"/>
-                        </a:rPr>
-                        <a:t>Versionado de directorios y archivos.</a:t>
-                      </a:r>
-                      <a:endParaRPr kumimoji="0" lang="es-AR" sz="1400" kern="1200" dirty="0">
-                        <a:solidFill>
-                          <a:schemeClr val="dk1"/>
-                        </a:solidFill>
-                        <a:latin typeface="+mn-lt"/>
-                        <a:ea typeface="+mn-ea"/>
-                        <a:cs typeface="+mn-cs"/>
-                      </a:endParaRPr>
-                    </a:p>
-                  </a:txBody>
-                  <a:tcPr/>
-                </a:tc>
-                <a:tc>
-                  <a:txBody>
-                    <a:bodyPr/>
-                    <a:lstStyle/>
-                    <a:p>
-                      <a:r>
-                        <a:rPr kumimoji="0" lang="es-AR" sz="1400" kern="1200" dirty="0" smtClean="0">
-                          <a:solidFill>
-                            <a:schemeClr val="dk1"/>
-                          </a:solidFill>
-                          <a:latin typeface="+mn-lt"/>
-                          <a:ea typeface="+mn-ea"/>
-                          <a:cs typeface="+mn-cs"/>
-                        </a:rPr>
-                        <a:t>Versionado de archivos.</a:t>
-                      </a:r>
-                      <a:endParaRPr kumimoji="0" lang="es-AR" sz="1400" kern="1200" dirty="0">
-                        <a:solidFill>
-                          <a:schemeClr val="dk1"/>
-                        </a:solidFill>
-                        <a:latin typeface="+mn-lt"/>
-                        <a:ea typeface="+mn-ea"/>
-                        <a:cs typeface="+mn-cs"/>
-                      </a:endParaRPr>
-                    </a:p>
-                  </a:txBody>
-                  <a:tcPr/>
-                </a:tc>
-              </a:tr>
-              <a:tr h="675075">
-                <a:tc>
-                  <a:txBody>
-                    <a:bodyPr/>
-                    <a:lstStyle/>
-                    <a:p>
-                      <a:pPr marL="0" marR="0" lvl="0" indent="0" algn="l" defTabSz="914400" rtl="0" eaLnBrk="1" fontAlgn="auto" latinLnBrk="0" hangingPunct="1">
-                        <a:lnSpc>
-                          <a:spcPct val="100000"/>
-                        </a:lnSpc>
-                        <a:spcBef>
-                          <a:spcPts val="0"/>
-                        </a:spcBef>
-                        <a:spcAft>
-                          <a:spcPts val="0"/>
-                        </a:spcAft>
-                        <a:buClrTx/>
-                        <a:buSzTx/>
-                        <a:buFontTx/>
-                        <a:buNone/>
-                        <a:tabLst/>
-                        <a:defRPr/>
-                      </a:pPr>
-                      <a:r>
-                        <a:rPr kumimoji="0" lang="es-ES" sz="1400" kern="1200" dirty="0" smtClean="0">
-                          <a:solidFill>
-                            <a:schemeClr val="dk1"/>
-                          </a:solidFill>
-                          <a:effectLst/>
-                          <a:latin typeface="+mn-lt"/>
-                          <a:ea typeface="+mn-ea"/>
-                          <a:cs typeface="+mn-cs"/>
-                        </a:rPr>
-                        <a:t>Manejo de variaciones</a:t>
-                      </a:r>
-                      <a:endParaRPr kumimoji="0" lang="es-AR" sz="1400" kern="1200" dirty="0" smtClean="0">
-                        <a:solidFill>
-                          <a:schemeClr val="dk1"/>
-                        </a:solidFill>
-                        <a:effectLst/>
-                        <a:latin typeface="+mn-lt"/>
-                        <a:ea typeface="+mn-ea"/>
-                        <a:cs typeface="+mn-cs"/>
-                      </a:endParaRPr>
-                    </a:p>
-                  </a:txBody>
-                  <a:tcPr/>
-                </a:tc>
-                <a:tc>
-                  <a:txBody>
-                    <a:bodyPr/>
-                    <a:lstStyle/>
-                    <a:p>
-                      <a:r>
-                        <a:rPr kumimoji="0" lang="es-AR" sz="1400" kern="1200" dirty="0" err="1" smtClean="0">
-                          <a:solidFill>
-                            <a:schemeClr val="dk1"/>
-                          </a:solidFill>
-                          <a:latin typeface="+mn-lt"/>
-                          <a:ea typeface="+mn-ea"/>
-                          <a:cs typeface="+mn-cs"/>
-                        </a:rPr>
-                        <a:t>Branches</a:t>
-                      </a:r>
-                      <a:endParaRPr kumimoji="0" lang="es-AR" sz="1400" kern="1200" dirty="0">
-                        <a:solidFill>
-                          <a:schemeClr val="dk1"/>
-                        </a:solidFill>
-                        <a:latin typeface="+mn-lt"/>
-                        <a:ea typeface="+mn-ea"/>
-                        <a:cs typeface="+mn-cs"/>
-                      </a:endParaRPr>
-                    </a:p>
-                  </a:txBody>
-                  <a:tcPr/>
-                </a:tc>
-                <a:tc>
-                  <a:txBody>
-                    <a:bodyPr/>
-                    <a:lstStyle/>
-                    <a:p>
-                      <a:r>
-                        <a:rPr kumimoji="0" lang="es-AR" sz="1400" kern="1200" dirty="0" err="1" smtClean="0">
-                          <a:solidFill>
-                            <a:schemeClr val="dk1"/>
-                          </a:solidFill>
-                          <a:latin typeface="+mn-lt"/>
-                          <a:ea typeface="+mn-ea"/>
-                          <a:cs typeface="+mn-cs"/>
-                        </a:rPr>
-                        <a:t>Branches</a:t>
-                      </a:r>
-                      <a:endParaRPr kumimoji="0" lang="es-AR" sz="1400" kern="1200" dirty="0">
-                        <a:solidFill>
-                          <a:schemeClr val="dk1"/>
-                        </a:solidFill>
-                        <a:latin typeface="+mn-lt"/>
-                        <a:ea typeface="+mn-ea"/>
-                        <a:cs typeface="+mn-cs"/>
-                      </a:endParaRPr>
-                    </a:p>
-                  </a:txBody>
-                  <a:tcPr/>
-                </a:tc>
-              </a:tr>
-              <a:tr h="675075">
-                <a:tc>
-                  <a:txBody>
-                    <a:bodyPr/>
-                    <a:lstStyle/>
-                    <a:p>
-                      <a:pPr marL="0" marR="0" lvl="0" indent="0" algn="l" defTabSz="914400" rtl="0" eaLnBrk="1" fontAlgn="auto" latinLnBrk="0" hangingPunct="1">
-                        <a:lnSpc>
-                          <a:spcPct val="100000"/>
-                        </a:lnSpc>
-                        <a:spcBef>
-                          <a:spcPts val="0"/>
-                        </a:spcBef>
-                        <a:spcAft>
-                          <a:spcPts val="0"/>
-                        </a:spcAft>
-                        <a:buClrTx/>
-                        <a:buSzTx/>
-                        <a:buFontTx/>
-                        <a:buNone/>
-                        <a:tabLst/>
-                        <a:defRPr/>
-                      </a:pPr>
-                      <a:r>
-                        <a:rPr kumimoji="0" lang="es-ES" sz="1400" kern="1200" dirty="0" smtClean="0">
-                          <a:solidFill>
-                            <a:schemeClr val="dk1"/>
-                          </a:solidFill>
-                          <a:effectLst/>
-                          <a:latin typeface="+mn-lt"/>
-                          <a:ea typeface="+mn-ea"/>
-                          <a:cs typeface="+mn-cs"/>
-                        </a:rPr>
-                        <a:t>Órdenes/comandos y sus objetivos</a:t>
-                      </a:r>
-                      <a:endParaRPr kumimoji="0" lang="es-AR" sz="1400" kern="1200" dirty="0" smtClean="0">
-                        <a:solidFill>
-                          <a:schemeClr val="dk1"/>
-                        </a:solidFill>
-                        <a:effectLst/>
-                        <a:latin typeface="+mn-lt"/>
-                        <a:ea typeface="+mn-ea"/>
-                        <a:cs typeface="+mn-cs"/>
-                      </a:endParaRPr>
-                    </a:p>
-                  </a:txBody>
-                  <a:tcPr/>
-                </a:tc>
-                <a:tc>
-                  <a:txBody>
-                    <a:bodyPr/>
-                    <a:lstStyle/>
-                    <a:p>
-                      <a:r>
-                        <a:rPr kumimoji="0" lang="es-AR" sz="1400" kern="1200" dirty="0" smtClean="0">
-                          <a:solidFill>
-                            <a:schemeClr val="dk1"/>
-                          </a:solidFill>
-                          <a:latin typeface="+mn-lt"/>
-                          <a:ea typeface="+mn-ea"/>
-                          <a:cs typeface="+mn-cs"/>
-                        </a:rPr>
-                        <a:t>svn help</a:t>
-                      </a:r>
-                    </a:p>
-                    <a:p>
-                      <a:r>
-                        <a:rPr kumimoji="0" lang="es-AR" sz="1400" kern="1200" dirty="0" smtClean="0">
-                          <a:solidFill>
-                            <a:schemeClr val="dk1"/>
-                          </a:solidFill>
-                          <a:latin typeface="+mn-lt"/>
-                          <a:ea typeface="+mn-ea"/>
-                          <a:cs typeface="+mn-cs"/>
-                        </a:rPr>
-                        <a:t>svn checkout</a:t>
-                      </a:r>
-                    </a:p>
-                    <a:p>
-                      <a:r>
-                        <a:rPr kumimoji="0" lang="es-AR" sz="1400" kern="1200" dirty="0" smtClean="0">
-                          <a:solidFill>
-                            <a:schemeClr val="dk1"/>
-                          </a:solidFill>
-                          <a:latin typeface="+mn-lt"/>
-                          <a:ea typeface="+mn-ea"/>
-                          <a:cs typeface="+mn-cs"/>
-                        </a:rPr>
-                        <a:t>svn update</a:t>
-                      </a:r>
-                    </a:p>
-                    <a:p>
-                      <a:r>
-                        <a:rPr kumimoji="0" lang="es-AR" sz="1400" kern="1200" dirty="0" smtClean="0">
-                          <a:solidFill>
-                            <a:schemeClr val="dk1"/>
-                          </a:solidFill>
-                          <a:latin typeface="+mn-lt"/>
-                          <a:ea typeface="+mn-ea"/>
-                          <a:cs typeface="+mn-cs"/>
-                        </a:rPr>
-                        <a:t>svn add</a:t>
-                      </a:r>
-                    </a:p>
-                    <a:p>
-                      <a:r>
-                        <a:rPr kumimoji="0" lang="es-AR" sz="1400" kern="1200" dirty="0" smtClean="0">
-                          <a:solidFill>
-                            <a:schemeClr val="dk1"/>
-                          </a:solidFill>
-                          <a:latin typeface="+mn-lt"/>
-                          <a:ea typeface="+mn-ea"/>
-                          <a:cs typeface="+mn-cs"/>
-                        </a:rPr>
-                        <a:t>svn delete</a:t>
-                      </a:r>
-                    </a:p>
-                    <a:p>
-                      <a:r>
-                        <a:rPr kumimoji="0" lang="es-AR" sz="1400" kern="1200" dirty="0" smtClean="0">
-                          <a:solidFill>
-                            <a:schemeClr val="dk1"/>
-                          </a:solidFill>
-                          <a:latin typeface="+mn-lt"/>
-                          <a:ea typeface="+mn-ea"/>
-                          <a:cs typeface="+mn-cs"/>
-                        </a:rPr>
-                        <a:t>svn merge</a:t>
-                      </a:r>
-                    </a:p>
-                    <a:p>
-                      <a:r>
-                        <a:rPr kumimoji="0" lang="es-AR" sz="1400" kern="1200" dirty="0" smtClean="0">
-                          <a:solidFill>
-                            <a:schemeClr val="dk1"/>
-                          </a:solidFill>
-                          <a:latin typeface="+mn-lt"/>
-                          <a:ea typeface="+mn-ea"/>
-                          <a:cs typeface="+mn-cs"/>
-                        </a:rPr>
-                        <a:t>svn diff</a:t>
-                      </a:r>
-                    </a:p>
-                    <a:p>
-                      <a:r>
-                        <a:rPr kumimoji="0" lang="es-AR" sz="1400" kern="1200" dirty="0" smtClean="0">
-                          <a:solidFill>
-                            <a:schemeClr val="dk1"/>
-                          </a:solidFill>
-                          <a:latin typeface="+mn-lt"/>
-                          <a:ea typeface="+mn-ea"/>
-                          <a:cs typeface="+mn-cs"/>
-                        </a:rPr>
-                        <a:t>svn commit </a:t>
-                      </a:r>
-                      <a:endParaRPr kumimoji="0" lang="es-AR" sz="1400" kern="1200" dirty="0">
-                        <a:solidFill>
-                          <a:schemeClr val="dk1"/>
-                        </a:solidFill>
-                        <a:latin typeface="+mn-lt"/>
-                        <a:ea typeface="+mn-ea"/>
-                        <a:cs typeface="+mn-cs"/>
-                      </a:endParaRPr>
-                    </a:p>
-                  </a:txBody>
-                  <a:tcPr/>
-                </a:tc>
-                <a:tc>
-                  <a:txBody>
-                    <a:bodyPr/>
-                    <a:lstStyle/>
-                    <a:p>
-                      <a:r>
-                        <a:rPr kumimoji="0" lang="es-AR" sz="1400" kern="1200" dirty="0" smtClean="0">
-                          <a:solidFill>
-                            <a:schemeClr val="dk1"/>
-                          </a:solidFill>
-                          <a:latin typeface="+mn-lt"/>
-                          <a:ea typeface="+mn-ea"/>
-                          <a:cs typeface="+mn-cs"/>
-                        </a:rPr>
-                        <a:t>hg help</a:t>
-                      </a:r>
-                    </a:p>
-                    <a:p>
-                      <a:r>
-                        <a:rPr kumimoji="0" lang="es-AR" sz="1400" kern="1200" dirty="0" smtClean="0">
-                          <a:solidFill>
-                            <a:schemeClr val="dk1"/>
-                          </a:solidFill>
-                          <a:latin typeface="+mn-lt"/>
-                          <a:ea typeface="+mn-ea"/>
-                          <a:cs typeface="+mn-cs"/>
-                        </a:rPr>
-                        <a:t>hg clone </a:t>
-                      </a:r>
-                    </a:p>
-                    <a:p>
-                      <a:r>
-                        <a:rPr kumimoji="0" lang="es-AR" sz="1400" kern="1200" dirty="0" smtClean="0">
-                          <a:solidFill>
-                            <a:schemeClr val="dk1"/>
-                          </a:solidFill>
-                          <a:latin typeface="+mn-lt"/>
-                          <a:ea typeface="+mn-ea"/>
-                          <a:cs typeface="+mn-cs"/>
-                        </a:rPr>
-                        <a:t>hg update </a:t>
-                      </a:r>
-                    </a:p>
-                    <a:p>
-                      <a:r>
-                        <a:rPr kumimoji="0" lang="es-AR" sz="1400" kern="1200" dirty="0" smtClean="0">
-                          <a:solidFill>
-                            <a:schemeClr val="dk1"/>
-                          </a:solidFill>
-                          <a:latin typeface="+mn-lt"/>
-                          <a:ea typeface="+mn-ea"/>
-                          <a:cs typeface="+mn-cs"/>
-                        </a:rPr>
-                        <a:t>hg add</a:t>
-                      </a:r>
-                    </a:p>
-                    <a:p>
-                      <a:r>
-                        <a:rPr kumimoji="0" lang="es-AR" sz="1400" kern="1200" dirty="0" smtClean="0">
-                          <a:solidFill>
-                            <a:schemeClr val="dk1"/>
-                          </a:solidFill>
-                          <a:latin typeface="+mn-lt"/>
-                          <a:ea typeface="+mn-ea"/>
-                          <a:cs typeface="+mn-cs"/>
-                        </a:rPr>
-                        <a:t>hg remove</a:t>
-                      </a:r>
-                    </a:p>
-                    <a:p>
-                      <a:r>
-                        <a:rPr kumimoji="0" lang="es-AR" sz="1400" kern="1200" dirty="0" smtClean="0">
-                          <a:solidFill>
-                            <a:schemeClr val="dk1"/>
-                          </a:solidFill>
-                          <a:latin typeface="+mn-lt"/>
-                          <a:ea typeface="+mn-ea"/>
-                          <a:cs typeface="+mn-cs"/>
-                        </a:rPr>
-                        <a:t>hg merge</a:t>
-                      </a:r>
-                    </a:p>
-                    <a:p>
-                      <a:r>
-                        <a:rPr kumimoji="0" lang="es-AR" sz="1400" kern="1200" dirty="0" smtClean="0">
-                          <a:solidFill>
-                            <a:schemeClr val="dk1"/>
-                          </a:solidFill>
-                          <a:latin typeface="+mn-lt"/>
-                          <a:ea typeface="+mn-ea"/>
-                          <a:cs typeface="+mn-cs"/>
-                        </a:rPr>
-                        <a:t>hg diff </a:t>
-                      </a:r>
-                    </a:p>
-                    <a:p>
-                      <a:r>
-                        <a:rPr kumimoji="0" lang="es-AR" sz="1400" kern="1200" dirty="0" smtClean="0">
-                          <a:solidFill>
-                            <a:schemeClr val="dk1"/>
-                          </a:solidFill>
-                          <a:latin typeface="+mn-lt"/>
-                          <a:ea typeface="+mn-ea"/>
-                          <a:cs typeface="+mn-cs"/>
-                        </a:rPr>
-                        <a:t>hg commit</a:t>
-                      </a:r>
-                    </a:p>
-                    <a:p>
-                      <a:r>
-                        <a:rPr kumimoji="0" lang="es-AR" sz="1400" kern="1200" dirty="0" smtClean="0">
-                          <a:solidFill>
-                            <a:schemeClr val="dk1"/>
-                          </a:solidFill>
-                          <a:latin typeface="+mn-lt"/>
-                          <a:ea typeface="+mn-ea"/>
-                          <a:cs typeface="+mn-cs"/>
-                        </a:rPr>
-                        <a:t>hg push </a:t>
-                      </a:r>
-                    </a:p>
-                    <a:p>
-                      <a:r>
-                        <a:rPr kumimoji="0" lang="es-AR" sz="1400" kern="1200" dirty="0" smtClean="0">
-                          <a:solidFill>
-                            <a:schemeClr val="dk1"/>
-                          </a:solidFill>
-                          <a:latin typeface="+mn-lt"/>
-                          <a:ea typeface="+mn-ea"/>
-                          <a:cs typeface="+mn-cs"/>
-                        </a:rPr>
-                        <a:t>hg pull </a:t>
-                      </a:r>
-                      <a:endParaRPr kumimoji="0" lang="es-AR" sz="1400" kern="1200" dirty="0">
-                        <a:solidFill>
-                          <a:schemeClr val="dk1"/>
-                        </a:solidFill>
-                        <a:latin typeface="+mn-lt"/>
-                        <a:ea typeface="+mn-ea"/>
-                        <a:cs typeface="+mn-cs"/>
-                      </a:endParaRPr>
-                    </a:p>
-                  </a:txBody>
-                  <a:tcPr/>
-                </a:tc>
-              </a:tr>
-              <a:tr h="675075">
-                <a:tc>
-                  <a:txBody>
-                    <a:bodyPr/>
-                    <a:lstStyle/>
-                    <a:p>
-                      <a:pPr marL="0" marR="0" lvl="0" indent="0" algn="l" defTabSz="914400" rtl="0" eaLnBrk="1" fontAlgn="auto" latinLnBrk="0" hangingPunct="1">
-                        <a:lnSpc>
-                          <a:spcPct val="100000"/>
-                        </a:lnSpc>
-                        <a:spcBef>
-                          <a:spcPts val="0"/>
-                        </a:spcBef>
-                        <a:spcAft>
-                          <a:spcPts val="0"/>
-                        </a:spcAft>
-                        <a:buClrTx/>
-                        <a:buSzTx/>
-                        <a:buFontTx/>
-                        <a:buNone/>
-                        <a:tabLst/>
-                        <a:defRPr/>
-                      </a:pPr>
-                      <a:r>
-                        <a:rPr kumimoji="0" lang="es-ES" sz="1400" kern="1200" dirty="0" smtClean="0">
-                          <a:solidFill>
-                            <a:schemeClr val="dk1"/>
-                          </a:solidFill>
-                          <a:effectLst/>
-                          <a:latin typeface="+mn-lt"/>
-                          <a:ea typeface="+mn-ea"/>
-                          <a:cs typeface="+mn-cs"/>
-                        </a:rPr>
-                        <a:t>Administración del Repositorio</a:t>
-                      </a:r>
-                      <a:endParaRPr kumimoji="0" lang="es-AR" sz="1400" kern="1200" dirty="0" smtClean="0">
-                        <a:solidFill>
-                          <a:schemeClr val="dk1"/>
-                        </a:solidFill>
-                        <a:effectLst/>
-                        <a:latin typeface="+mn-lt"/>
-                        <a:ea typeface="+mn-ea"/>
-                        <a:cs typeface="+mn-cs"/>
-                      </a:endParaRPr>
-                    </a:p>
-                  </a:txBody>
-                  <a:tcPr/>
-                </a:tc>
-                <a:tc>
-                  <a:txBody>
-                    <a:bodyPr/>
-                    <a:lstStyle/>
-                    <a:p>
-                      <a:endParaRPr kumimoji="0" lang="es-AR" sz="1400" kern="1200" dirty="0">
-                        <a:solidFill>
-                          <a:schemeClr val="dk1"/>
-                        </a:solidFill>
-                        <a:latin typeface="+mn-lt"/>
-                        <a:ea typeface="+mn-ea"/>
-                        <a:cs typeface="+mn-cs"/>
-                      </a:endParaRPr>
-                    </a:p>
-                  </a:txBody>
-                  <a:tcPr/>
-                </a:tc>
-                <a:tc>
-                  <a:txBody>
-                    <a:bodyPr/>
-                    <a:lstStyle/>
-                    <a:p>
-                      <a:endParaRPr kumimoji="0" lang="es-AR" sz="1400" kern="1200" dirty="0">
-                        <a:solidFill>
-                          <a:schemeClr val="dk1"/>
-                        </a:solidFill>
-                        <a:latin typeface="+mn-lt"/>
-                        <a:ea typeface="+mn-ea"/>
-                        <a:cs typeface="+mn-cs"/>
-                      </a:endParaRPr>
-                    </a:p>
-                  </a:txBody>
-                  <a:tcPr/>
-                </a:tc>
-              </a:tr>
-            </a:tbl>
-          </a:graphicData>
-        </a:graphic>
-      </p:graphicFrame>
+          </p:nvPr>
+        </p:nvSpPr>
+        <p:spPr>
+          <a:xfrm>
+            <a:off x="457200" y="620688"/>
+            <a:ext cx="8229600" cy="5953848"/>
+          </a:xfrm>
+        </p:spPr>
+        <p:txBody>
+          <a:bodyPr/>
+          <a:lstStyle/>
+          <a:p>
+            <a:pPr marL="0" indent="0">
+              <a:buNone/>
+            </a:pPr>
+            <a:r>
+              <a:rPr lang="es-AR" b="1" dirty="0">
+                <a:solidFill>
+                  <a:srgbClr val="002060"/>
+                </a:solidFill>
+              </a:rPr>
+              <a:t>Gestionar cambios a través del tiempo</a:t>
+            </a:r>
+          </a:p>
+          <a:p>
+            <a:pPr marL="0" indent="0">
+              <a:buNone/>
+            </a:pPr>
+            <a:endParaRPr lang="es-AR" dirty="0">
+              <a:solidFill>
+                <a:srgbClr val="002060"/>
+              </a:solidFill>
+            </a:endParaRPr>
+          </a:p>
+          <a:p>
+            <a:r>
+              <a:rPr lang="es-AR" dirty="0" smtClean="0"/>
+              <a:t>Mercurial recuerda </a:t>
+            </a:r>
+            <a:r>
+              <a:rPr lang="es-AR" dirty="0"/>
+              <a:t>cada cambio que se haya</a:t>
+            </a:r>
+          </a:p>
+          <a:p>
+            <a:pPr marL="109728" indent="0">
+              <a:buNone/>
+            </a:pPr>
+            <a:r>
+              <a:rPr lang="es-AR" dirty="0"/>
+              <a:t>   realizado en el repositorio.</a:t>
+            </a:r>
+          </a:p>
+          <a:p>
+            <a:r>
+              <a:rPr lang="es-AR" dirty="0"/>
+              <a:t>Recuerda cambios realizados a cada </a:t>
+            </a:r>
+            <a:r>
+              <a:rPr lang="es-AR" dirty="0" smtClean="0"/>
+              <a:t>archivo.</a:t>
+            </a:r>
+          </a:p>
+          <a:p>
+            <a:r>
+              <a:rPr lang="es-AR" dirty="0" smtClean="0"/>
+              <a:t>El </a:t>
+            </a:r>
+            <a:r>
+              <a:rPr lang="es-AR" dirty="0"/>
+              <a:t>seguimiento de los cambios se realiza en el repositorio y en un solo </a:t>
+            </a:r>
+            <a:r>
+              <a:rPr lang="es-AR" dirty="0" smtClean="0"/>
+              <a:t>archivo.</a:t>
+            </a:r>
+            <a:endParaRPr lang="es-AR" dirty="0"/>
+          </a:p>
+          <a:p>
+            <a:pPr marL="109728" indent="0">
+              <a:buNone/>
+            </a:pPr>
+            <a:endParaRPr lang="es-AR" dirty="0"/>
+          </a:p>
+        </p:txBody>
+      </p:sp>
     </p:spTree>
     <p:extLst>
       <p:ext uri="{BB962C8B-B14F-4D97-AF65-F5344CB8AC3E}">
-        <p14:creationId xmlns:p14="http://schemas.microsoft.com/office/powerpoint/2010/main" val="3225919242"/>
+        <p14:creationId xmlns:p14="http://schemas.microsoft.com/office/powerpoint/2010/main" val="1175817311"/>
       </p:ext>
     </p:extLst>
   </p:cSld>
@@ -6111,573 +5877,39 @@
           <a:chExt cx="0" cy="0"/>
         </a:xfrm>
       </p:grpSpPr>
-      <p:graphicFrame>
-        <p:nvGraphicFramePr>
-          <p:cNvPr id="4" name="4 Marcador de contenido"/>
-          <p:cNvGraphicFramePr>
-            <a:graphicFrameLocks noGrp="1"/>
-          </p:cNvGraphicFramePr>
+      <p:pic>
+        <p:nvPicPr>
+          <p:cNvPr id="4" name="3 Marcador de contenido"/>
+          <p:cNvPicPr>
+            <a:picLocks noGrp="1" noChangeAspect="1"/>
+          </p:cNvPicPr>
           <p:nvPr>
             <p:ph idx="1"/>
-            <p:extLst>
-              <p:ext uri="{D42A27DB-BD31-4B8C-83A1-F6EECF244321}">
-                <p14:modId xmlns:p14="http://schemas.microsoft.com/office/powerpoint/2010/main" val="1355639915"/>
-              </p:ext>
-            </p:extLst>
-          </p:nvPr>
-        </p:nvGraphicFramePr>
-        <p:xfrm>
-          <a:off x="457200" y="692696"/>
-          <a:ext cx="8229600" cy="4285260"/>
-        </p:xfrm>
-        <a:graphic>
-          <a:graphicData uri="http://schemas.openxmlformats.org/drawingml/2006/table">
-            <a:tbl>
-              <a:tblPr firstRow="1" bandRow="1">
-                <a:tableStyleId>{5C22544A-7EE6-4342-B048-85BDC9FD1C3A}</a:tableStyleId>
-              </a:tblPr>
-              <a:tblGrid>
-                <a:gridCol w="2743200"/>
-                <a:gridCol w="2743200"/>
-                <a:gridCol w="2743200"/>
-              </a:tblGrid>
-              <a:tr h="675075">
-                <a:tc>
-                  <a:txBody>
-                    <a:bodyPr/>
-                    <a:lstStyle/>
-                    <a:p>
-                      <a:endParaRPr lang="es-AR" dirty="0"/>
-                    </a:p>
-                  </a:txBody>
-                  <a:tcPr/>
-                </a:tc>
-                <a:tc>
-                  <a:txBody>
-                    <a:bodyPr/>
-                    <a:lstStyle/>
-                    <a:p>
-                      <a:r>
-                        <a:rPr lang="es-AR" dirty="0" smtClean="0"/>
-                        <a:t>Subversion</a:t>
-                      </a:r>
-                      <a:endParaRPr lang="es-AR" dirty="0"/>
-                    </a:p>
-                  </a:txBody>
-                  <a:tcPr/>
-                </a:tc>
-                <a:tc>
-                  <a:txBody>
-                    <a:bodyPr/>
-                    <a:lstStyle/>
-                    <a:p>
-                      <a:r>
-                        <a:rPr lang="es-AR" dirty="0" smtClean="0"/>
-                        <a:t>Mercurial</a:t>
-                      </a:r>
-                    </a:p>
-                  </a:txBody>
-                  <a:tcPr/>
-                </a:tc>
-              </a:tr>
-              <a:tr h="675075">
-                <a:tc>
-                  <a:txBody>
-                    <a:bodyPr/>
-                    <a:lstStyle/>
-                    <a:p>
-                      <a:pPr marL="0" marR="0" lvl="0" indent="0" algn="l" defTabSz="914400" rtl="0" eaLnBrk="1" fontAlgn="auto" latinLnBrk="0" hangingPunct="1">
-                        <a:lnSpc>
-                          <a:spcPct val="100000"/>
-                        </a:lnSpc>
-                        <a:spcBef>
-                          <a:spcPts val="0"/>
-                        </a:spcBef>
-                        <a:spcAft>
-                          <a:spcPts val="0"/>
-                        </a:spcAft>
-                        <a:buClrTx/>
-                        <a:buSzTx/>
-                        <a:buFontTx/>
-                        <a:buNone/>
-                        <a:tabLst/>
-                        <a:defRPr/>
-                      </a:pPr>
-                      <a:r>
-                        <a:rPr kumimoji="0" lang="es-ES" sz="1400" kern="1200" dirty="0" smtClean="0">
-                          <a:solidFill>
-                            <a:schemeClr val="dk1"/>
-                          </a:solidFill>
-                          <a:effectLst/>
-                          <a:latin typeface="+mn-lt"/>
-                          <a:ea typeface="+mn-ea"/>
-                          <a:cs typeface="+mn-cs"/>
-                        </a:rPr>
-                        <a:t>Control de acceso </a:t>
-                      </a:r>
-                      <a:endParaRPr kumimoji="0" lang="es-AR" sz="1400" kern="1200" dirty="0" smtClean="0">
-                        <a:solidFill>
-                          <a:schemeClr val="dk1"/>
-                        </a:solidFill>
-                        <a:effectLst/>
-                        <a:latin typeface="+mn-lt"/>
-                        <a:ea typeface="+mn-ea"/>
-                        <a:cs typeface="+mn-cs"/>
-                      </a:endParaRPr>
-                    </a:p>
-                  </a:txBody>
-                  <a:tcPr/>
-                </a:tc>
-                <a:tc>
-                  <a:txBody>
-                    <a:bodyPr/>
-                    <a:lstStyle/>
-                    <a:p>
-                      <a:r>
-                        <a:rPr kumimoji="0" lang="es-AR" sz="1400" kern="1200" noProof="0" dirty="0" smtClean="0">
-                          <a:solidFill>
-                            <a:schemeClr val="dk1"/>
-                          </a:solidFill>
-                          <a:latin typeface="+mn-lt"/>
-                          <a:ea typeface="+mn-ea"/>
-                          <a:cs typeface="+mn-cs"/>
-                        </a:rPr>
-                        <a:t>Con un servidor apache con soporte para el protocolo HTTPS.</a:t>
-                      </a:r>
-                      <a:endParaRPr kumimoji="0" lang="es-AR" sz="1400" kern="1200" dirty="0">
-                        <a:solidFill>
-                          <a:schemeClr val="dk1"/>
-                        </a:solidFill>
-                        <a:latin typeface="+mn-lt"/>
-                        <a:ea typeface="+mn-ea"/>
-                        <a:cs typeface="+mn-cs"/>
-                      </a:endParaRPr>
-                    </a:p>
-                  </a:txBody>
-                  <a:tcPr/>
-                </a:tc>
-                <a:tc>
-                  <a:txBody>
-                    <a:bodyPr/>
-                    <a:lstStyle/>
-                    <a:p>
-                      <a:r>
-                        <a:rPr kumimoji="0" lang="es-AR" sz="1400" kern="1200" dirty="0" smtClean="0">
-                          <a:solidFill>
-                            <a:schemeClr val="dk1"/>
-                          </a:solidFill>
-                          <a:latin typeface="+mn-lt"/>
-                          <a:ea typeface="+mn-ea"/>
-                          <a:cs typeface="+mn-cs"/>
-                        </a:rPr>
-                        <a:t>Con una cuenta SSH compartida.</a:t>
-                      </a:r>
-                    </a:p>
-                    <a:p>
-                      <a:r>
-                        <a:rPr kumimoji="0" lang="es-AR" sz="1400" kern="1200" dirty="0" smtClean="0">
-                          <a:solidFill>
-                            <a:schemeClr val="dk1"/>
-                          </a:solidFill>
-                          <a:latin typeface="+mn-lt"/>
-                          <a:ea typeface="+mn-ea"/>
-                          <a:cs typeface="+mn-cs"/>
-                        </a:rPr>
-                        <a:t>Con un servidor apache con soporte para el protocolo HTTPS y scripts .cgi Con un grupo de usuarios del sistema de archivos.</a:t>
-                      </a:r>
-                      <a:endParaRPr kumimoji="0" lang="es-AR" sz="1400" kern="1200" dirty="0">
-                        <a:solidFill>
-                          <a:schemeClr val="dk1"/>
-                        </a:solidFill>
-                        <a:latin typeface="+mn-lt"/>
-                        <a:ea typeface="+mn-ea"/>
-                        <a:cs typeface="+mn-cs"/>
-                      </a:endParaRPr>
-                    </a:p>
-                  </a:txBody>
-                  <a:tcPr/>
-                </a:tc>
-              </a:tr>
-              <a:tr h="675075">
-                <a:tc>
-                  <a:txBody>
-                    <a:bodyPr/>
-                    <a:lstStyle/>
-                    <a:p>
-                      <a:pPr marL="0" marR="0" lvl="0" indent="0" algn="l" defTabSz="914400" rtl="0" eaLnBrk="1" fontAlgn="auto" latinLnBrk="0" hangingPunct="1">
-                        <a:lnSpc>
-                          <a:spcPct val="100000"/>
-                        </a:lnSpc>
-                        <a:spcBef>
-                          <a:spcPts val="0"/>
-                        </a:spcBef>
-                        <a:spcAft>
-                          <a:spcPts val="0"/>
-                        </a:spcAft>
-                        <a:buClrTx/>
-                        <a:buSzTx/>
-                        <a:buFontTx/>
-                        <a:buNone/>
-                        <a:tabLst/>
-                        <a:defRPr/>
-                      </a:pPr>
-                      <a:r>
-                        <a:rPr kumimoji="0" lang="es-ES" sz="1400" kern="1200" dirty="0" smtClean="0">
-                          <a:solidFill>
-                            <a:schemeClr val="dk1"/>
-                          </a:solidFill>
-                          <a:effectLst/>
-                          <a:latin typeface="+mn-lt"/>
-                          <a:ea typeface="+mn-ea"/>
-                          <a:cs typeface="+mn-cs"/>
-                        </a:rPr>
-                        <a:t>Control de sincronización</a:t>
-                      </a:r>
-                      <a:endParaRPr kumimoji="0" lang="es-AR" sz="1400" kern="1200" dirty="0" smtClean="0">
-                        <a:solidFill>
-                          <a:schemeClr val="dk1"/>
-                        </a:solidFill>
-                        <a:effectLst/>
-                        <a:latin typeface="+mn-lt"/>
-                        <a:ea typeface="+mn-ea"/>
-                        <a:cs typeface="+mn-cs"/>
-                      </a:endParaRPr>
-                    </a:p>
-                  </a:txBody>
-                  <a:tcPr/>
-                </a:tc>
-                <a:tc>
-                  <a:txBody>
-                    <a:bodyPr/>
-                    <a:lstStyle/>
-                    <a:p>
-                      <a:r>
-                        <a:rPr lang="es-AR" sz="1400" dirty="0" err="1" smtClean="0"/>
-                        <a:t>Checkout</a:t>
-                      </a:r>
-                      <a:r>
-                        <a:rPr lang="es-AR" sz="1400" dirty="0" smtClean="0"/>
-                        <a:t> , </a:t>
-                      </a:r>
-                      <a:r>
-                        <a:rPr lang="es-AR" sz="1400" dirty="0" err="1" smtClean="0"/>
-                        <a:t>Update</a:t>
-                      </a:r>
-                      <a:r>
-                        <a:rPr lang="es-AR" sz="1400" dirty="0" smtClean="0"/>
-                        <a:t>, </a:t>
-                      </a:r>
-                      <a:r>
-                        <a:rPr lang="es-AR" sz="1400" dirty="0" err="1" smtClean="0"/>
-                        <a:t>Commit</a:t>
-                      </a:r>
-                      <a:r>
-                        <a:rPr lang="es-AR" sz="1400" dirty="0" smtClean="0"/>
-                        <a:t>.</a:t>
-                      </a:r>
-                      <a:endParaRPr kumimoji="0" lang="es-AR" sz="1400" kern="1200" dirty="0">
-                        <a:solidFill>
-                          <a:schemeClr val="dk1"/>
-                        </a:solidFill>
-                        <a:latin typeface="+mn-lt"/>
-                        <a:ea typeface="+mn-ea"/>
-                        <a:cs typeface="+mn-cs"/>
-                      </a:endParaRPr>
-                    </a:p>
-                  </a:txBody>
-                  <a:tcPr/>
-                </a:tc>
-                <a:tc>
-                  <a:txBody>
-                    <a:bodyPr/>
-                    <a:lstStyle/>
-                    <a:p>
-                      <a:r>
-                        <a:rPr kumimoji="0" lang="es-AR" sz="1400" kern="1200" dirty="0" smtClean="0">
-                          <a:solidFill>
-                            <a:schemeClr val="dk1"/>
-                          </a:solidFill>
-                          <a:latin typeface="+mn-lt"/>
-                          <a:ea typeface="+mn-ea"/>
-                          <a:cs typeface="+mn-cs"/>
-                        </a:rPr>
-                        <a:t>Clone, </a:t>
-                      </a:r>
-                      <a:r>
-                        <a:rPr kumimoji="0" lang="es-AR" sz="1400" kern="1200" dirty="0" err="1" smtClean="0">
-                          <a:solidFill>
-                            <a:schemeClr val="dk1"/>
-                          </a:solidFill>
-                          <a:latin typeface="+mn-lt"/>
-                          <a:ea typeface="+mn-ea"/>
-                          <a:cs typeface="+mn-cs"/>
-                        </a:rPr>
-                        <a:t>Push</a:t>
-                      </a:r>
-                      <a:r>
-                        <a:rPr kumimoji="0" lang="es-AR" sz="1400" kern="1200" dirty="0" smtClean="0">
-                          <a:solidFill>
-                            <a:schemeClr val="dk1"/>
-                          </a:solidFill>
-                          <a:latin typeface="+mn-lt"/>
-                          <a:ea typeface="+mn-ea"/>
-                          <a:cs typeface="+mn-cs"/>
-                        </a:rPr>
-                        <a:t>, </a:t>
-                      </a:r>
-                      <a:r>
-                        <a:rPr kumimoji="0" lang="es-AR" sz="1400" kern="1200" dirty="0" err="1" smtClean="0">
-                          <a:solidFill>
-                            <a:schemeClr val="dk1"/>
-                          </a:solidFill>
-                          <a:latin typeface="+mn-lt"/>
-                          <a:ea typeface="+mn-ea"/>
-                          <a:cs typeface="+mn-cs"/>
-                        </a:rPr>
-                        <a:t>Pull</a:t>
-                      </a:r>
-                      <a:r>
-                        <a:rPr kumimoji="0" lang="es-AR" sz="1400" kern="1200" dirty="0" smtClean="0">
-                          <a:solidFill>
-                            <a:schemeClr val="dk1"/>
-                          </a:solidFill>
-                          <a:latin typeface="+mn-lt"/>
-                          <a:ea typeface="+mn-ea"/>
-                          <a:cs typeface="+mn-cs"/>
-                        </a:rPr>
-                        <a:t>,</a:t>
-                      </a:r>
-                      <a:r>
-                        <a:rPr kumimoji="0" lang="es-AR" sz="1400" kern="1200" baseline="0" dirty="0" smtClean="0">
-                          <a:solidFill>
-                            <a:schemeClr val="dk1"/>
-                          </a:solidFill>
-                          <a:latin typeface="+mn-lt"/>
-                          <a:ea typeface="+mn-ea"/>
-                          <a:cs typeface="+mn-cs"/>
-                        </a:rPr>
-                        <a:t> </a:t>
-                      </a:r>
-                      <a:r>
-                        <a:rPr kumimoji="0" lang="es-AR" sz="1400" kern="1200" baseline="0" dirty="0" err="1" smtClean="0">
-                          <a:solidFill>
-                            <a:schemeClr val="dk1"/>
-                          </a:solidFill>
-                          <a:latin typeface="+mn-lt"/>
-                          <a:ea typeface="+mn-ea"/>
-                          <a:cs typeface="+mn-cs"/>
-                        </a:rPr>
-                        <a:t>Commit</a:t>
-                      </a:r>
-                      <a:r>
-                        <a:rPr kumimoji="0" lang="es-AR" sz="1400" kern="1200" baseline="0" dirty="0" smtClean="0">
-                          <a:solidFill>
-                            <a:schemeClr val="dk1"/>
-                          </a:solidFill>
-                          <a:latin typeface="+mn-lt"/>
-                          <a:ea typeface="+mn-ea"/>
-                          <a:cs typeface="+mn-cs"/>
-                        </a:rPr>
-                        <a:t>, </a:t>
-                      </a:r>
-                      <a:r>
-                        <a:rPr kumimoji="0" lang="es-AR" sz="1400" kern="1200" baseline="0" dirty="0" err="1" smtClean="0">
-                          <a:solidFill>
-                            <a:schemeClr val="dk1"/>
-                          </a:solidFill>
-                          <a:latin typeface="+mn-lt"/>
-                          <a:ea typeface="+mn-ea"/>
-                          <a:cs typeface="+mn-cs"/>
-                        </a:rPr>
-                        <a:t>Update</a:t>
-                      </a:r>
-                      <a:r>
-                        <a:rPr kumimoji="0" lang="es-AR" sz="1400" kern="1200" baseline="0" dirty="0" smtClean="0">
-                          <a:solidFill>
-                            <a:schemeClr val="dk1"/>
-                          </a:solidFill>
-                          <a:latin typeface="+mn-lt"/>
-                          <a:ea typeface="+mn-ea"/>
-                          <a:cs typeface="+mn-cs"/>
-                        </a:rPr>
-                        <a:t>.</a:t>
-                      </a:r>
-                      <a:endParaRPr kumimoji="0" lang="es-AR" sz="1400" kern="1200" dirty="0">
-                        <a:solidFill>
-                          <a:schemeClr val="dk1"/>
-                        </a:solidFill>
-                        <a:latin typeface="+mn-lt"/>
-                        <a:ea typeface="+mn-ea"/>
-                        <a:cs typeface="+mn-cs"/>
-                      </a:endParaRPr>
-                    </a:p>
-                  </a:txBody>
-                  <a:tcPr/>
-                </a:tc>
-              </a:tr>
-              <a:tr h="675075">
-                <a:tc>
-                  <a:txBody>
-                    <a:bodyPr/>
-                    <a:lstStyle/>
-                    <a:p>
-                      <a:r>
-                        <a:rPr lang="es-AR" sz="1400" dirty="0" smtClean="0"/>
-                        <a:t>Cliente</a:t>
-                      </a:r>
-                      <a:endParaRPr lang="es-AR" sz="1400" dirty="0"/>
-                    </a:p>
-                  </a:txBody>
-                  <a:tcPr/>
-                </a:tc>
-                <a:tc>
-                  <a:txBody>
-                    <a:bodyPr/>
-                    <a:lstStyle/>
-                    <a:p>
-                      <a:r>
-                        <a:rPr kumimoji="0" lang="es-AR" sz="1400" kern="1200" dirty="0" smtClean="0">
-                          <a:solidFill>
-                            <a:schemeClr val="dk1"/>
-                          </a:solidFill>
-                          <a:latin typeface="+mn-lt"/>
-                          <a:ea typeface="+mn-ea"/>
-                          <a:cs typeface="+mn-cs"/>
-                        </a:rPr>
-                        <a:t>TortoiseSvn.</a:t>
-                      </a:r>
-                      <a:endParaRPr kumimoji="0" lang="es-AR" sz="1400" kern="1200" dirty="0">
-                        <a:solidFill>
-                          <a:schemeClr val="dk1"/>
-                        </a:solidFill>
-                        <a:latin typeface="+mn-lt"/>
-                        <a:ea typeface="+mn-ea"/>
-                        <a:cs typeface="+mn-cs"/>
-                      </a:endParaRPr>
-                    </a:p>
-                  </a:txBody>
-                  <a:tcPr/>
-                </a:tc>
-                <a:tc>
-                  <a:txBody>
-                    <a:bodyPr/>
-                    <a:lstStyle/>
-                    <a:p>
-                      <a:r>
-                        <a:rPr kumimoji="0" lang="es-AR" sz="1400" kern="1200" dirty="0" smtClean="0">
-                          <a:solidFill>
-                            <a:schemeClr val="dk1"/>
-                          </a:solidFill>
-                          <a:latin typeface="+mn-lt"/>
-                          <a:ea typeface="+mn-ea"/>
-                          <a:cs typeface="+mn-cs"/>
-                        </a:rPr>
-                        <a:t>TortoiseHg.</a:t>
-                      </a:r>
-                      <a:endParaRPr kumimoji="0" lang="es-AR" sz="1400" kern="1200" dirty="0">
-                        <a:solidFill>
-                          <a:schemeClr val="dk1"/>
-                        </a:solidFill>
-                        <a:latin typeface="+mn-lt"/>
-                        <a:ea typeface="+mn-ea"/>
-                        <a:cs typeface="+mn-cs"/>
-                      </a:endParaRPr>
-                    </a:p>
-                  </a:txBody>
-                  <a:tcPr/>
-                </a:tc>
-              </a:tr>
-              <a:tr h="675075">
-                <a:tc>
-                  <a:txBody>
-                    <a:bodyPr/>
-                    <a:lstStyle/>
-                    <a:p>
-                      <a:pPr marL="0" marR="0" lvl="0" indent="0" algn="l" defTabSz="914400" rtl="0" eaLnBrk="1" fontAlgn="auto" latinLnBrk="0" hangingPunct="1">
-                        <a:lnSpc>
-                          <a:spcPct val="100000"/>
-                        </a:lnSpc>
-                        <a:spcBef>
-                          <a:spcPts val="0"/>
-                        </a:spcBef>
-                        <a:spcAft>
-                          <a:spcPts val="0"/>
-                        </a:spcAft>
-                        <a:buClrTx/>
-                        <a:buSzTx/>
-                        <a:buFontTx/>
-                        <a:buNone/>
-                        <a:tabLst/>
-                        <a:defRPr/>
-                      </a:pPr>
-                      <a:r>
-                        <a:rPr kumimoji="0" lang="es-ES" sz="1400" kern="1200" dirty="0" smtClean="0">
-                          <a:solidFill>
-                            <a:schemeClr val="dk1"/>
-                          </a:solidFill>
-                          <a:effectLst/>
-                          <a:latin typeface="+mn-lt"/>
-                          <a:ea typeface="+mn-ea"/>
-                          <a:cs typeface="+mn-cs"/>
-                        </a:rPr>
-                        <a:t>Manejo de gestión de cambios</a:t>
-                      </a:r>
-                      <a:endParaRPr kumimoji="0" lang="es-AR" sz="1400" kern="1200" dirty="0" smtClean="0">
-                        <a:solidFill>
-                          <a:schemeClr val="dk1"/>
-                        </a:solidFill>
-                        <a:effectLst/>
-                        <a:latin typeface="+mn-lt"/>
-                        <a:ea typeface="+mn-ea"/>
-                        <a:cs typeface="+mn-cs"/>
-                      </a:endParaRPr>
-                    </a:p>
-                  </a:txBody>
-                  <a:tcPr/>
-                </a:tc>
-                <a:tc>
-                  <a:txBody>
-                    <a:bodyPr/>
-                    <a:lstStyle/>
-                    <a:p>
-                      <a:endParaRPr kumimoji="0" lang="es-AR" sz="1400" kern="1200" dirty="0">
-                        <a:solidFill>
-                          <a:schemeClr val="dk1"/>
-                        </a:solidFill>
-                        <a:latin typeface="+mn-lt"/>
-                        <a:ea typeface="+mn-ea"/>
-                        <a:cs typeface="+mn-cs"/>
-                      </a:endParaRPr>
-                    </a:p>
-                  </a:txBody>
-                  <a:tcPr/>
-                </a:tc>
-                <a:tc>
-                  <a:txBody>
-                    <a:bodyPr/>
-                    <a:lstStyle/>
-                    <a:p>
-                      <a:endParaRPr kumimoji="0" lang="es-AR" sz="1400" kern="1200" dirty="0">
-                        <a:solidFill>
-                          <a:schemeClr val="dk1"/>
-                        </a:solidFill>
-                        <a:latin typeface="+mn-lt"/>
-                        <a:ea typeface="+mn-ea"/>
-                        <a:cs typeface="+mn-cs"/>
-                      </a:endParaRPr>
-                    </a:p>
-                  </a:txBody>
-                  <a:tcPr/>
-                </a:tc>
-              </a:tr>
-            </a:tbl>
-          </a:graphicData>
-        </a:graphic>
-      </p:graphicFrame>
+          </p:nvPr>
+        </p:nvPicPr>
+        <p:blipFill>
+          <a:blip r:embed="rId2">
+            <a:extLst>
+              <a:ext uri="{28A0092B-C50C-407E-A947-70E740481C1C}">
+                <a14:useLocalDpi xmlns:a14="http://schemas.microsoft.com/office/drawing/2010/main" val="0"/>
+              </a:ext>
+            </a:extLst>
+          </a:blip>
+          <a:stretch>
+            <a:fillRect/>
+          </a:stretch>
+        </p:blipFill>
+        <p:spPr>
+          <a:xfrm>
+            <a:off x="18729" y="1484784"/>
+            <a:ext cx="9157539" cy="4320480"/>
+          </a:xfrm>
+        </p:spPr>
+      </p:pic>
     </p:spTree>
     <p:extLst>
       <p:ext uri="{BB962C8B-B14F-4D97-AF65-F5344CB8AC3E}">
-        <p14:creationId xmlns:p14="http://schemas.microsoft.com/office/powerpoint/2010/main" val="296890870"/>
+        <p14:creationId xmlns:p14="http://schemas.microsoft.com/office/powerpoint/2010/main" val="4021751853"/>
       </p:ext>
     </p:extLst>
   </p:cSld>
@@ -6704,70 +5936,24 @@
           <a:chExt cx="0" cy="0"/>
         </a:xfrm>
       </p:grpSpPr>
-      <p:sp>
-        <p:nvSpPr>
-          <p:cNvPr id="3" name="2 Marcador de contenido"/>
-          <p:cNvSpPr>
-            <a:spLocks noGrp="1"/>
-          </p:cNvSpPr>
-          <p:nvPr>
-            <p:ph idx="1"/>
-          </p:nvPr>
-        </p:nvSpPr>
-        <p:spPr>
-          <a:xfrm>
-            <a:off x="457200" y="476672"/>
-            <a:ext cx="8229600" cy="6097864"/>
-          </a:xfrm>
-        </p:spPr>
-        <p:txBody>
-          <a:bodyPr/>
-          <a:lstStyle/>
-          <a:p>
-            <a:pPr marL="0" indent="0">
-              <a:buNone/>
-            </a:pPr>
-            <a:r>
-              <a:rPr lang="es-AR" dirty="0" smtClean="0"/>
-              <a:t>Comparación Subversion – </a:t>
-            </a:r>
-            <a:r>
-              <a:rPr lang="es-AR" dirty="0" smtClean="0"/>
-              <a:t>Jenkins</a:t>
-            </a:r>
-            <a:endParaRPr lang="es-AR" dirty="0" smtClean="0"/>
-          </a:p>
-          <a:p>
-            <a:pPr marL="0" indent="0">
-              <a:buNone/>
-            </a:pPr>
-            <a:endParaRPr lang="es-AR" dirty="0"/>
-          </a:p>
-          <a:p>
-            <a:pPr marL="0" indent="0">
-              <a:buNone/>
-            </a:pPr>
-            <a:endParaRPr lang="es-AR" dirty="0" smtClean="0"/>
-          </a:p>
-        </p:txBody>
-      </p:sp>
       <p:graphicFrame>
         <p:nvGraphicFramePr>
-          <p:cNvPr id="2" name="1 Tabla"/>
+          <p:cNvPr id="5" name="4 Marcador de contenido"/>
           <p:cNvGraphicFramePr>
             <a:graphicFrameLocks noGrp="1"/>
           </p:cNvGraphicFramePr>
           <p:nvPr>
+            <p:ph idx="1"/>
             <p:extLst>
               <p:ext uri="{D42A27DB-BD31-4B8C-83A1-F6EECF244321}">
-                <p14:modId xmlns:p14="http://schemas.microsoft.com/office/powerpoint/2010/main" val="1294287730"/>
+                <p14:modId xmlns:p14="http://schemas.microsoft.com/office/powerpoint/2010/main" val="278470830"/>
               </p:ext>
             </p:extLst>
           </p:nvPr>
         </p:nvGraphicFramePr>
         <p:xfrm>
-          <a:off x="971600" y="1397000"/>
-          <a:ext cx="7128792" cy="3352800"/>
+          <a:off x="457200" y="692696"/>
+          <a:ext cx="8229600" cy="5600415"/>
         </p:xfrm>
         <a:graphic>
           <a:graphicData uri="http://schemas.openxmlformats.org/drawingml/2006/table">
@@ -6776,24 +5962,50 @@
                 <a:tableStyleId>{5C22544A-7EE6-4342-B048-85BDC9FD1C3A}</a:tableStyleId>
               </a:tblPr>
               <a:tblGrid>
-                <a:gridCol w="3564396"/>
-                <a:gridCol w="3564396"/>
+                <a:gridCol w="2743200"/>
+                <a:gridCol w="2235696"/>
+                <a:gridCol w="3250704"/>
               </a:tblGrid>
-              <a:tr h="447824">
+              <a:tr h="675075">
                 <a:tc>
                   <a:txBody>
                     <a:bodyPr/>
                     <a:lstStyle/>
                     <a:p>
-                      <a:r>
-                        <a:rPr lang="es-AR" dirty="0" smtClean="0"/>
-                        <a:t>Subversion </a:t>
-                      </a:r>
                       <a:endParaRPr lang="es-AR" dirty="0"/>
                     </a:p>
                   </a:txBody>
                   <a:tcPr/>
                 </a:tc>
+                <a:tc>
+                  <a:txBody>
+                    <a:bodyPr/>
+                    <a:lstStyle/>
+                    <a:p>
+                      <a:r>
+                        <a:rPr lang="es-AR" dirty="0" smtClean="0"/>
+                        <a:t>Subversion</a:t>
+                      </a:r>
+                      <a:endParaRPr lang="es-AR" dirty="0"/>
+                    </a:p>
+                  </a:txBody>
+                  <a:tcPr/>
+                </a:tc>
+                <a:tc>
+                  <a:txBody>
+                    <a:bodyPr/>
+                    <a:lstStyle/>
+                    <a:p>
+                      <a:r>
+                        <a:rPr lang="es-AR" dirty="0" smtClean="0"/>
+                        <a:t>Mercurial</a:t>
+                      </a:r>
+                    </a:p>
+                  </a:txBody>
+                  <a:tcPr/>
+                </a:tc>
+              </a:tr>
+              <a:tr h="675075">
                 <a:tc>
                   <a:txBody>
                     <a:bodyPr/>
@@ -6817,29 +6029,17 @@
                         <a:defRPr/>
                       </a:pPr>
                       <a:r>
-                        <a:rPr lang="es-AR" dirty="0" smtClean="0"/>
-                        <a:t>Jenkins</a:t>
-                      </a:r>
-                      <a:endParaRPr lang="es-AR" dirty="0" smtClean="0"/>
+                        <a:rPr lang="es-AR" sz="1400" dirty="0" smtClean="0"/>
+                        <a:t>Servidor</a:t>
+                      </a:r>
+                      <a:r>
+                        <a:rPr lang="es-AR" sz="1400" baseline="0" dirty="0" smtClean="0"/>
+                        <a:t> de Control</a:t>
+                      </a:r>
+                      <a:endParaRPr lang="es-AR" sz="1400" dirty="0" smtClean="0"/>
                     </a:p>
                     <a:p>
                       <a:endParaRPr lang="es-AR" dirty="0"/>
-                    </a:p>
-                  </a:txBody>
-                  <a:tcPr/>
-                </a:tc>
-              </a:tr>
-              <a:tr h="370840">
-                <a:tc>
-                  <a:txBody>
-                    <a:bodyPr/>
-                    <a:lstStyle/>
-                    <a:p>
-                      <a:r>
-                        <a:rPr lang="es-AR" sz="1600" dirty="0" smtClean="0"/>
-                        <a:t>Lleva control de versiones</a:t>
-                      </a:r>
-                      <a:endParaRPr lang="es-AR" sz="1600" dirty="0"/>
                     </a:p>
                   </a:txBody>
                   <a:tcPr/>
@@ -6850,42 +6050,24 @@
                     <a:lstStyle/>
                     <a:p>
                       <a:r>
-                        <a:rPr lang="es-AR" sz="1600" dirty="0" smtClean="0"/>
-                        <a:t>Toma la última versión</a:t>
-                      </a:r>
-                      <a:r>
-                        <a:rPr lang="es-AR" sz="1600" baseline="0" dirty="0" smtClean="0"/>
-                        <a:t> del repositorio </a:t>
-                      </a:r>
-                      <a:r>
-                        <a:rPr lang="es-AR" sz="1600" baseline="0" dirty="0" err="1" smtClean="0"/>
-                        <a:t>subversion</a:t>
-                      </a:r>
-                      <a:r>
-                        <a:rPr lang="es-AR" sz="1600" baseline="0" dirty="0" smtClean="0"/>
-                        <a:t> para integrar el proyecto.</a:t>
-                      </a:r>
-                      <a:endParaRPr lang="es-AR" sz="1600" dirty="0"/>
-                    </a:p>
-                  </a:txBody>
-                  <a:tcPr/>
-                </a:tc>
-              </a:tr>
-              <a:tr h="370840">
-                <a:tc>
-                  <a:txBody>
-                    <a:bodyPr/>
-                    <a:lstStyle/>
-                    <a:p>
-                      <a:r>
-                        <a:rPr lang="es-AR" sz="1600" dirty="0" smtClean="0"/>
-                        <a:t>Ejecución según la</a:t>
-                      </a:r>
-                      <a:r>
-                        <a:rPr lang="es-AR" sz="1600" baseline="0" dirty="0" smtClean="0"/>
-                        <a:t> necesidad del usuario.</a:t>
-                      </a:r>
-                      <a:endParaRPr lang="es-AR" sz="1600" dirty="0"/>
+                        <a:rPr kumimoji="0" lang="es-AR" sz="1400" kern="1200" dirty="0" smtClean="0">
+                          <a:solidFill>
+                            <a:schemeClr val="dk1"/>
+                          </a:solidFill>
+                          <a:latin typeface="+mn-lt"/>
+                          <a:ea typeface="+mn-ea"/>
+                          <a:cs typeface="+mn-cs"/>
+                        </a:rPr>
+                        <a:t>Servidor de manejo centralizado.</a:t>
+                      </a:r>
+                      <a:endParaRPr kumimoji="0" lang="es-AR" sz="1400" kern="1200" dirty="0">
+                        <a:solidFill>
+                          <a:schemeClr val="dk1"/>
+                        </a:solidFill>
+                        <a:latin typeface="+mn-lt"/>
+                        <a:ea typeface="+mn-ea"/>
+                        <a:cs typeface="+mn-cs"/>
+                      </a:endParaRPr>
                     </a:p>
                   </a:txBody>
                   <a:tcPr/>
@@ -6896,30 +6078,40 @@
                     <a:lstStyle/>
                     <a:p>
                       <a:r>
-                        <a:rPr lang="es-AR" sz="1600" dirty="0" smtClean="0"/>
-                        <a:t>Ejecución planificada.</a:t>
-                      </a:r>
-                      <a:endParaRPr lang="es-AR" sz="1600" dirty="0"/>
+                        <a:rPr kumimoji="0" lang="es-AR" sz="1400" kern="1200" dirty="0" smtClean="0">
+                          <a:solidFill>
+                            <a:schemeClr val="dk1"/>
+                          </a:solidFill>
+                          <a:latin typeface="+mn-lt"/>
+                          <a:ea typeface="+mn-ea"/>
+                          <a:cs typeface="+mn-cs"/>
+                        </a:rPr>
+                        <a:t>Servidor de manejo distribuido.</a:t>
+                      </a:r>
+                      <a:endParaRPr kumimoji="0" lang="es-AR" sz="1400" kern="1200" dirty="0">
+                        <a:solidFill>
+                          <a:schemeClr val="dk1"/>
+                        </a:solidFill>
+                        <a:latin typeface="+mn-lt"/>
+                        <a:ea typeface="+mn-ea"/>
+                        <a:cs typeface="+mn-cs"/>
+                      </a:endParaRPr>
                     </a:p>
                   </a:txBody>
                   <a:tcPr/>
                 </a:tc>
               </a:tr>
-              <a:tr h="370840">
+              <a:tr h="675075">
                 <a:tc>
                   <a:txBody>
                     <a:bodyPr/>
                     <a:lstStyle/>
                     <a:p>
                       <a:r>
-                        <a:rPr lang="es-AR" sz="1600" dirty="0" smtClean="0"/>
-                        <a:t>Si hay errores en el código, no</a:t>
-                      </a:r>
-                      <a:r>
-                        <a:rPr lang="es-AR" sz="1600" baseline="0" dirty="0" smtClean="0"/>
-                        <a:t> son manejados.</a:t>
-                      </a:r>
-                      <a:endParaRPr lang="es-AR" sz="1600" dirty="0"/>
+                        <a:rPr lang="es-AR" sz="1400" dirty="0" smtClean="0"/>
+                        <a:t>Manejo de Versiones</a:t>
+                      </a:r>
+                      <a:endParaRPr lang="es-AR" sz="1400" dirty="0"/>
                     </a:p>
                   </a:txBody>
                   <a:tcPr/>
@@ -6929,7 +6121,65 @@
                     <a:bodyPr/>
                     <a:lstStyle/>
                     <a:p>
-                      <a:pPr marL="0" marR="0" indent="0" algn="l" defTabSz="914400" rtl="0" eaLnBrk="1" fontAlgn="auto" latinLnBrk="0" hangingPunct="1">
+                      <a:r>
+                        <a:rPr kumimoji="0" lang="es-AR" sz="1400" kern="1200" dirty="0" smtClean="0">
+                          <a:solidFill>
+                            <a:schemeClr val="dk1"/>
+                          </a:solidFill>
+                          <a:latin typeface="+mn-lt"/>
+                          <a:ea typeface="+mn-ea"/>
+                          <a:cs typeface="+mn-cs"/>
+                        </a:rPr>
+                        <a:t>Versionado de directorios y archivos.</a:t>
+                      </a:r>
+                      <a:endParaRPr kumimoji="0" lang="es-AR" sz="1400" kern="1200" dirty="0">
+                        <a:solidFill>
+                          <a:schemeClr val="dk1"/>
+                        </a:solidFill>
+                        <a:latin typeface="+mn-lt"/>
+                        <a:ea typeface="+mn-ea"/>
+                        <a:cs typeface="+mn-cs"/>
+                      </a:endParaRPr>
+                    </a:p>
+                  </a:txBody>
+                  <a:tcPr/>
+                </a:tc>
+                <a:tc>
+                  <a:txBody>
+                    <a:bodyPr/>
+                    <a:lstStyle/>
+                    <a:p>
+                      <a:r>
+                        <a:rPr kumimoji="0" lang="es-AR" sz="1400" kern="1200" dirty="0" smtClean="0">
+                          <a:solidFill>
+                            <a:schemeClr val="dk1"/>
+                          </a:solidFill>
+                          <a:latin typeface="+mn-lt"/>
+                          <a:ea typeface="+mn-ea"/>
+                          <a:cs typeface="+mn-cs"/>
+                        </a:rPr>
+                        <a:t>Versionado de archivos.</a:t>
+                      </a:r>
+                      <a:endParaRPr kumimoji="0" lang="es-AR" sz="1400" kern="1200" dirty="0">
+                        <a:solidFill>
+                          <a:schemeClr val="dk1"/>
+                        </a:solidFill>
+                        <a:latin typeface="+mn-lt"/>
+                        <a:ea typeface="+mn-ea"/>
+                        <a:cs typeface="+mn-cs"/>
+                      </a:endParaRPr>
+                    </a:p>
+                  </a:txBody>
+                  <a:tcPr/>
+                </a:tc>
+              </a:tr>
+              <a:tr h="675075">
+                <a:tc>
+                  <a:txBody>
+                    <a:bodyPr/>
+                    <a:lstStyle/>
+                    <a:p>
+                      <a:pPr marL="0" marR="0" lvl="0" indent="0" algn="l" defTabSz="914400" rtl="0" eaLnBrk="1" fontAlgn="auto" latinLnBrk="0" hangingPunct="1">
                         <a:lnSpc>
                           <a:spcPct val="100000"/>
                         </a:lnSpc>
@@ -6947,17 +6197,478 @@
                         <a:defRPr/>
                       </a:pPr>
                       <a:r>
-                        <a:rPr lang="es-AR" sz="1600" dirty="0" smtClean="0"/>
-                        <a:t>Si hay errores en el código, la</a:t>
-                      </a:r>
-                      <a:r>
-                        <a:rPr lang="es-AR" sz="1600" baseline="0" dirty="0" smtClean="0"/>
-                        <a:t> construcción y sus dependencias son bloqueadas hasta solucionar los errores.</a:t>
-                      </a:r>
-                      <a:endParaRPr lang="es-AR" sz="1600" dirty="0" smtClean="0"/>
-                    </a:p>
-                    <a:p>
-                      <a:endParaRPr lang="es-AR" sz="1600" dirty="0"/>
+                        <a:rPr kumimoji="0" lang="es-ES" sz="1400" kern="1200" dirty="0" smtClean="0">
+                          <a:solidFill>
+                            <a:schemeClr val="dk1"/>
+                          </a:solidFill>
+                          <a:effectLst/>
+                          <a:latin typeface="+mn-lt"/>
+                          <a:ea typeface="+mn-ea"/>
+                          <a:cs typeface="+mn-cs"/>
+                        </a:rPr>
+                        <a:t>Manejo de variaciones</a:t>
+                      </a:r>
+                      <a:endParaRPr kumimoji="0" lang="es-AR" sz="1400" kern="1200" dirty="0" smtClean="0">
+                        <a:solidFill>
+                          <a:schemeClr val="dk1"/>
+                        </a:solidFill>
+                        <a:effectLst/>
+                        <a:latin typeface="+mn-lt"/>
+                        <a:ea typeface="+mn-ea"/>
+                        <a:cs typeface="+mn-cs"/>
+                      </a:endParaRPr>
+                    </a:p>
+                  </a:txBody>
+                  <a:tcPr/>
+                </a:tc>
+                <a:tc>
+                  <a:txBody>
+                    <a:bodyPr/>
+                    <a:lstStyle/>
+                    <a:p>
+                      <a:r>
+                        <a:rPr kumimoji="0" lang="es-AR" sz="1400" kern="1200" dirty="0" err="1" smtClean="0">
+                          <a:solidFill>
+                            <a:schemeClr val="dk1"/>
+                          </a:solidFill>
+                          <a:latin typeface="+mn-lt"/>
+                          <a:ea typeface="+mn-ea"/>
+                          <a:cs typeface="+mn-cs"/>
+                        </a:rPr>
+                        <a:t>Branches</a:t>
+                      </a:r>
+                      <a:endParaRPr kumimoji="0" lang="es-AR" sz="1400" kern="1200" dirty="0">
+                        <a:solidFill>
+                          <a:schemeClr val="dk1"/>
+                        </a:solidFill>
+                        <a:latin typeface="+mn-lt"/>
+                        <a:ea typeface="+mn-ea"/>
+                        <a:cs typeface="+mn-cs"/>
+                      </a:endParaRPr>
+                    </a:p>
+                  </a:txBody>
+                  <a:tcPr/>
+                </a:tc>
+                <a:tc>
+                  <a:txBody>
+                    <a:bodyPr/>
+                    <a:lstStyle/>
+                    <a:p>
+                      <a:r>
+                        <a:rPr kumimoji="0" lang="es-AR" sz="1400" kern="1200" dirty="0" err="1" smtClean="0">
+                          <a:solidFill>
+                            <a:schemeClr val="dk1"/>
+                          </a:solidFill>
+                          <a:latin typeface="+mn-lt"/>
+                          <a:ea typeface="+mn-ea"/>
+                          <a:cs typeface="+mn-cs"/>
+                        </a:rPr>
+                        <a:t>Branches</a:t>
+                      </a:r>
+                      <a:endParaRPr kumimoji="0" lang="es-AR" sz="1400" kern="1200" dirty="0">
+                        <a:solidFill>
+                          <a:schemeClr val="dk1"/>
+                        </a:solidFill>
+                        <a:latin typeface="+mn-lt"/>
+                        <a:ea typeface="+mn-ea"/>
+                        <a:cs typeface="+mn-cs"/>
+                      </a:endParaRPr>
+                    </a:p>
+                  </a:txBody>
+                  <a:tcPr/>
+                </a:tc>
+              </a:tr>
+              <a:tr h="675075">
+                <a:tc>
+                  <a:txBody>
+                    <a:bodyPr/>
+                    <a:lstStyle/>
+                    <a:p>
+                      <a:pPr marL="0" marR="0" lvl="0" indent="0" algn="l" defTabSz="914400" rtl="0" eaLnBrk="1" fontAlgn="auto" latinLnBrk="0" hangingPunct="1">
+                        <a:lnSpc>
+                          <a:spcPct val="100000"/>
+                        </a:lnSpc>
+                        <a:spcBef>
+                          <a:spcPts val="0"/>
+                        </a:spcBef>
+                        <a:spcAft>
+                          <a:spcPts val="0"/>
+                        </a:spcAft>
+                        <a:buClrTx/>
+                        <a:buSzTx/>
+                        <a:buFontTx/>
+                        <a:buNone/>
+                        <a:tabLst/>
+                        <a:defRPr/>
+                      </a:pPr>
+                      <a:r>
+                        <a:rPr kumimoji="0" lang="es-ES" sz="1400" kern="1200" dirty="0" smtClean="0">
+                          <a:solidFill>
+                            <a:schemeClr val="dk1"/>
+                          </a:solidFill>
+                          <a:effectLst/>
+                          <a:latin typeface="+mn-lt"/>
+                          <a:ea typeface="+mn-ea"/>
+                          <a:cs typeface="+mn-cs"/>
+                        </a:rPr>
+                        <a:t>Órdenes/comandos y sus objetivos</a:t>
+                      </a:r>
+                      <a:endParaRPr kumimoji="0" lang="es-AR" sz="1400" kern="1200" dirty="0" smtClean="0">
+                        <a:solidFill>
+                          <a:schemeClr val="dk1"/>
+                        </a:solidFill>
+                        <a:effectLst/>
+                        <a:latin typeface="+mn-lt"/>
+                        <a:ea typeface="+mn-ea"/>
+                        <a:cs typeface="+mn-cs"/>
+                      </a:endParaRPr>
+                    </a:p>
+                  </a:txBody>
+                  <a:tcPr/>
+                </a:tc>
+                <a:tc>
+                  <a:txBody>
+                    <a:bodyPr/>
+                    <a:lstStyle/>
+                    <a:p>
+                      <a:r>
+                        <a:rPr kumimoji="0" lang="es-AR" sz="1400" kern="1200" dirty="0" smtClean="0">
+                          <a:solidFill>
+                            <a:schemeClr val="dk1"/>
+                          </a:solidFill>
+                          <a:latin typeface="+mn-lt"/>
+                          <a:ea typeface="+mn-ea"/>
+                          <a:cs typeface="+mn-cs"/>
+                        </a:rPr>
+                        <a:t>svn help</a:t>
+                      </a:r>
+                    </a:p>
+                    <a:p>
+                      <a:r>
+                        <a:rPr kumimoji="0" lang="es-AR" sz="1400" kern="1200" dirty="0" smtClean="0">
+                          <a:solidFill>
+                            <a:schemeClr val="dk1"/>
+                          </a:solidFill>
+                          <a:latin typeface="+mn-lt"/>
+                          <a:ea typeface="+mn-ea"/>
+                          <a:cs typeface="+mn-cs"/>
+                        </a:rPr>
+                        <a:t>svn checkout</a:t>
+                      </a:r>
+                    </a:p>
+                    <a:p>
+                      <a:r>
+                        <a:rPr kumimoji="0" lang="es-AR" sz="1400" kern="1200" dirty="0" smtClean="0">
+                          <a:solidFill>
+                            <a:schemeClr val="dk1"/>
+                          </a:solidFill>
+                          <a:latin typeface="+mn-lt"/>
+                          <a:ea typeface="+mn-ea"/>
+                          <a:cs typeface="+mn-cs"/>
+                        </a:rPr>
+                        <a:t>svn update</a:t>
+                      </a:r>
+                    </a:p>
+                    <a:p>
+                      <a:r>
+                        <a:rPr kumimoji="0" lang="es-AR" sz="1400" kern="1200" dirty="0" smtClean="0">
+                          <a:solidFill>
+                            <a:schemeClr val="dk1"/>
+                          </a:solidFill>
+                          <a:latin typeface="+mn-lt"/>
+                          <a:ea typeface="+mn-ea"/>
+                          <a:cs typeface="+mn-cs"/>
+                        </a:rPr>
+                        <a:t>svn add</a:t>
+                      </a:r>
+                    </a:p>
+                    <a:p>
+                      <a:r>
+                        <a:rPr kumimoji="0" lang="es-AR" sz="1400" kern="1200" dirty="0" smtClean="0">
+                          <a:solidFill>
+                            <a:schemeClr val="dk1"/>
+                          </a:solidFill>
+                          <a:latin typeface="+mn-lt"/>
+                          <a:ea typeface="+mn-ea"/>
+                          <a:cs typeface="+mn-cs"/>
+                        </a:rPr>
+                        <a:t>svn delete</a:t>
+                      </a:r>
+                    </a:p>
+                    <a:p>
+                      <a:r>
+                        <a:rPr kumimoji="0" lang="es-AR" sz="1400" kern="1200" dirty="0" smtClean="0">
+                          <a:solidFill>
+                            <a:schemeClr val="dk1"/>
+                          </a:solidFill>
+                          <a:latin typeface="+mn-lt"/>
+                          <a:ea typeface="+mn-ea"/>
+                          <a:cs typeface="+mn-cs"/>
+                        </a:rPr>
+                        <a:t>svn merge</a:t>
+                      </a:r>
+                    </a:p>
+                    <a:p>
+                      <a:r>
+                        <a:rPr kumimoji="0" lang="es-AR" sz="1400" kern="1200" dirty="0" smtClean="0">
+                          <a:solidFill>
+                            <a:schemeClr val="dk1"/>
+                          </a:solidFill>
+                          <a:latin typeface="+mn-lt"/>
+                          <a:ea typeface="+mn-ea"/>
+                          <a:cs typeface="+mn-cs"/>
+                        </a:rPr>
+                        <a:t>svn diff</a:t>
+                      </a:r>
+                    </a:p>
+                    <a:p>
+                      <a:r>
+                        <a:rPr kumimoji="0" lang="es-AR" sz="1400" kern="1200" dirty="0" smtClean="0">
+                          <a:solidFill>
+                            <a:schemeClr val="dk1"/>
+                          </a:solidFill>
+                          <a:latin typeface="+mn-lt"/>
+                          <a:ea typeface="+mn-ea"/>
+                          <a:cs typeface="+mn-cs"/>
+                        </a:rPr>
+                        <a:t>svn commit </a:t>
+                      </a:r>
+                      <a:endParaRPr kumimoji="0" lang="es-AR" sz="1400" kern="1200" dirty="0">
+                        <a:solidFill>
+                          <a:schemeClr val="dk1"/>
+                        </a:solidFill>
+                        <a:latin typeface="+mn-lt"/>
+                        <a:ea typeface="+mn-ea"/>
+                        <a:cs typeface="+mn-cs"/>
+                      </a:endParaRPr>
+                    </a:p>
+                  </a:txBody>
+                  <a:tcPr/>
+                </a:tc>
+                <a:tc>
+                  <a:txBody>
+                    <a:bodyPr/>
+                    <a:lstStyle/>
+                    <a:p>
+                      <a:r>
+                        <a:rPr kumimoji="0" lang="es-AR" sz="1400" kern="1200" dirty="0" smtClean="0">
+                          <a:solidFill>
+                            <a:schemeClr val="dk1"/>
+                          </a:solidFill>
+                          <a:latin typeface="+mn-lt"/>
+                          <a:ea typeface="+mn-ea"/>
+                          <a:cs typeface="+mn-cs"/>
+                        </a:rPr>
+                        <a:t>hg help</a:t>
+                      </a:r>
+                    </a:p>
+                    <a:p>
+                      <a:r>
+                        <a:rPr kumimoji="0" lang="es-AR" sz="1400" kern="1200" dirty="0" smtClean="0">
+                          <a:solidFill>
+                            <a:schemeClr val="dk1"/>
+                          </a:solidFill>
+                          <a:latin typeface="+mn-lt"/>
+                          <a:ea typeface="+mn-ea"/>
+                          <a:cs typeface="+mn-cs"/>
+                        </a:rPr>
+                        <a:t>hg clone </a:t>
+                      </a:r>
+                    </a:p>
+                    <a:p>
+                      <a:r>
+                        <a:rPr kumimoji="0" lang="es-AR" sz="1400" kern="1200" dirty="0" smtClean="0">
+                          <a:solidFill>
+                            <a:schemeClr val="dk1"/>
+                          </a:solidFill>
+                          <a:latin typeface="+mn-lt"/>
+                          <a:ea typeface="+mn-ea"/>
+                          <a:cs typeface="+mn-cs"/>
+                        </a:rPr>
+                        <a:t>hg update </a:t>
+                      </a:r>
+                    </a:p>
+                    <a:p>
+                      <a:r>
+                        <a:rPr kumimoji="0" lang="es-AR" sz="1400" kern="1200" dirty="0" smtClean="0">
+                          <a:solidFill>
+                            <a:schemeClr val="dk1"/>
+                          </a:solidFill>
+                          <a:latin typeface="+mn-lt"/>
+                          <a:ea typeface="+mn-ea"/>
+                          <a:cs typeface="+mn-cs"/>
+                        </a:rPr>
+                        <a:t>hg add</a:t>
+                      </a:r>
+                    </a:p>
+                    <a:p>
+                      <a:r>
+                        <a:rPr kumimoji="0" lang="es-AR" sz="1400" kern="1200" dirty="0" smtClean="0">
+                          <a:solidFill>
+                            <a:schemeClr val="dk1"/>
+                          </a:solidFill>
+                          <a:latin typeface="+mn-lt"/>
+                          <a:ea typeface="+mn-ea"/>
+                          <a:cs typeface="+mn-cs"/>
+                        </a:rPr>
+                        <a:t>hg remove</a:t>
+                      </a:r>
+                    </a:p>
+                    <a:p>
+                      <a:r>
+                        <a:rPr kumimoji="0" lang="es-AR" sz="1400" kern="1200" dirty="0" smtClean="0">
+                          <a:solidFill>
+                            <a:schemeClr val="dk1"/>
+                          </a:solidFill>
+                          <a:latin typeface="+mn-lt"/>
+                          <a:ea typeface="+mn-ea"/>
+                          <a:cs typeface="+mn-cs"/>
+                        </a:rPr>
+                        <a:t>hg merge</a:t>
+                      </a:r>
+                    </a:p>
+                    <a:p>
+                      <a:r>
+                        <a:rPr kumimoji="0" lang="es-AR" sz="1400" kern="1200" dirty="0" smtClean="0">
+                          <a:solidFill>
+                            <a:schemeClr val="dk1"/>
+                          </a:solidFill>
+                          <a:latin typeface="+mn-lt"/>
+                          <a:ea typeface="+mn-ea"/>
+                          <a:cs typeface="+mn-cs"/>
+                        </a:rPr>
+                        <a:t>hg diff </a:t>
+                      </a:r>
+                    </a:p>
+                    <a:p>
+                      <a:r>
+                        <a:rPr kumimoji="0" lang="es-AR" sz="1400" kern="1200" dirty="0" smtClean="0">
+                          <a:solidFill>
+                            <a:schemeClr val="dk1"/>
+                          </a:solidFill>
+                          <a:latin typeface="+mn-lt"/>
+                          <a:ea typeface="+mn-ea"/>
+                          <a:cs typeface="+mn-cs"/>
+                        </a:rPr>
+                        <a:t>hg commit</a:t>
+                      </a:r>
+                    </a:p>
+                    <a:p>
+                      <a:r>
+                        <a:rPr kumimoji="0" lang="es-AR" sz="1400" kern="1200" dirty="0" smtClean="0">
+                          <a:solidFill>
+                            <a:schemeClr val="dk1"/>
+                          </a:solidFill>
+                          <a:latin typeface="+mn-lt"/>
+                          <a:ea typeface="+mn-ea"/>
+                          <a:cs typeface="+mn-cs"/>
+                        </a:rPr>
+                        <a:t>hg push </a:t>
+                      </a:r>
+                    </a:p>
+                    <a:p>
+                      <a:r>
+                        <a:rPr kumimoji="0" lang="es-AR" sz="1400" kern="1200" dirty="0" smtClean="0">
+                          <a:solidFill>
+                            <a:schemeClr val="dk1"/>
+                          </a:solidFill>
+                          <a:latin typeface="+mn-lt"/>
+                          <a:ea typeface="+mn-ea"/>
+                          <a:cs typeface="+mn-cs"/>
+                        </a:rPr>
+                        <a:t>hg pull </a:t>
+                      </a:r>
+                      <a:endParaRPr kumimoji="0" lang="es-AR" sz="1400" kern="1200" dirty="0">
+                        <a:solidFill>
+                          <a:schemeClr val="dk1"/>
+                        </a:solidFill>
+                        <a:latin typeface="+mn-lt"/>
+                        <a:ea typeface="+mn-ea"/>
+                        <a:cs typeface="+mn-cs"/>
+                      </a:endParaRPr>
+                    </a:p>
+                  </a:txBody>
+                  <a:tcPr/>
+                </a:tc>
+              </a:tr>
+              <a:tr h="675075">
+                <a:tc>
+                  <a:txBody>
+                    <a:bodyPr/>
+                    <a:lstStyle/>
+                    <a:p>
+                      <a:pPr marL="0" marR="0" lvl="0" indent="0" algn="l" defTabSz="914400" rtl="0" eaLnBrk="1" fontAlgn="auto" latinLnBrk="0" hangingPunct="1">
+                        <a:lnSpc>
+                          <a:spcPct val="100000"/>
+                        </a:lnSpc>
+                        <a:spcBef>
+                          <a:spcPts val="0"/>
+                        </a:spcBef>
+                        <a:spcAft>
+                          <a:spcPts val="0"/>
+                        </a:spcAft>
+                        <a:buClrTx/>
+                        <a:buSzTx/>
+                        <a:buFontTx/>
+                        <a:buNone/>
+                        <a:tabLst/>
+                        <a:defRPr/>
+                      </a:pPr>
+                      <a:r>
+                        <a:rPr kumimoji="0" lang="es-ES" sz="1400" kern="1200" dirty="0" smtClean="0">
+                          <a:solidFill>
+                            <a:schemeClr val="dk1"/>
+                          </a:solidFill>
+                          <a:effectLst/>
+                          <a:latin typeface="+mn-lt"/>
+                          <a:ea typeface="+mn-ea"/>
+                          <a:cs typeface="+mn-cs"/>
+                        </a:rPr>
+                        <a:t>Administración del Repositorio</a:t>
+                      </a:r>
+                      <a:endParaRPr kumimoji="0" lang="es-AR" sz="1400" kern="1200" dirty="0" smtClean="0">
+                        <a:solidFill>
+                          <a:schemeClr val="dk1"/>
+                        </a:solidFill>
+                        <a:effectLst/>
+                        <a:latin typeface="+mn-lt"/>
+                        <a:ea typeface="+mn-ea"/>
+                        <a:cs typeface="+mn-cs"/>
+                      </a:endParaRPr>
+                    </a:p>
+                  </a:txBody>
+                  <a:tcPr/>
+                </a:tc>
+                <a:tc>
+                  <a:txBody>
+                    <a:bodyPr/>
+                    <a:lstStyle/>
+                    <a:p>
+                      <a:endParaRPr kumimoji="0" lang="es-AR" sz="1400" kern="1200" dirty="0">
+                        <a:solidFill>
+                          <a:schemeClr val="dk1"/>
+                        </a:solidFill>
+                        <a:latin typeface="+mn-lt"/>
+                        <a:ea typeface="+mn-ea"/>
+                        <a:cs typeface="+mn-cs"/>
+                      </a:endParaRPr>
+                    </a:p>
+                  </a:txBody>
+                  <a:tcPr/>
+                </a:tc>
+                <a:tc>
+                  <a:txBody>
+                    <a:bodyPr/>
+                    <a:lstStyle/>
+                    <a:p>
+                      <a:endParaRPr kumimoji="0" lang="es-AR" sz="1400" kern="1200" dirty="0">
+                        <a:solidFill>
+                          <a:schemeClr val="dk1"/>
+                        </a:solidFill>
+                        <a:latin typeface="+mn-lt"/>
+                        <a:ea typeface="+mn-ea"/>
+                        <a:cs typeface="+mn-cs"/>
+                      </a:endParaRPr>
                     </a:p>
                   </a:txBody>
                   <a:tcPr/>
@@ -6970,7 +6681,7 @@
     </p:spTree>
     <p:extLst>
       <p:ext uri="{BB962C8B-B14F-4D97-AF65-F5344CB8AC3E}">
-        <p14:creationId xmlns:p14="http://schemas.microsoft.com/office/powerpoint/2010/main" val="1167150941"/>
+        <p14:creationId xmlns:p14="http://schemas.microsoft.com/office/powerpoint/2010/main" val="3225919242"/>
       </p:ext>
     </p:extLst>
   </p:cSld>
@@ -6997,122 +6708,573 @@
           <a:chExt cx="0" cy="0"/>
         </a:xfrm>
       </p:grpSpPr>
-      <p:sp>
-        <p:nvSpPr>
-          <p:cNvPr id="3" name="2 Marcador de contenido"/>
-          <p:cNvSpPr>
-            <a:spLocks noGrp="1"/>
-          </p:cNvSpPr>
+      <p:graphicFrame>
+        <p:nvGraphicFramePr>
+          <p:cNvPr id="4" name="4 Marcador de contenido"/>
+          <p:cNvGraphicFramePr>
+            <a:graphicFrameLocks noGrp="1"/>
+          </p:cNvGraphicFramePr>
           <p:nvPr>
             <p:ph idx="1"/>
-          </p:nvPr>
-        </p:nvSpPr>
-        <p:spPr>
-          <a:xfrm>
-            <a:off x="457200" y="620688"/>
-            <a:ext cx="8229600" cy="5953848"/>
-          </a:xfrm>
-        </p:spPr>
-        <p:txBody>
-          <a:bodyPr>
-            <a:normAutofit lnSpcReduction="10000"/>
-          </a:bodyPr>
-          <a:lstStyle/>
-          <a:p>
-            <a:pPr marL="0" indent="0" algn="ctr">
-              <a:buNone/>
-            </a:pPr>
-            <a:r>
-              <a:rPr lang="es-AR" sz="3600" dirty="0" smtClean="0">
-                <a:solidFill>
-                  <a:schemeClr val="tx2"/>
-                </a:solidFill>
-              </a:rPr>
-              <a:t>Integración Continua</a:t>
-            </a:r>
-          </a:p>
-          <a:p>
-            <a:pPr marL="0" indent="0" algn="ctr">
-              <a:buNone/>
-            </a:pPr>
-            <a:r>
-              <a:rPr lang="es-AR" sz="3600" dirty="0">
-                <a:solidFill>
-                  <a:schemeClr val="tx2"/>
-                </a:solidFill>
-              </a:rPr>
-              <a:t>Jenkins </a:t>
-            </a:r>
-            <a:endParaRPr lang="es-AR" dirty="0" smtClean="0"/>
-          </a:p>
-          <a:p>
-            <a:r>
-              <a:rPr lang="es-AR" dirty="0" smtClean="0"/>
-              <a:t>“</a:t>
-            </a:r>
-            <a:r>
-              <a:rPr lang="es-AR" i="1" dirty="0"/>
-              <a:t>Jenkins</a:t>
-            </a:r>
-            <a:r>
-              <a:rPr lang="es-AR" dirty="0"/>
-              <a:t> es un servidor de integración continua Open </a:t>
-            </a:r>
-            <a:r>
-              <a:rPr lang="es-AR" dirty="0" err="1"/>
-              <a:t>Source</a:t>
-            </a:r>
-            <a:r>
-              <a:rPr lang="es-AR" dirty="0"/>
-              <a:t>. </a:t>
-            </a:r>
-            <a:r>
-              <a:rPr lang="es-AR" dirty="0" smtClean="0"/>
-              <a:t>Es una </a:t>
-            </a:r>
-            <a:r>
-              <a:rPr lang="es-AR" dirty="0"/>
-              <a:t>plataforma sobre la cual se pueden automatizar ciertos procesos. </a:t>
-            </a:r>
-          </a:p>
-          <a:p>
-            <a:r>
-              <a:rPr lang="es-AR" dirty="0"/>
-              <a:t>Su uso más difundido es en la generación de </a:t>
-            </a:r>
-            <a:r>
-              <a:rPr lang="es-AR" dirty="0" err="1"/>
-              <a:t>builds</a:t>
-            </a:r>
-            <a:r>
-              <a:rPr lang="es-AR" dirty="0"/>
-              <a:t> de aplicaciones a intervalos de tiempo para ejecutar una serie de pruebas sobre los mismos de forma automática. </a:t>
-            </a:r>
-            <a:r>
-              <a:rPr lang="es-AR" dirty="0" smtClean="0"/>
-              <a:t>Permite </a:t>
-            </a:r>
-            <a:r>
-              <a:rPr lang="es-AR" dirty="0"/>
-              <a:t>que el código nuevo se vaya integrando y probando de a poco. Esto permite detectar temprano fallos en las aplicaciones de manera que sea más fácil y menos costoso solucionar problemas.</a:t>
-            </a:r>
-          </a:p>
-          <a:p>
-            <a:pPr marL="0" indent="0" algn="ctr">
-              <a:buNone/>
-            </a:pPr>
-            <a:endParaRPr lang="es-AR" dirty="0">
-              <a:solidFill>
-                <a:schemeClr val="tx2"/>
-              </a:solidFill>
-            </a:endParaRPr>
-          </a:p>
-        </p:txBody>
-      </p:sp>
+            <p:extLst>
+              <p:ext uri="{D42A27DB-BD31-4B8C-83A1-F6EECF244321}">
+                <p14:modId xmlns:p14="http://schemas.microsoft.com/office/powerpoint/2010/main" val="1355639915"/>
+              </p:ext>
+            </p:extLst>
+          </p:nvPr>
+        </p:nvGraphicFramePr>
+        <p:xfrm>
+          <a:off x="457200" y="692696"/>
+          <a:ext cx="8229600" cy="4285260"/>
+        </p:xfrm>
+        <a:graphic>
+          <a:graphicData uri="http://schemas.openxmlformats.org/drawingml/2006/table">
+            <a:tbl>
+              <a:tblPr firstRow="1" bandRow="1">
+                <a:tableStyleId>{5C22544A-7EE6-4342-B048-85BDC9FD1C3A}</a:tableStyleId>
+              </a:tblPr>
+              <a:tblGrid>
+                <a:gridCol w="2743200"/>
+                <a:gridCol w="2743200"/>
+                <a:gridCol w="2743200"/>
+              </a:tblGrid>
+              <a:tr h="675075">
+                <a:tc>
+                  <a:txBody>
+                    <a:bodyPr/>
+                    <a:lstStyle/>
+                    <a:p>
+                      <a:endParaRPr lang="es-AR" dirty="0"/>
+                    </a:p>
+                  </a:txBody>
+                  <a:tcPr/>
+                </a:tc>
+                <a:tc>
+                  <a:txBody>
+                    <a:bodyPr/>
+                    <a:lstStyle/>
+                    <a:p>
+                      <a:r>
+                        <a:rPr lang="es-AR" dirty="0" smtClean="0"/>
+                        <a:t>Subversion</a:t>
+                      </a:r>
+                      <a:endParaRPr lang="es-AR" dirty="0"/>
+                    </a:p>
+                  </a:txBody>
+                  <a:tcPr/>
+                </a:tc>
+                <a:tc>
+                  <a:txBody>
+                    <a:bodyPr/>
+                    <a:lstStyle/>
+                    <a:p>
+                      <a:r>
+                        <a:rPr lang="es-AR" dirty="0" smtClean="0"/>
+                        <a:t>Mercurial</a:t>
+                      </a:r>
+                    </a:p>
+                  </a:txBody>
+                  <a:tcPr/>
+                </a:tc>
+              </a:tr>
+              <a:tr h="675075">
+                <a:tc>
+                  <a:txBody>
+                    <a:bodyPr/>
+                    <a:lstStyle/>
+                    <a:p>
+                      <a:pPr marL="0" marR="0" lvl="0" indent="0" algn="l" defTabSz="914400" rtl="0" eaLnBrk="1" fontAlgn="auto" latinLnBrk="0" hangingPunct="1">
+                        <a:lnSpc>
+                          <a:spcPct val="100000"/>
+                        </a:lnSpc>
+                        <a:spcBef>
+                          <a:spcPts val="0"/>
+                        </a:spcBef>
+                        <a:spcAft>
+                          <a:spcPts val="0"/>
+                        </a:spcAft>
+                        <a:buClrTx/>
+                        <a:buSzTx/>
+                        <a:buFontTx/>
+                        <a:buNone/>
+                        <a:tabLst/>
+                        <a:defRPr/>
+                      </a:pPr>
+                      <a:r>
+                        <a:rPr kumimoji="0" lang="es-ES" sz="1400" kern="1200" dirty="0" smtClean="0">
+                          <a:solidFill>
+                            <a:schemeClr val="dk1"/>
+                          </a:solidFill>
+                          <a:effectLst/>
+                          <a:latin typeface="+mn-lt"/>
+                          <a:ea typeface="+mn-ea"/>
+                          <a:cs typeface="+mn-cs"/>
+                        </a:rPr>
+                        <a:t>Control de acceso </a:t>
+                      </a:r>
+                      <a:endParaRPr kumimoji="0" lang="es-AR" sz="1400" kern="1200" dirty="0" smtClean="0">
+                        <a:solidFill>
+                          <a:schemeClr val="dk1"/>
+                        </a:solidFill>
+                        <a:effectLst/>
+                        <a:latin typeface="+mn-lt"/>
+                        <a:ea typeface="+mn-ea"/>
+                        <a:cs typeface="+mn-cs"/>
+                      </a:endParaRPr>
+                    </a:p>
+                  </a:txBody>
+                  <a:tcPr/>
+                </a:tc>
+                <a:tc>
+                  <a:txBody>
+                    <a:bodyPr/>
+                    <a:lstStyle/>
+                    <a:p>
+                      <a:r>
+                        <a:rPr kumimoji="0" lang="es-AR" sz="1400" kern="1200" noProof="0" dirty="0" smtClean="0">
+                          <a:solidFill>
+                            <a:schemeClr val="dk1"/>
+                          </a:solidFill>
+                          <a:latin typeface="+mn-lt"/>
+                          <a:ea typeface="+mn-ea"/>
+                          <a:cs typeface="+mn-cs"/>
+                        </a:rPr>
+                        <a:t>Con un servidor apache con soporte para el protocolo HTTPS.</a:t>
+                      </a:r>
+                      <a:endParaRPr kumimoji="0" lang="es-AR" sz="1400" kern="1200" dirty="0">
+                        <a:solidFill>
+                          <a:schemeClr val="dk1"/>
+                        </a:solidFill>
+                        <a:latin typeface="+mn-lt"/>
+                        <a:ea typeface="+mn-ea"/>
+                        <a:cs typeface="+mn-cs"/>
+                      </a:endParaRPr>
+                    </a:p>
+                  </a:txBody>
+                  <a:tcPr/>
+                </a:tc>
+                <a:tc>
+                  <a:txBody>
+                    <a:bodyPr/>
+                    <a:lstStyle/>
+                    <a:p>
+                      <a:r>
+                        <a:rPr kumimoji="0" lang="es-AR" sz="1400" kern="1200" dirty="0" smtClean="0">
+                          <a:solidFill>
+                            <a:schemeClr val="dk1"/>
+                          </a:solidFill>
+                          <a:latin typeface="+mn-lt"/>
+                          <a:ea typeface="+mn-ea"/>
+                          <a:cs typeface="+mn-cs"/>
+                        </a:rPr>
+                        <a:t>Con una cuenta SSH compartida.</a:t>
+                      </a:r>
+                    </a:p>
+                    <a:p>
+                      <a:r>
+                        <a:rPr kumimoji="0" lang="es-AR" sz="1400" kern="1200" dirty="0" smtClean="0">
+                          <a:solidFill>
+                            <a:schemeClr val="dk1"/>
+                          </a:solidFill>
+                          <a:latin typeface="+mn-lt"/>
+                          <a:ea typeface="+mn-ea"/>
+                          <a:cs typeface="+mn-cs"/>
+                        </a:rPr>
+                        <a:t>Con un servidor apache con soporte para el protocolo HTTPS y scripts .cgi Con un grupo de usuarios del sistema de archivos.</a:t>
+                      </a:r>
+                      <a:endParaRPr kumimoji="0" lang="es-AR" sz="1400" kern="1200" dirty="0">
+                        <a:solidFill>
+                          <a:schemeClr val="dk1"/>
+                        </a:solidFill>
+                        <a:latin typeface="+mn-lt"/>
+                        <a:ea typeface="+mn-ea"/>
+                        <a:cs typeface="+mn-cs"/>
+                      </a:endParaRPr>
+                    </a:p>
+                  </a:txBody>
+                  <a:tcPr/>
+                </a:tc>
+              </a:tr>
+              <a:tr h="675075">
+                <a:tc>
+                  <a:txBody>
+                    <a:bodyPr/>
+                    <a:lstStyle/>
+                    <a:p>
+                      <a:pPr marL="0" marR="0" lvl="0" indent="0" algn="l" defTabSz="914400" rtl="0" eaLnBrk="1" fontAlgn="auto" latinLnBrk="0" hangingPunct="1">
+                        <a:lnSpc>
+                          <a:spcPct val="100000"/>
+                        </a:lnSpc>
+                        <a:spcBef>
+                          <a:spcPts val="0"/>
+                        </a:spcBef>
+                        <a:spcAft>
+                          <a:spcPts val="0"/>
+                        </a:spcAft>
+                        <a:buClrTx/>
+                        <a:buSzTx/>
+                        <a:buFontTx/>
+                        <a:buNone/>
+                        <a:tabLst/>
+                        <a:defRPr/>
+                      </a:pPr>
+                      <a:r>
+                        <a:rPr kumimoji="0" lang="es-ES" sz="1400" kern="1200" dirty="0" smtClean="0">
+                          <a:solidFill>
+                            <a:schemeClr val="dk1"/>
+                          </a:solidFill>
+                          <a:effectLst/>
+                          <a:latin typeface="+mn-lt"/>
+                          <a:ea typeface="+mn-ea"/>
+                          <a:cs typeface="+mn-cs"/>
+                        </a:rPr>
+                        <a:t>Control de sincronización</a:t>
+                      </a:r>
+                      <a:endParaRPr kumimoji="0" lang="es-AR" sz="1400" kern="1200" dirty="0" smtClean="0">
+                        <a:solidFill>
+                          <a:schemeClr val="dk1"/>
+                        </a:solidFill>
+                        <a:effectLst/>
+                        <a:latin typeface="+mn-lt"/>
+                        <a:ea typeface="+mn-ea"/>
+                        <a:cs typeface="+mn-cs"/>
+                      </a:endParaRPr>
+                    </a:p>
+                  </a:txBody>
+                  <a:tcPr/>
+                </a:tc>
+                <a:tc>
+                  <a:txBody>
+                    <a:bodyPr/>
+                    <a:lstStyle/>
+                    <a:p>
+                      <a:r>
+                        <a:rPr lang="es-AR" sz="1400" dirty="0" err="1" smtClean="0"/>
+                        <a:t>Checkout</a:t>
+                      </a:r>
+                      <a:r>
+                        <a:rPr lang="es-AR" sz="1400" dirty="0" smtClean="0"/>
+                        <a:t> , </a:t>
+                      </a:r>
+                      <a:r>
+                        <a:rPr lang="es-AR" sz="1400" dirty="0" err="1" smtClean="0"/>
+                        <a:t>Update</a:t>
+                      </a:r>
+                      <a:r>
+                        <a:rPr lang="es-AR" sz="1400" dirty="0" smtClean="0"/>
+                        <a:t>, </a:t>
+                      </a:r>
+                      <a:r>
+                        <a:rPr lang="es-AR" sz="1400" dirty="0" err="1" smtClean="0"/>
+                        <a:t>Commit</a:t>
+                      </a:r>
+                      <a:r>
+                        <a:rPr lang="es-AR" sz="1400" dirty="0" smtClean="0"/>
+                        <a:t>.</a:t>
+                      </a:r>
+                      <a:endParaRPr kumimoji="0" lang="es-AR" sz="1400" kern="1200" dirty="0">
+                        <a:solidFill>
+                          <a:schemeClr val="dk1"/>
+                        </a:solidFill>
+                        <a:latin typeface="+mn-lt"/>
+                        <a:ea typeface="+mn-ea"/>
+                        <a:cs typeface="+mn-cs"/>
+                      </a:endParaRPr>
+                    </a:p>
+                  </a:txBody>
+                  <a:tcPr/>
+                </a:tc>
+                <a:tc>
+                  <a:txBody>
+                    <a:bodyPr/>
+                    <a:lstStyle/>
+                    <a:p>
+                      <a:r>
+                        <a:rPr kumimoji="0" lang="es-AR" sz="1400" kern="1200" dirty="0" smtClean="0">
+                          <a:solidFill>
+                            <a:schemeClr val="dk1"/>
+                          </a:solidFill>
+                          <a:latin typeface="+mn-lt"/>
+                          <a:ea typeface="+mn-ea"/>
+                          <a:cs typeface="+mn-cs"/>
+                        </a:rPr>
+                        <a:t>Clone, </a:t>
+                      </a:r>
+                      <a:r>
+                        <a:rPr kumimoji="0" lang="es-AR" sz="1400" kern="1200" dirty="0" err="1" smtClean="0">
+                          <a:solidFill>
+                            <a:schemeClr val="dk1"/>
+                          </a:solidFill>
+                          <a:latin typeface="+mn-lt"/>
+                          <a:ea typeface="+mn-ea"/>
+                          <a:cs typeface="+mn-cs"/>
+                        </a:rPr>
+                        <a:t>Push</a:t>
+                      </a:r>
+                      <a:r>
+                        <a:rPr kumimoji="0" lang="es-AR" sz="1400" kern="1200" dirty="0" smtClean="0">
+                          <a:solidFill>
+                            <a:schemeClr val="dk1"/>
+                          </a:solidFill>
+                          <a:latin typeface="+mn-lt"/>
+                          <a:ea typeface="+mn-ea"/>
+                          <a:cs typeface="+mn-cs"/>
+                        </a:rPr>
+                        <a:t>, </a:t>
+                      </a:r>
+                      <a:r>
+                        <a:rPr kumimoji="0" lang="es-AR" sz="1400" kern="1200" dirty="0" err="1" smtClean="0">
+                          <a:solidFill>
+                            <a:schemeClr val="dk1"/>
+                          </a:solidFill>
+                          <a:latin typeface="+mn-lt"/>
+                          <a:ea typeface="+mn-ea"/>
+                          <a:cs typeface="+mn-cs"/>
+                        </a:rPr>
+                        <a:t>Pull</a:t>
+                      </a:r>
+                      <a:r>
+                        <a:rPr kumimoji="0" lang="es-AR" sz="1400" kern="1200" dirty="0" smtClean="0">
+                          <a:solidFill>
+                            <a:schemeClr val="dk1"/>
+                          </a:solidFill>
+                          <a:latin typeface="+mn-lt"/>
+                          <a:ea typeface="+mn-ea"/>
+                          <a:cs typeface="+mn-cs"/>
+                        </a:rPr>
+                        <a:t>,</a:t>
+                      </a:r>
+                      <a:r>
+                        <a:rPr kumimoji="0" lang="es-AR" sz="1400" kern="1200" baseline="0" dirty="0" smtClean="0">
+                          <a:solidFill>
+                            <a:schemeClr val="dk1"/>
+                          </a:solidFill>
+                          <a:latin typeface="+mn-lt"/>
+                          <a:ea typeface="+mn-ea"/>
+                          <a:cs typeface="+mn-cs"/>
+                        </a:rPr>
+                        <a:t> </a:t>
+                      </a:r>
+                      <a:r>
+                        <a:rPr kumimoji="0" lang="es-AR" sz="1400" kern="1200" baseline="0" dirty="0" err="1" smtClean="0">
+                          <a:solidFill>
+                            <a:schemeClr val="dk1"/>
+                          </a:solidFill>
+                          <a:latin typeface="+mn-lt"/>
+                          <a:ea typeface="+mn-ea"/>
+                          <a:cs typeface="+mn-cs"/>
+                        </a:rPr>
+                        <a:t>Commit</a:t>
+                      </a:r>
+                      <a:r>
+                        <a:rPr kumimoji="0" lang="es-AR" sz="1400" kern="1200" baseline="0" dirty="0" smtClean="0">
+                          <a:solidFill>
+                            <a:schemeClr val="dk1"/>
+                          </a:solidFill>
+                          <a:latin typeface="+mn-lt"/>
+                          <a:ea typeface="+mn-ea"/>
+                          <a:cs typeface="+mn-cs"/>
+                        </a:rPr>
+                        <a:t>, </a:t>
+                      </a:r>
+                      <a:r>
+                        <a:rPr kumimoji="0" lang="es-AR" sz="1400" kern="1200" baseline="0" dirty="0" err="1" smtClean="0">
+                          <a:solidFill>
+                            <a:schemeClr val="dk1"/>
+                          </a:solidFill>
+                          <a:latin typeface="+mn-lt"/>
+                          <a:ea typeface="+mn-ea"/>
+                          <a:cs typeface="+mn-cs"/>
+                        </a:rPr>
+                        <a:t>Update</a:t>
+                      </a:r>
+                      <a:r>
+                        <a:rPr kumimoji="0" lang="es-AR" sz="1400" kern="1200" baseline="0" dirty="0" smtClean="0">
+                          <a:solidFill>
+                            <a:schemeClr val="dk1"/>
+                          </a:solidFill>
+                          <a:latin typeface="+mn-lt"/>
+                          <a:ea typeface="+mn-ea"/>
+                          <a:cs typeface="+mn-cs"/>
+                        </a:rPr>
+                        <a:t>.</a:t>
+                      </a:r>
+                      <a:endParaRPr kumimoji="0" lang="es-AR" sz="1400" kern="1200" dirty="0">
+                        <a:solidFill>
+                          <a:schemeClr val="dk1"/>
+                        </a:solidFill>
+                        <a:latin typeface="+mn-lt"/>
+                        <a:ea typeface="+mn-ea"/>
+                        <a:cs typeface="+mn-cs"/>
+                      </a:endParaRPr>
+                    </a:p>
+                  </a:txBody>
+                  <a:tcPr/>
+                </a:tc>
+              </a:tr>
+              <a:tr h="675075">
+                <a:tc>
+                  <a:txBody>
+                    <a:bodyPr/>
+                    <a:lstStyle/>
+                    <a:p>
+                      <a:r>
+                        <a:rPr lang="es-AR" sz="1400" dirty="0" smtClean="0"/>
+                        <a:t>Cliente</a:t>
+                      </a:r>
+                      <a:endParaRPr lang="es-AR" sz="1400" dirty="0"/>
+                    </a:p>
+                  </a:txBody>
+                  <a:tcPr/>
+                </a:tc>
+                <a:tc>
+                  <a:txBody>
+                    <a:bodyPr/>
+                    <a:lstStyle/>
+                    <a:p>
+                      <a:r>
+                        <a:rPr kumimoji="0" lang="es-AR" sz="1400" kern="1200" dirty="0" smtClean="0">
+                          <a:solidFill>
+                            <a:schemeClr val="dk1"/>
+                          </a:solidFill>
+                          <a:latin typeface="+mn-lt"/>
+                          <a:ea typeface="+mn-ea"/>
+                          <a:cs typeface="+mn-cs"/>
+                        </a:rPr>
+                        <a:t>TortoiseSvn.</a:t>
+                      </a:r>
+                      <a:endParaRPr kumimoji="0" lang="es-AR" sz="1400" kern="1200" dirty="0">
+                        <a:solidFill>
+                          <a:schemeClr val="dk1"/>
+                        </a:solidFill>
+                        <a:latin typeface="+mn-lt"/>
+                        <a:ea typeface="+mn-ea"/>
+                        <a:cs typeface="+mn-cs"/>
+                      </a:endParaRPr>
+                    </a:p>
+                  </a:txBody>
+                  <a:tcPr/>
+                </a:tc>
+                <a:tc>
+                  <a:txBody>
+                    <a:bodyPr/>
+                    <a:lstStyle/>
+                    <a:p>
+                      <a:r>
+                        <a:rPr kumimoji="0" lang="es-AR" sz="1400" kern="1200" dirty="0" smtClean="0">
+                          <a:solidFill>
+                            <a:schemeClr val="dk1"/>
+                          </a:solidFill>
+                          <a:latin typeface="+mn-lt"/>
+                          <a:ea typeface="+mn-ea"/>
+                          <a:cs typeface="+mn-cs"/>
+                        </a:rPr>
+                        <a:t>TortoiseHg.</a:t>
+                      </a:r>
+                      <a:endParaRPr kumimoji="0" lang="es-AR" sz="1400" kern="1200" dirty="0">
+                        <a:solidFill>
+                          <a:schemeClr val="dk1"/>
+                        </a:solidFill>
+                        <a:latin typeface="+mn-lt"/>
+                        <a:ea typeface="+mn-ea"/>
+                        <a:cs typeface="+mn-cs"/>
+                      </a:endParaRPr>
+                    </a:p>
+                  </a:txBody>
+                  <a:tcPr/>
+                </a:tc>
+              </a:tr>
+              <a:tr h="675075">
+                <a:tc>
+                  <a:txBody>
+                    <a:bodyPr/>
+                    <a:lstStyle/>
+                    <a:p>
+                      <a:pPr marL="0" marR="0" lvl="0" indent="0" algn="l" defTabSz="914400" rtl="0" eaLnBrk="1" fontAlgn="auto" latinLnBrk="0" hangingPunct="1">
+                        <a:lnSpc>
+                          <a:spcPct val="100000"/>
+                        </a:lnSpc>
+                        <a:spcBef>
+                          <a:spcPts val="0"/>
+                        </a:spcBef>
+                        <a:spcAft>
+                          <a:spcPts val="0"/>
+                        </a:spcAft>
+                        <a:buClrTx/>
+                        <a:buSzTx/>
+                        <a:buFontTx/>
+                        <a:buNone/>
+                        <a:tabLst/>
+                        <a:defRPr/>
+                      </a:pPr>
+                      <a:r>
+                        <a:rPr kumimoji="0" lang="es-ES" sz="1400" kern="1200" dirty="0" smtClean="0">
+                          <a:solidFill>
+                            <a:schemeClr val="dk1"/>
+                          </a:solidFill>
+                          <a:effectLst/>
+                          <a:latin typeface="+mn-lt"/>
+                          <a:ea typeface="+mn-ea"/>
+                          <a:cs typeface="+mn-cs"/>
+                        </a:rPr>
+                        <a:t>Manejo de gestión de cambios</a:t>
+                      </a:r>
+                      <a:endParaRPr kumimoji="0" lang="es-AR" sz="1400" kern="1200" dirty="0" smtClean="0">
+                        <a:solidFill>
+                          <a:schemeClr val="dk1"/>
+                        </a:solidFill>
+                        <a:effectLst/>
+                        <a:latin typeface="+mn-lt"/>
+                        <a:ea typeface="+mn-ea"/>
+                        <a:cs typeface="+mn-cs"/>
+                      </a:endParaRPr>
+                    </a:p>
+                  </a:txBody>
+                  <a:tcPr/>
+                </a:tc>
+                <a:tc>
+                  <a:txBody>
+                    <a:bodyPr/>
+                    <a:lstStyle/>
+                    <a:p>
+                      <a:endParaRPr kumimoji="0" lang="es-AR" sz="1400" kern="1200" dirty="0">
+                        <a:solidFill>
+                          <a:schemeClr val="dk1"/>
+                        </a:solidFill>
+                        <a:latin typeface="+mn-lt"/>
+                        <a:ea typeface="+mn-ea"/>
+                        <a:cs typeface="+mn-cs"/>
+                      </a:endParaRPr>
+                    </a:p>
+                  </a:txBody>
+                  <a:tcPr/>
+                </a:tc>
+                <a:tc>
+                  <a:txBody>
+                    <a:bodyPr/>
+                    <a:lstStyle/>
+                    <a:p>
+                      <a:endParaRPr kumimoji="0" lang="es-AR" sz="1400" kern="1200" dirty="0">
+                        <a:solidFill>
+                          <a:schemeClr val="dk1"/>
+                        </a:solidFill>
+                        <a:latin typeface="+mn-lt"/>
+                        <a:ea typeface="+mn-ea"/>
+                        <a:cs typeface="+mn-cs"/>
+                      </a:endParaRPr>
+                    </a:p>
+                  </a:txBody>
+                  <a:tcPr/>
+                </a:tc>
+              </a:tr>
+            </a:tbl>
+          </a:graphicData>
+        </a:graphic>
+      </p:graphicFrame>
     </p:spTree>
     <p:extLst>
       <p:ext uri="{BB962C8B-B14F-4D97-AF65-F5344CB8AC3E}">
-        <p14:creationId xmlns:p14="http://schemas.microsoft.com/office/powerpoint/2010/main" val="2467385990"/>
+        <p14:creationId xmlns:p14="http://schemas.microsoft.com/office/powerpoint/2010/main" val="296890870"/>
       </p:ext>
     </p:extLst>
   </p:cSld>

</xml_diff>